<commit_message>
Fixing slides for MS Access Basics
</commit_message>
<xml_diff>
--- a/Courses/Software-Sciences/Module-3-Databases-New/13-MS-Access/11-MS-Access-Basics.pptx
+++ b/Courses/Software-Sciences/Module-3-Databases-New/13-MS-Access/11-MS-Access-Basics.pptx
@@ -5,10 +5,10 @@
     <p:sldMasterId id="2147483675" r:id="rId1"/>
   </p:sldMasterIdLst>
   <p:notesMasterIdLst>
-    <p:notesMasterId r:id="rId42"/>
+    <p:notesMasterId r:id="rId44"/>
   </p:notesMasterIdLst>
   <p:handoutMasterIdLst>
-    <p:handoutMasterId r:id="rId43"/>
+    <p:handoutMasterId r:id="rId45"/>
   </p:handoutMasterIdLst>
   <p:sldIdLst>
     <p:sldId id="503" r:id="rId2"/>
@@ -28,29 +28,31 @@
     <p:sldId id="541" r:id="rId16"/>
     <p:sldId id="529" r:id="rId17"/>
     <p:sldId id="583" r:id="rId18"/>
-    <p:sldId id="584" r:id="rId19"/>
-    <p:sldId id="585" r:id="rId20"/>
-    <p:sldId id="533" r:id="rId21"/>
-    <p:sldId id="535" r:id="rId22"/>
-    <p:sldId id="536" r:id="rId23"/>
-    <p:sldId id="537" r:id="rId24"/>
-    <p:sldId id="539" r:id="rId25"/>
-    <p:sldId id="567" r:id="rId26"/>
-    <p:sldId id="568" r:id="rId27"/>
-    <p:sldId id="569" r:id="rId28"/>
-    <p:sldId id="570" r:id="rId29"/>
-    <p:sldId id="571" r:id="rId30"/>
-    <p:sldId id="540" r:id="rId31"/>
-    <p:sldId id="572" r:id="rId32"/>
-    <p:sldId id="573" r:id="rId33"/>
-    <p:sldId id="574" r:id="rId34"/>
-    <p:sldId id="575" r:id="rId35"/>
-    <p:sldId id="576" r:id="rId36"/>
-    <p:sldId id="577" r:id="rId37"/>
-    <p:sldId id="578" r:id="rId38"/>
-    <p:sldId id="349" r:id="rId39"/>
-    <p:sldId id="504" r:id="rId40"/>
-    <p:sldId id="505" r:id="rId41"/>
+    <p:sldId id="587" r:id="rId19"/>
+    <p:sldId id="584" r:id="rId20"/>
+    <p:sldId id="586" r:id="rId21"/>
+    <p:sldId id="585" r:id="rId22"/>
+    <p:sldId id="533" r:id="rId23"/>
+    <p:sldId id="535" r:id="rId24"/>
+    <p:sldId id="536" r:id="rId25"/>
+    <p:sldId id="537" r:id="rId26"/>
+    <p:sldId id="539" r:id="rId27"/>
+    <p:sldId id="567" r:id="rId28"/>
+    <p:sldId id="568" r:id="rId29"/>
+    <p:sldId id="569" r:id="rId30"/>
+    <p:sldId id="570" r:id="rId31"/>
+    <p:sldId id="571" r:id="rId32"/>
+    <p:sldId id="540" r:id="rId33"/>
+    <p:sldId id="572" r:id="rId34"/>
+    <p:sldId id="573" r:id="rId35"/>
+    <p:sldId id="574" r:id="rId36"/>
+    <p:sldId id="575" r:id="rId37"/>
+    <p:sldId id="576" r:id="rId38"/>
+    <p:sldId id="577" r:id="rId39"/>
+    <p:sldId id="578" r:id="rId40"/>
+    <p:sldId id="349" r:id="rId41"/>
+    <p:sldId id="504" r:id="rId42"/>
+    <p:sldId id="505" r:id="rId43"/>
   </p:sldIdLst>
   <p:sldSz cx="12192000" cy="6858000"/>
   <p:notesSz cx="6858000" cy="9144000"/>
@@ -179,7 +181,9 @@
             <p14:sldId id="541"/>
             <p14:sldId id="529"/>
             <p14:sldId id="583"/>
+            <p14:sldId id="587"/>
             <p14:sldId id="584"/>
+            <p14:sldId id="586"/>
             <p14:sldId id="585"/>
           </p14:sldIdLst>
         </p14:section>
@@ -329,7 +333,7 @@
           <a:p>
             <a:fld id="{4E087215-0C8F-4762-A664-737A353EC9A4}" type="datetimeFigureOut">
               <a:rPr lang="bg-BG" smtClean="0"/>
-              <a:t>26.11.2023 г.</a:t>
+              <a:t>10.12.2023 г.</a:t>
             </a:fld>
             <a:endParaRPr lang="bg-BG"/>
           </a:p>
@@ -525,7 +529,7 @@
           <a:p>
             <a:fld id="{72D84649-876A-46C9-8472-14CB09C070D8}" type="datetimeFigureOut">
               <a:rPr lang="en-US" smtClean="0"/>
-              <a:t>26-Nov-23</a:t>
+              <a:t>12/10/2023</a:t>
             </a:fld>
             <a:endParaRPr lang="en-US"/>
           </a:p>
@@ -1010,7 +1014,9 @@
         </p:nvSpPr>
         <p:spPr/>
         <p:txBody>
-          <a:bodyPr/>
+          <a:bodyPr>
+            <a:normAutofit/>
+          </a:bodyPr>
           <a:lstStyle/>
           <a:p>
             <a:endParaRPr lang="en-US" dirty="0"/>
@@ -1019,129 +1025,23 @@
       </p:sp>
       <p:sp>
         <p:nvSpPr>
-          <p:cNvPr id="7" name="Slide Number Placeholder 5">
-            <a:extLst>
-              <a:ext uri="{FF2B5EF4-FFF2-40B4-BE49-F238E27FC236}">
-                <a16:creationId xmlns:a16="http://schemas.microsoft.com/office/drawing/2014/main" id="{E65F1CA9-65DC-416B-8882-B3A5E415CE67}"/>
-              </a:ext>
-            </a:extLst>
-          </p:cNvPr>
-          <p:cNvSpPr txBox="1">
-            <a:spLocks/>
+          <p:cNvPr id="4" name="Slide Number Placeholder 3"/>
+          <p:cNvSpPr>
+            <a:spLocks noGrp="1"/>
           </p:cNvSpPr>
-          <p:nvPr/>
+          <p:nvPr>
+            <p:ph type="sldNum" sz="quarter" idx="10"/>
+          </p:nvPr>
         </p:nvSpPr>
-        <p:spPr>
-          <a:xfrm>
-            <a:off x="6488999" y="8847000"/>
-            <a:ext cx="367414" cy="297000"/>
-          </a:xfrm>
-          <a:prstGeom prst="rect">
-            <a:avLst/>
-          </a:prstGeom>
-        </p:spPr>
+        <p:spPr/>
         <p:txBody>
-          <a:bodyPr vert="horz" lIns="91440" tIns="45720" rIns="91440" bIns="45720" rtlCol="0" anchor="b"/>
-          <a:lstStyle>
-            <a:defPPr>
-              <a:defRPr lang="en-US"/>
-            </a:defPPr>
-            <a:lvl1pPr marL="0" algn="r" defTabSz="914400" rtl="0" eaLnBrk="1" latinLnBrk="0" hangingPunct="1">
-              <a:defRPr sz="1200" kern="1200">
-                <a:solidFill>
-                  <a:schemeClr val="tx1"/>
-                </a:solidFill>
-                <a:latin typeface="+mn-lt"/>
-                <a:ea typeface="+mn-ea"/>
-                <a:cs typeface="+mn-cs"/>
-              </a:defRPr>
-            </a:lvl1pPr>
-            <a:lvl2pPr marL="457200" algn="l" defTabSz="914400" rtl="0" eaLnBrk="1" latinLnBrk="0" hangingPunct="1">
-              <a:defRPr sz="1800" kern="1200">
-                <a:solidFill>
-                  <a:schemeClr val="tx1"/>
-                </a:solidFill>
-                <a:latin typeface="+mn-lt"/>
-                <a:ea typeface="+mn-ea"/>
-                <a:cs typeface="+mn-cs"/>
-              </a:defRPr>
-            </a:lvl2pPr>
-            <a:lvl3pPr marL="914400" algn="l" defTabSz="914400" rtl="0" eaLnBrk="1" latinLnBrk="0" hangingPunct="1">
-              <a:defRPr sz="1800" kern="1200">
-                <a:solidFill>
-                  <a:schemeClr val="tx1"/>
-                </a:solidFill>
-                <a:latin typeface="+mn-lt"/>
-                <a:ea typeface="+mn-ea"/>
-                <a:cs typeface="+mn-cs"/>
-              </a:defRPr>
-            </a:lvl3pPr>
-            <a:lvl4pPr marL="1371600" algn="l" defTabSz="914400" rtl="0" eaLnBrk="1" latinLnBrk="0" hangingPunct="1">
-              <a:defRPr sz="1800" kern="1200">
-                <a:solidFill>
-                  <a:schemeClr val="tx1"/>
-                </a:solidFill>
-                <a:latin typeface="+mn-lt"/>
-                <a:ea typeface="+mn-ea"/>
-                <a:cs typeface="+mn-cs"/>
-              </a:defRPr>
-            </a:lvl4pPr>
-            <a:lvl5pPr marL="1828800" algn="l" defTabSz="914400" rtl="0" eaLnBrk="1" latinLnBrk="0" hangingPunct="1">
-              <a:defRPr sz="1800" kern="1200">
-                <a:solidFill>
-                  <a:schemeClr val="tx1"/>
-                </a:solidFill>
-                <a:latin typeface="+mn-lt"/>
-                <a:ea typeface="+mn-ea"/>
-                <a:cs typeface="+mn-cs"/>
-              </a:defRPr>
-            </a:lvl5pPr>
-            <a:lvl6pPr marL="2286000" algn="l" defTabSz="914400" rtl="0" eaLnBrk="1" latinLnBrk="0" hangingPunct="1">
-              <a:defRPr sz="1800" kern="1200">
-                <a:solidFill>
-                  <a:schemeClr val="tx1"/>
-                </a:solidFill>
-                <a:latin typeface="+mn-lt"/>
-                <a:ea typeface="+mn-ea"/>
-                <a:cs typeface="+mn-cs"/>
-              </a:defRPr>
-            </a:lvl6pPr>
-            <a:lvl7pPr marL="2743200" algn="l" defTabSz="914400" rtl="0" eaLnBrk="1" latinLnBrk="0" hangingPunct="1">
-              <a:defRPr sz="1800" kern="1200">
-                <a:solidFill>
-                  <a:schemeClr val="tx1"/>
-                </a:solidFill>
-                <a:latin typeface="+mn-lt"/>
-                <a:ea typeface="+mn-ea"/>
-                <a:cs typeface="+mn-cs"/>
-              </a:defRPr>
-            </a:lvl7pPr>
-            <a:lvl8pPr marL="3200400" algn="l" defTabSz="914400" rtl="0" eaLnBrk="1" latinLnBrk="0" hangingPunct="1">
-              <a:defRPr sz="1800" kern="1200">
-                <a:solidFill>
-                  <a:schemeClr val="tx1"/>
-                </a:solidFill>
-                <a:latin typeface="+mn-lt"/>
-                <a:ea typeface="+mn-ea"/>
-                <a:cs typeface="+mn-cs"/>
-              </a:defRPr>
-            </a:lvl8pPr>
-            <a:lvl9pPr marL="3657600" algn="l" defTabSz="914400" rtl="0" eaLnBrk="1" latinLnBrk="0" hangingPunct="1">
-              <a:defRPr sz="1800" kern="1200">
-                <a:solidFill>
-                  <a:schemeClr val="tx1"/>
-                </a:solidFill>
-                <a:latin typeface="+mn-lt"/>
-                <a:ea typeface="+mn-ea"/>
-                <a:cs typeface="+mn-cs"/>
-              </a:defRPr>
-            </a:lvl9pPr>
-          </a:lstStyle>
-          <a:p>
-            <a:fld id="{3EBA5BD7-F043-4D1B-AA17-CD412FC534DE}" type="slidenum">
+          <a:bodyPr/>
+          <a:lstStyle/>
+          <a:p>
+            <a:fld id="{2BF067CD-8E6B-4360-9AA8-C5DF2A48A6D1}" type="slidenum">
               <a:rPr lang="en-US" smtClean="0"/>
               <a:pPr/>
-              <a:t>38</a:t>
+              <a:t>26</a:t>
             </a:fld>
             <a:endParaRPr lang="en-US" dirty="0"/>
           </a:p>
@@ -1149,10 +1049,10 @@
       </p:sp>
       <p:sp>
         <p:nvSpPr>
-          <p:cNvPr id="5" name="Footer Placeholder 7">
+          <p:cNvPr id="6" name="Footer Placeholder 7">
             <a:extLst>
               <a:ext uri="{FF2B5EF4-FFF2-40B4-BE49-F238E27FC236}">
-                <a16:creationId xmlns:a16="http://schemas.microsoft.com/office/drawing/2014/main" id="{912A3AAE-885B-D70C-2870-9BDE460702C3}"/>
+                <a16:creationId xmlns:a16="http://schemas.microsoft.com/office/drawing/2014/main" id="{831AFD4C-D5A4-4438-945F-69757AEAE940}"/>
               </a:ext>
             </a:extLst>
           </p:cNvPr>
@@ -1205,7 +1105,7 @@
     </p:spTree>
     <p:extLst>
       <p:ext uri="{BB962C8B-B14F-4D97-AF65-F5344CB8AC3E}">
-        <p14:creationId xmlns:p14="http://schemas.microsoft.com/office/powerpoint/2010/main" val="1661027275"/>
+        <p14:creationId xmlns:p14="http://schemas.microsoft.com/office/powerpoint/2010/main" val="3758620145"/>
       </p:ext>
     </p:extLst>
   </p:cSld>
@@ -1265,129 +1165,23 @@
       </p:sp>
       <p:sp>
         <p:nvSpPr>
-          <p:cNvPr id="7" name="Slide Number Placeholder 5">
-            <a:extLst>
-              <a:ext uri="{FF2B5EF4-FFF2-40B4-BE49-F238E27FC236}">
-                <a16:creationId xmlns:a16="http://schemas.microsoft.com/office/drawing/2014/main" id="{5049B984-F964-47FF-8179-0A3007CE21CD}"/>
-              </a:ext>
-            </a:extLst>
-          </p:cNvPr>
-          <p:cNvSpPr txBox="1">
-            <a:spLocks/>
+          <p:cNvPr id="4" name="Slide Number Placeholder 3"/>
+          <p:cNvSpPr>
+            <a:spLocks noGrp="1"/>
           </p:cNvSpPr>
-          <p:nvPr/>
+          <p:nvPr>
+            <p:ph type="sldNum" sz="quarter" idx="5"/>
+          </p:nvPr>
         </p:nvSpPr>
-        <p:spPr>
-          <a:xfrm>
-            <a:off x="6488999" y="8847000"/>
-            <a:ext cx="367414" cy="297000"/>
-          </a:xfrm>
-          <a:prstGeom prst="rect">
-            <a:avLst/>
-          </a:prstGeom>
-        </p:spPr>
+        <p:spPr/>
         <p:txBody>
-          <a:bodyPr vert="horz" lIns="91440" tIns="45720" rIns="91440" bIns="45720" rtlCol="0" anchor="b"/>
-          <a:lstStyle>
-            <a:defPPr>
-              <a:defRPr lang="en-US"/>
-            </a:defPPr>
-            <a:lvl1pPr marL="0" algn="r" defTabSz="914400" rtl="0" eaLnBrk="1" latinLnBrk="0" hangingPunct="1">
-              <a:defRPr sz="1200" kern="1200">
-                <a:solidFill>
-                  <a:schemeClr val="tx1"/>
-                </a:solidFill>
-                <a:latin typeface="+mn-lt"/>
-                <a:ea typeface="+mn-ea"/>
-                <a:cs typeface="+mn-cs"/>
-              </a:defRPr>
-            </a:lvl1pPr>
-            <a:lvl2pPr marL="457200" algn="l" defTabSz="914400" rtl="0" eaLnBrk="1" latinLnBrk="0" hangingPunct="1">
-              <a:defRPr sz="1800" kern="1200">
-                <a:solidFill>
-                  <a:schemeClr val="tx1"/>
-                </a:solidFill>
-                <a:latin typeface="+mn-lt"/>
-                <a:ea typeface="+mn-ea"/>
-                <a:cs typeface="+mn-cs"/>
-              </a:defRPr>
-            </a:lvl2pPr>
-            <a:lvl3pPr marL="914400" algn="l" defTabSz="914400" rtl="0" eaLnBrk="1" latinLnBrk="0" hangingPunct="1">
-              <a:defRPr sz="1800" kern="1200">
-                <a:solidFill>
-                  <a:schemeClr val="tx1"/>
-                </a:solidFill>
-                <a:latin typeface="+mn-lt"/>
-                <a:ea typeface="+mn-ea"/>
-                <a:cs typeface="+mn-cs"/>
-              </a:defRPr>
-            </a:lvl3pPr>
-            <a:lvl4pPr marL="1371600" algn="l" defTabSz="914400" rtl="0" eaLnBrk="1" latinLnBrk="0" hangingPunct="1">
-              <a:defRPr sz="1800" kern="1200">
-                <a:solidFill>
-                  <a:schemeClr val="tx1"/>
-                </a:solidFill>
-                <a:latin typeface="+mn-lt"/>
-                <a:ea typeface="+mn-ea"/>
-                <a:cs typeface="+mn-cs"/>
-              </a:defRPr>
-            </a:lvl4pPr>
-            <a:lvl5pPr marL="1828800" algn="l" defTabSz="914400" rtl="0" eaLnBrk="1" latinLnBrk="0" hangingPunct="1">
-              <a:defRPr sz="1800" kern="1200">
-                <a:solidFill>
-                  <a:schemeClr val="tx1"/>
-                </a:solidFill>
-                <a:latin typeface="+mn-lt"/>
-                <a:ea typeface="+mn-ea"/>
-                <a:cs typeface="+mn-cs"/>
-              </a:defRPr>
-            </a:lvl5pPr>
-            <a:lvl6pPr marL="2286000" algn="l" defTabSz="914400" rtl="0" eaLnBrk="1" latinLnBrk="0" hangingPunct="1">
-              <a:defRPr sz="1800" kern="1200">
-                <a:solidFill>
-                  <a:schemeClr val="tx1"/>
-                </a:solidFill>
-                <a:latin typeface="+mn-lt"/>
-                <a:ea typeface="+mn-ea"/>
-                <a:cs typeface="+mn-cs"/>
-              </a:defRPr>
-            </a:lvl6pPr>
-            <a:lvl7pPr marL="2743200" algn="l" defTabSz="914400" rtl="0" eaLnBrk="1" latinLnBrk="0" hangingPunct="1">
-              <a:defRPr sz="1800" kern="1200">
-                <a:solidFill>
-                  <a:schemeClr val="tx1"/>
-                </a:solidFill>
-                <a:latin typeface="+mn-lt"/>
-                <a:ea typeface="+mn-ea"/>
-                <a:cs typeface="+mn-cs"/>
-              </a:defRPr>
-            </a:lvl7pPr>
-            <a:lvl8pPr marL="3200400" algn="l" defTabSz="914400" rtl="0" eaLnBrk="1" latinLnBrk="0" hangingPunct="1">
-              <a:defRPr sz="1800" kern="1200">
-                <a:solidFill>
-                  <a:schemeClr val="tx1"/>
-                </a:solidFill>
-                <a:latin typeface="+mn-lt"/>
-                <a:ea typeface="+mn-ea"/>
-                <a:cs typeface="+mn-cs"/>
-              </a:defRPr>
-            </a:lvl8pPr>
-            <a:lvl9pPr marL="3657600" algn="l" defTabSz="914400" rtl="0" eaLnBrk="1" latinLnBrk="0" hangingPunct="1">
-              <a:defRPr sz="1800" kern="1200">
-                <a:solidFill>
-                  <a:schemeClr val="tx1"/>
-                </a:solidFill>
-                <a:latin typeface="+mn-lt"/>
-                <a:ea typeface="+mn-ea"/>
-                <a:cs typeface="+mn-cs"/>
-              </a:defRPr>
-            </a:lvl9pPr>
-          </a:lstStyle>
-          <a:p>
-            <a:fld id="{3EBA5BD7-F043-4D1B-AA17-CD412FC534DE}" type="slidenum">
+          <a:bodyPr/>
+          <a:lstStyle/>
+          <a:p>
+            <a:fld id="{2BF067CD-8E6B-4360-9AA8-C5DF2A48A6D1}" type="slidenum">
               <a:rPr lang="en-US" smtClean="0"/>
               <a:pPr/>
-              <a:t>39</a:t>
+              <a:t>28</a:t>
             </a:fld>
             <a:endParaRPr lang="en-US" dirty="0"/>
           </a:p>
@@ -1395,10 +1189,10 @@
       </p:sp>
       <p:sp>
         <p:nvSpPr>
-          <p:cNvPr id="5" name="Footer Placeholder 7">
+          <p:cNvPr id="6" name="Footer Placeholder 7">
             <a:extLst>
               <a:ext uri="{FF2B5EF4-FFF2-40B4-BE49-F238E27FC236}">
-                <a16:creationId xmlns:a16="http://schemas.microsoft.com/office/drawing/2014/main" id="{87873718-4EF7-D4BA-768F-C09AAEC16FC2}"/>
+                <a16:creationId xmlns:a16="http://schemas.microsoft.com/office/drawing/2014/main" id="{0DC922E6-CD6A-DFFC-200D-5E732211C95D}"/>
               </a:ext>
             </a:extLst>
           </p:cNvPr>
@@ -1451,7 +1245,7 @@
     </p:spTree>
     <p:extLst>
       <p:ext uri="{BB962C8B-B14F-4D97-AF65-F5344CB8AC3E}">
-        <p14:creationId xmlns:p14="http://schemas.microsoft.com/office/powerpoint/2010/main" val="2007979410"/>
+        <p14:creationId xmlns:p14="http://schemas.microsoft.com/office/powerpoint/2010/main" val="1532374807"/>
       </p:ext>
     </p:extLst>
   </p:cSld>
@@ -1505,6 +1299,498 @@
           <a:bodyPr/>
           <a:lstStyle/>
           <a:p>
+            <a:endParaRPr lang="en-US" dirty="0"/>
+          </a:p>
+        </p:txBody>
+      </p:sp>
+      <p:sp>
+        <p:nvSpPr>
+          <p:cNvPr id="7" name="Slide Number Placeholder 5">
+            <a:extLst>
+              <a:ext uri="{FF2B5EF4-FFF2-40B4-BE49-F238E27FC236}">
+                <a16:creationId xmlns:a16="http://schemas.microsoft.com/office/drawing/2014/main" id="{E65F1CA9-65DC-416B-8882-B3A5E415CE67}"/>
+              </a:ext>
+            </a:extLst>
+          </p:cNvPr>
+          <p:cNvSpPr txBox="1">
+            <a:spLocks/>
+          </p:cNvSpPr>
+          <p:nvPr/>
+        </p:nvSpPr>
+        <p:spPr>
+          <a:xfrm>
+            <a:off x="6488999" y="8847000"/>
+            <a:ext cx="367414" cy="297000"/>
+          </a:xfrm>
+          <a:prstGeom prst="rect">
+            <a:avLst/>
+          </a:prstGeom>
+        </p:spPr>
+        <p:txBody>
+          <a:bodyPr vert="horz" lIns="91440" tIns="45720" rIns="91440" bIns="45720" rtlCol="0" anchor="b"/>
+          <a:lstStyle>
+            <a:defPPr>
+              <a:defRPr lang="en-US"/>
+            </a:defPPr>
+            <a:lvl1pPr marL="0" algn="r" defTabSz="914400" rtl="0" eaLnBrk="1" latinLnBrk="0" hangingPunct="1">
+              <a:defRPr sz="1200" kern="1200">
+                <a:solidFill>
+                  <a:schemeClr val="tx1"/>
+                </a:solidFill>
+                <a:latin typeface="+mn-lt"/>
+                <a:ea typeface="+mn-ea"/>
+                <a:cs typeface="+mn-cs"/>
+              </a:defRPr>
+            </a:lvl1pPr>
+            <a:lvl2pPr marL="457200" algn="l" defTabSz="914400" rtl="0" eaLnBrk="1" latinLnBrk="0" hangingPunct="1">
+              <a:defRPr sz="1800" kern="1200">
+                <a:solidFill>
+                  <a:schemeClr val="tx1"/>
+                </a:solidFill>
+                <a:latin typeface="+mn-lt"/>
+                <a:ea typeface="+mn-ea"/>
+                <a:cs typeface="+mn-cs"/>
+              </a:defRPr>
+            </a:lvl2pPr>
+            <a:lvl3pPr marL="914400" algn="l" defTabSz="914400" rtl="0" eaLnBrk="1" latinLnBrk="0" hangingPunct="1">
+              <a:defRPr sz="1800" kern="1200">
+                <a:solidFill>
+                  <a:schemeClr val="tx1"/>
+                </a:solidFill>
+                <a:latin typeface="+mn-lt"/>
+                <a:ea typeface="+mn-ea"/>
+                <a:cs typeface="+mn-cs"/>
+              </a:defRPr>
+            </a:lvl3pPr>
+            <a:lvl4pPr marL="1371600" algn="l" defTabSz="914400" rtl="0" eaLnBrk="1" latinLnBrk="0" hangingPunct="1">
+              <a:defRPr sz="1800" kern="1200">
+                <a:solidFill>
+                  <a:schemeClr val="tx1"/>
+                </a:solidFill>
+                <a:latin typeface="+mn-lt"/>
+                <a:ea typeface="+mn-ea"/>
+                <a:cs typeface="+mn-cs"/>
+              </a:defRPr>
+            </a:lvl4pPr>
+            <a:lvl5pPr marL="1828800" algn="l" defTabSz="914400" rtl="0" eaLnBrk="1" latinLnBrk="0" hangingPunct="1">
+              <a:defRPr sz="1800" kern="1200">
+                <a:solidFill>
+                  <a:schemeClr val="tx1"/>
+                </a:solidFill>
+                <a:latin typeface="+mn-lt"/>
+                <a:ea typeface="+mn-ea"/>
+                <a:cs typeface="+mn-cs"/>
+              </a:defRPr>
+            </a:lvl5pPr>
+            <a:lvl6pPr marL="2286000" algn="l" defTabSz="914400" rtl="0" eaLnBrk="1" latinLnBrk="0" hangingPunct="1">
+              <a:defRPr sz="1800" kern="1200">
+                <a:solidFill>
+                  <a:schemeClr val="tx1"/>
+                </a:solidFill>
+                <a:latin typeface="+mn-lt"/>
+                <a:ea typeface="+mn-ea"/>
+                <a:cs typeface="+mn-cs"/>
+              </a:defRPr>
+            </a:lvl6pPr>
+            <a:lvl7pPr marL="2743200" algn="l" defTabSz="914400" rtl="0" eaLnBrk="1" latinLnBrk="0" hangingPunct="1">
+              <a:defRPr sz="1800" kern="1200">
+                <a:solidFill>
+                  <a:schemeClr val="tx1"/>
+                </a:solidFill>
+                <a:latin typeface="+mn-lt"/>
+                <a:ea typeface="+mn-ea"/>
+                <a:cs typeface="+mn-cs"/>
+              </a:defRPr>
+            </a:lvl7pPr>
+            <a:lvl8pPr marL="3200400" algn="l" defTabSz="914400" rtl="0" eaLnBrk="1" latinLnBrk="0" hangingPunct="1">
+              <a:defRPr sz="1800" kern="1200">
+                <a:solidFill>
+                  <a:schemeClr val="tx1"/>
+                </a:solidFill>
+                <a:latin typeface="+mn-lt"/>
+                <a:ea typeface="+mn-ea"/>
+                <a:cs typeface="+mn-cs"/>
+              </a:defRPr>
+            </a:lvl8pPr>
+            <a:lvl9pPr marL="3657600" algn="l" defTabSz="914400" rtl="0" eaLnBrk="1" latinLnBrk="0" hangingPunct="1">
+              <a:defRPr sz="1800" kern="1200">
+                <a:solidFill>
+                  <a:schemeClr val="tx1"/>
+                </a:solidFill>
+                <a:latin typeface="+mn-lt"/>
+                <a:ea typeface="+mn-ea"/>
+                <a:cs typeface="+mn-cs"/>
+              </a:defRPr>
+            </a:lvl9pPr>
+          </a:lstStyle>
+          <a:p>
+            <a:fld id="{3EBA5BD7-F043-4D1B-AA17-CD412FC534DE}" type="slidenum">
+              <a:rPr lang="en-US" smtClean="0"/>
+              <a:pPr/>
+              <a:t>40</a:t>
+            </a:fld>
+            <a:endParaRPr lang="en-US" dirty="0"/>
+          </a:p>
+        </p:txBody>
+      </p:sp>
+      <p:sp>
+        <p:nvSpPr>
+          <p:cNvPr id="5" name="Footer Placeholder 7">
+            <a:extLst>
+              <a:ext uri="{FF2B5EF4-FFF2-40B4-BE49-F238E27FC236}">
+                <a16:creationId xmlns:a16="http://schemas.microsoft.com/office/drawing/2014/main" id="{912A3AAE-885B-D70C-2870-9BDE460702C3}"/>
+              </a:ext>
+            </a:extLst>
+          </p:cNvPr>
+          <p:cNvSpPr>
+            <a:spLocks noGrp="1"/>
+          </p:cNvSpPr>
+          <p:nvPr>
+            <p:ph type="ftr" sz="quarter" idx="4"/>
+          </p:nvPr>
+        </p:nvSpPr>
+        <p:spPr>
+          <a:xfrm>
+            <a:off x="-1" y="8892000"/>
+            <a:ext cx="6488999" cy="252000"/>
+          </a:xfrm>
+          <a:prstGeom prst="rect">
+            <a:avLst/>
+          </a:prstGeom>
+        </p:spPr>
+        <p:txBody>
+          <a:bodyPr vert="horz" lIns="91440" tIns="45720" rIns="91440" bIns="45720" rtlCol="0" anchor="b"/>
+          <a:lstStyle>
+            <a:lvl1pPr algn="l">
+              <a:defRPr sz="1100"/>
+            </a:lvl1pPr>
+          </a:lstStyle>
+          <a:p>
+            <a:r>
+              <a:rPr lang="bg-BG" sz="1100" dirty="0"/>
+              <a:t>Работна група </a:t>
+            </a:r>
+            <a:r>
+              <a:rPr lang="bg-BG" dirty="0"/>
+              <a:t>"Образование по програмиране и ИТ"</a:t>
+            </a:r>
+            <a:r>
+              <a:rPr lang="bg-BG" sz="1100" dirty="0"/>
+              <a:t>, с подкрепата на </a:t>
+            </a:r>
+            <a:r>
+              <a:rPr lang="en-US" sz="1100" dirty="0">
+                <a:hlinkClick r:id="rId3"/>
+              </a:rPr>
+              <a:t>SoftUni</a:t>
+            </a:r>
+            <a:endParaRPr lang="en-US" sz="1100" dirty="0"/>
+          </a:p>
+        </p:txBody>
+      </p:sp>
+    </p:spTree>
+    <p:extLst>
+      <p:ext uri="{BB962C8B-B14F-4D97-AF65-F5344CB8AC3E}">
+        <p14:creationId xmlns:p14="http://schemas.microsoft.com/office/powerpoint/2010/main" val="1661027275"/>
+      </p:ext>
+    </p:extLst>
+  </p:cSld>
+  <p:clrMapOvr>
+    <a:masterClrMapping/>
+  </p:clrMapOvr>
+</p:notes>
+</file>
+
+<file path=ppt/notesSlides/notesSlide13.xml><?xml version="1.0" encoding="utf-8"?>
+<p:notes xmlns:a="http://schemas.openxmlformats.org/drawingml/2006/main" xmlns:r="http://schemas.openxmlformats.org/officeDocument/2006/relationships" xmlns:p="http://schemas.openxmlformats.org/presentationml/2006/main">
+  <p:cSld>
+    <p:spTree>
+      <p:nvGrpSpPr>
+        <p:cNvPr id="1" name=""/>
+        <p:cNvGrpSpPr/>
+        <p:nvPr/>
+      </p:nvGrpSpPr>
+      <p:grpSpPr>
+        <a:xfrm>
+          <a:off x="0" y="0"/>
+          <a:ext cx="0" cy="0"/>
+          <a:chOff x="0" y="0"/>
+          <a:chExt cx="0" cy="0"/>
+        </a:xfrm>
+      </p:grpSpPr>
+      <p:sp>
+        <p:nvSpPr>
+          <p:cNvPr id="2" name="Slide Image Placeholder 1"/>
+          <p:cNvSpPr>
+            <a:spLocks noGrp="1" noRot="1" noChangeAspect="1"/>
+          </p:cNvSpPr>
+          <p:nvPr>
+            <p:ph type="sldImg"/>
+          </p:nvPr>
+        </p:nvSpPr>
+        <p:spPr/>
+      </p:sp>
+      <p:sp>
+        <p:nvSpPr>
+          <p:cNvPr id="3" name="Notes Placeholder 2"/>
+          <p:cNvSpPr>
+            <a:spLocks noGrp="1"/>
+          </p:cNvSpPr>
+          <p:nvPr>
+            <p:ph type="body" idx="1"/>
+          </p:nvPr>
+        </p:nvSpPr>
+        <p:spPr/>
+        <p:txBody>
+          <a:bodyPr/>
+          <a:lstStyle/>
+          <a:p>
+            <a:endParaRPr lang="en-US" dirty="0"/>
+          </a:p>
+        </p:txBody>
+      </p:sp>
+      <p:sp>
+        <p:nvSpPr>
+          <p:cNvPr id="7" name="Slide Number Placeholder 5">
+            <a:extLst>
+              <a:ext uri="{FF2B5EF4-FFF2-40B4-BE49-F238E27FC236}">
+                <a16:creationId xmlns:a16="http://schemas.microsoft.com/office/drawing/2014/main" id="{5049B984-F964-47FF-8179-0A3007CE21CD}"/>
+              </a:ext>
+            </a:extLst>
+          </p:cNvPr>
+          <p:cNvSpPr txBox="1">
+            <a:spLocks/>
+          </p:cNvSpPr>
+          <p:nvPr/>
+        </p:nvSpPr>
+        <p:spPr>
+          <a:xfrm>
+            <a:off x="6488999" y="8847000"/>
+            <a:ext cx="367414" cy="297000"/>
+          </a:xfrm>
+          <a:prstGeom prst="rect">
+            <a:avLst/>
+          </a:prstGeom>
+        </p:spPr>
+        <p:txBody>
+          <a:bodyPr vert="horz" lIns="91440" tIns="45720" rIns="91440" bIns="45720" rtlCol="0" anchor="b"/>
+          <a:lstStyle>
+            <a:defPPr>
+              <a:defRPr lang="en-US"/>
+            </a:defPPr>
+            <a:lvl1pPr marL="0" algn="r" defTabSz="914400" rtl="0" eaLnBrk="1" latinLnBrk="0" hangingPunct="1">
+              <a:defRPr sz="1200" kern="1200">
+                <a:solidFill>
+                  <a:schemeClr val="tx1"/>
+                </a:solidFill>
+                <a:latin typeface="+mn-lt"/>
+                <a:ea typeface="+mn-ea"/>
+                <a:cs typeface="+mn-cs"/>
+              </a:defRPr>
+            </a:lvl1pPr>
+            <a:lvl2pPr marL="457200" algn="l" defTabSz="914400" rtl="0" eaLnBrk="1" latinLnBrk="0" hangingPunct="1">
+              <a:defRPr sz="1800" kern="1200">
+                <a:solidFill>
+                  <a:schemeClr val="tx1"/>
+                </a:solidFill>
+                <a:latin typeface="+mn-lt"/>
+                <a:ea typeface="+mn-ea"/>
+                <a:cs typeface="+mn-cs"/>
+              </a:defRPr>
+            </a:lvl2pPr>
+            <a:lvl3pPr marL="914400" algn="l" defTabSz="914400" rtl="0" eaLnBrk="1" latinLnBrk="0" hangingPunct="1">
+              <a:defRPr sz="1800" kern="1200">
+                <a:solidFill>
+                  <a:schemeClr val="tx1"/>
+                </a:solidFill>
+                <a:latin typeface="+mn-lt"/>
+                <a:ea typeface="+mn-ea"/>
+                <a:cs typeface="+mn-cs"/>
+              </a:defRPr>
+            </a:lvl3pPr>
+            <a:lvl4pPr marL="1371600" algn="l" defTabSz="914400" rtl="0" eaLnBrk="1" latinLnBrk="0" hangingPunct="1">
+              <a:defRPr sz="1800" kern="1200">
+                <a:solidFill>
+                  <a:schemeClr val="tx1"/>
+                </a:solidFill>
+                <a:latin typeface="+mn-lt"/>
+                <a:ea typeface="+mn-ea"/>
+                <a:cs typeface="+mn-cs"/>
+              </a:defRPr>
+            </a:lvl4pPr>
+            <a:lvl5pPr marL="1828800" algn="l" defTabSz="914400" rtl="0" eaLnBrk="1" latinLnBrk="0" hangingPunct="1">
+              <a:defRPr sz="1800" kern="1200">
+                <a:solidFill>
+                  <a:schemeClr val="tx1"/>
+                </a:solidFill>
+                <a:latin typeface="+mn-lt"/>
+                <a:ea typeface="+mn-ea"/>
+                <a:cs typeface="+mn-cs"/>
+              </a:defRPr>
+            </a:lvl5pPr>
+            <a:lvl6pPr marL="2286000" algn="l" defTabSz="914400" rtl="0" eaLnBrk="1" latinLnBrk="0" hangingPunct="1">
+              <a:defRPr sz="1800" kern="1200">
+                <a:solidFill>
+                  <a:schemeClr val="tx1"/>
+                </a:solidFill>
+                <a:latin typeface="+mn-lt"/>
+                <a:ea typeface="+mn-ea"/>
+                <a:cs typeface="+mn-cs"/>
+              </a:defRPr>
+            </a:lvl6pPr>
+            <a:lvl7pPr marL="2743200" algn="l" defTabSz="914400" rtl="0" eaLnBrk="1" latinLnBrk="0" hangingPunct="1">
+              <a:defRPr sz="1800" kern="1200">
+                <a:solidFill>
+                  <a:schemeClr val="tx1"/>
+                </a:solidFill>
+                <a:latin typeface="+mn-lt"/>
+                <a:ea typeface="+mn-ea"/>
+                <a:cs typeface="+mn-cs"/>
+              </a:defRPr>
+            </a:lvl7pPr>
+            <a:lvl8pPr marL="3200400" algn="l" defTabSz="914400" rtl="0" eaLnBrk="1" latinLnBrk="0" hangingPunct="1">
+              <a:defRPr sz="1800" kern="1200">
+                <a:solidFill>
+                  <a:schemeClr val="tx1"/>
+                </a:solidFill>
+                <a:latin typeface="+mn-lt"/>
+                <a:ea typeface="+mn-ea"/>
+                <a:cs typeface="+mn-cs"/>
+              </a:defRPr>
+            </a:lvl8pPr>
+            <a:lvl9pPr marL="3657600" algn="l" defTabSz="914400" rtl="0" eaLnBrk="1" latinLnBrk="0" hangingPunct="1">
+              <a:defRPr sz="1800" kern="1200">
+                <a:solidFill>
+                  <a:schemeClr val="tx1"/>
+                </a:solidFill>
+                <a:latin typeface="+mn-lt"/>
+                <a:ea typeface="+mn-ea"/>
+                <a:cs typeface="+mn-cs"/>
+              </a:defRPr>
+            </a:lvl9pPr>
+          </a:lstStyle>
+          <a:p>
+            <a:fld id="{3EBA5BD7-F043-4D1B-AA17-CD412FC534DE}" type="slidenum">
+              <a:rPr lang="en-US" smtClean="0"/>
+              <a:pPr/>
+              <a:t>41</a:t>
+            </a:fld>
+            <a:endParaRPr lang="en-US" dirty="0"/>
+          </a:p>
+        </p:txBody>
+      </p:sp>
+      <p:sp>
+        <p:nvSpPr>
+          <p:cNvPr id="5" name="Footer Placeholder 7">
+            <a:extLst>
+              <a:ext uri="{FF2B5EF4-FFF2-40B4-BE49-F238E27FC236}">
+                <a16:creationId xmlns:a16="http://schemas.microsoft.com/office/drawing/2014/main" id="{87873718-4EF7-D4BA-768F-C09AAEC16FC2}"/>
+              </a:ext>
+            </a:extLst>
+          </p:cNvPr>
+          <p:cNvSpPr>
+            <a:spLocks noGrp="1"/>
+          </p:cNvSpPr>
+          <p:nvPr>
+            <p:ph type="ftr" sz="quarter" idx="4"/>
+          </p:nvPr>
+        </p:nvSpPr>
+        <p:spPr>
+          <a:xfrm>
+            <a:off x="-1" y="8892000"/>
+            <a:ext cx="6488999" cy="252000"/>
+          </a:xfrm>
+          <a:prstGeom prst="rect">
+            <a:avLst/>
+          </a:prstGeom>
+        </p:spPr>
+        <p:txBody>
+          <a:bodyPr vert="horz" lIns="91440" tIns="45720" rIns="91440" bIns="45720" rtlCol="0" anchor="b"/>
+          <a:lstStyle>
+            <a:lvl1pPr algn="l">
+              <a:defRPr sz="1100"/>
+            </a:lvl1pPr>
+          </a:lstStyle>
+          <a:p>
+            <a:r>
+              <a:rPr lang="bg-BG" sz="1100" dirty="0"/>
+              <a:t>Работна група </a:t>
+            </a:r>
+            <a:r>
+              <a:rPr lang="bg-BG" dirty="0"/>
+              <a:t>"Образование по програмиране и ИТ"</a:t>
+            </a:r>
+            <a:r>
+              <a:rPr lang="bg-BG" sz="1100" dirty="0"/>
+              <a:t>, с подкрепата на </a:t>
+            </a:r>
+            <a:r>
+              <a:rPr lang="en-US" sz="1100" dirty="0">
+                <a:hlinkClick r:id="rId3"/>
+              </a:rPr>
+              <a:t>SoftUni</a:t>
+            </a:r>
+            <a:endParaRPr lang="en-US" sz="1100" dirty="0"/>
+          </a:p>
+        </p:txBody>
+      </p:sp>
+    </p:spTree>
+    <p:extLst>
+      <p:ext uri="{BB962C8B-B14F-4D97-AF65-F5344CB8AC3E}">
+        <p14:creationId xmlns:p14="http://schemas.microsoft.com/office/powerpoint/2010/main" val="2007979410"/>
+      </p:ext>
+    </p:extLst>
+  </p:cSld>
+  <p:clrMapOvr>
+    <a:masterClrMapping/>
+  </p:clrMapOvr>
+</p:notes>
+</file>
+
+<file path=ppt/notesSlides/notesSlide14.xml><?xml version="1.0" encoding="utf-8"?>
+<p:notes xmlns:a="http://schemas.openxmlformats.org/drawingml/2006/main" xmlns:r="http://schemas.openxmlformats.org/officeDocument/2006/relationships" xmlns:p="http://schemas.openxmlformats.org/presentationml/2006/main">
+  <p:cSld>
+    <p:spTree>
+      <p:nvGrpSpPr>
+        <p:cNvPr id="1" name=""/>
+        <p:cNvGrpSpPr/>
+        <p:nvPr/>
+      </p:nvGrpSpPr>
+      <p:grpSpPr>
+        <a:xfrm>
+          <a:off x="0" y="0"/>
+          <a:ext cx="0" cy="0"/>
+          <a:chOff x="0" y="0"/>
+          <a:chExt cx="0" cy="0"/>
+        </a:xfrm>
+      </p:grpSpPr>
+      <p:sp>
+        <p:nvSpPr>
+          <p:cNvPr id="2" name="Slide Image Placeholder 1"/>
+          <p:cNvSpPr>
+            <a:spLocks noGrp="1" noRot="1" noChangeAspect="1"/>
+          </p:cNvSpPr>
+          <p:nvPr>
+            <p:ph type="sldImg"/>
+          </p:nvPr>
+        </p:nvSpPr>
+        <p:spPr/>
+      </p:sp>
+      <p:sp>
+        <p:nvSpPr>
+          <p:cNvPr id="3" name="Notes Placeholder 2"/>
+          <p:cNvSpPr>
+            <a:spLocks noGrp="1"/>
+          </p:cNvSpPr>
+          <p:nvPr>
+            <p:ph type="body" idx="1"/>
+          </p:nvPr>
+        </p:nvSpPr>
+        <p:spPr/>
+        <p:txBody>
+          <a:bodyPr/>
+          <a:lstStyle/>
+          <a:p>
             <a:endParaRPr lang="en-US"/>
           </a:p>
         </p:txBody>
@@ -1633,7 +1919,7 @@
             <a:fld id="{3EBA5BD7-F043-4D1B-AA17-CD412FC534DE}" type="slidenum">
               <a:rPr lang="en-US" smtClean="0"/>
               <a:pPr/>
-              <a:t>40</a:t>
+              <a:t>42</a:t>
             </a:fld>
             <a:endParaRPr lang="en-US" dirty="0"/>
           </a:p>
@@ -2432,9 +2718,7 @@
         </p:nvSpPr>
         <p:spPr/>
         <p:txBody>
-          <a:bodyPr>
-            <a:normAutofit/>
-          </a:bodyPr>
+          <a:bodyPr/>
           <a:lstStyle/>
           <a:p>
             <a:endParaRPr lang="en-US" dirty="0"/>
@@ -2448,7 +2732,7 @@
             <a:spLocks noGrp="1"/>
           </p:cNvSpPr>
           <p:nvPr>
-            <p:ph type="sldNum" sz="quarter" idx="10"/>
+            <p:ph type="sldNum" sz="quarter" idx="5"/>
           </p:nvPr>
         </p:nvSpPr>
         <p:spPr/>
@@ -2458,8 +2742,7 @@
           <a:p>
             <a:fld id="{2BF067CD-8E6B-4360-9AA8-C5DF2A48A6D1}" type="slidenum">
               <a:rPr lang="en-US" smtClean="0"/>
-              <a:pPr/>
-              <a:t>22</a:t>
+              <a:t>19</a:t>
             </a:fld>
             <a:endParaRPr lang="en-US" dirty="0"/>
           </a:p>
@@ -2467,13 +2750,7 @@
       </p:sp>
       <p:sp>
         <p:nvSpPr>
-          <p:cNvPr id="6" name="Footer Placeholder 7">
-            <a:extLst>
-              <a:ext uri="{FF2B5EF4-FFF2-40B4-BE49-F238E27FC236}">
-                <a16:creationId xmlns:a16="http://schemas.microsoft.com/office/drawing/2014/main" id="{3010C10F-5C2B-94DA-D9E4-44AF4A5C6992}"/>
-              </a:ext>
-            </a:extLst>
-          </p:cNvPr>
+          <p:cNvPr id="5" name="Footer Placeholder 4"/>
           <p:cNvSpPr>
             <a:spLocks noGrp="1"/>
           </p:cNvSpPr>
@@ -2481,37 +2758,25 @@
             <p:ph type="ftr" sz="quarter" idx="4"/>
           </p:nvPr>
         </p:nvSpPr>
-        <p:spPr>
-          <a:xfrm>
-            <a:off x="-1" y="8892000"/>
-            <a:ext cx="6488999" cy="252000"/>
-          </a:xfrm>
-          <a:prstGeom prst="rect">
-            <a:avLst/>
-          </a:prstGeom>
-        </p:spPr>
+        <p:spPr/>
         <p:txBody>
-          <a:bodyPr vert="horz" lIns="91440" tIns="45720" rIns="91440" bIns="45720" rtlCol="0" anchor="b"/>
-          <a:lstStyle>
-            <a:lvl1pPr algn="l">
-              <a:defRPr sz="1100"/>
-            </a:lvl1pPr>
-          </a:lstStyle>
-          <a:p>
-            <a:r>
-              <a:rPr lang="bg-BG" sz="1100" dirty="0"/>
+          <a:bodyPr/>
+          <a:lstStyle/>
+          <a:p>
+            <a:r>
+              <a:rPr lang="bg-BG" sz="1100"/>
               <a:t>Работна група </a:t>
             </a:r>
             <a:r>
-              <a:rPr lang="bg-BG" dirty="0"/>
+              <a:rPr lang="bg-BG"/>
               <a:t>"Образование по програмиране и ИТ"</a:t>
             </a:r>
             <a:r>
-              <a:rPr lang="bg-BG" sz="1100" dirty="0"/>
+              <a:rPr lang="bg-BG" sz="1100"/>
               <a:t>, с подкрепата на </a:t>
             </a:r>
             <a:r>
-              <a:rPr lang="en-US" sz="1100" dirty="0">
+              <a:rPr lang="en-US" sz="1100">
                 <a:hlinkClick r:id="rId3"/>
               </a:rPr>
               <a:t>SoftUni</a:t>
@@ -2523,7 +2788,7 @@
     </p:spTree>
     <p:extLst>
       <p:ext uri="{BB962C8B-B14F-4D97-AF65-F5344CB8AC3E}">
-        <p14:creationId xmlns:p14="http://schemas.microsoft.com/office/powerpoint/2010/main" val="2470511223"/>
+        <p14:creationId xmlns:p14="http://schemas.microsoft.com/office/powerpoint/2010/main" val="1901565328"/>
       </p:ext>
     </p:extLst>
   </p:cSld>
@@ -2574,9 +2839,7 @@
         </p:nvSpPr>
         <p:spPr/>
         <p:txBody>
-          <a:bodyPr>
-            <a:normAutofit/>
-          </a:bodyPr>
+          <a:bodyPr/>
           <a:lstStyle/>
           <a:p>
             <a:endParaRPr lang="en-US" dirty="0"/>
@@ -2590,7 +2853,7 @@
             <a:spLocks noGrp="1"/>
           </p:cNvSpPr>
           <p:nvPr>
-            <p:ph type="sldNum" sz="quarter" idx="10"/>
+            <p:ph type="sldNum" sz="quarter" idx="5"/>
           </p:nvPr>
         </p:nvSpPr>
         <p:spPr/>
@@ -2600,8 +2863,7 @@
           <a:p>
             <a:fld id="{2BF067CD-8E6B-4360-9AA8-C5DF2A48A6D1}" type="slidenum">
               <a:rPr lang="en-US" smtClean="0"/>
-              <a:pPr/>
-              <a:t>23</a:t>
+              <a:t>20</a:t>
             </a:fld>
             <a:endParaRPr lang="en-US" dirty="0"/>
           </a:p>
@@ -2609,13 +2871,7 @@
       </p:sp>
       <p:sp>
         <p:nvSpPr>
-          <p:cNvPr id="6" name="Footer Placeholder 7">
-            <a:extLst>
-              <a:ext uri="{FF2B5EF4-FFF2-40B4-BE49-F238E27FC236}">
-                <a16:creationId xmlns:a16="http://schemas.microsoft.com/office/drawing/2014/main" id="{71B6FEE5-3694-5CFB-E58C-1EF4E10412F3}"/>
-              </a:ext>
-            </a:extLst>
-          </p:cNvPr>
+          <p:cNvPr id="5" name="Footer Placeholder 4"/>
           <p:cNvSpPr>
             <a:spLocks noGrp="1"/>
           </p:cNvSpPr>
@@ -2623,37 +2879,25 @@
             <p:ph type="ftr" sz="quarter" idx="4"/>
           </p:nvPr>
         </p:nvSpPr>
-        <p:spPr>
-          <a:xfrm>
-            <a:off x="-1" y="8892000"/>
-            <a:ext cx="6488999" cy="252000"/>
-          </a:xfrm>
-          <a:prstGeom prst="rect">
-            <a:avLst/>
-          </a:prstGeom>
-        </p:spPr>
+        <p:spPr/>
         <p:txBody>
-          <a:bodyPr vert="horz" lIns="91440" tIns="45720" rIns="91440" bIns="45720" rtlCol="0" anchor="b"/>
-          <a:lstStyle>
-            <a:lvl1pPr algn="l">
-              <a:defRPr sz="1100"/>
-            </a:lvl1pPr>
-          </a:lstStyle>
-          <a:p>
-            <a:r>
-              <a:rPr lang="bg-BG" sz="1100" dirty="0"/>
+          <a:bodyPr/>
+          <a:lstStyle/>
+          <a:p>
+            <a:r>
+              <a:rPr lang="bg-BG" sz="1100"/>
               <a:t>Работна група </a:t>
             </a:r>
             <a:r>
-              <a:rPr lang="bg-BG" dirty="0"/>
+              <a:rPr lang="bg-BG"/>
               <a:t>"Образование по програмиране и ИТ"</a:t>
             </a:r>
             <a:r>
-              <a:rPr lang="bg-BG" sz="1100" dirty="0"/>
+              <a:rPr lang="bg-BG" sz="1100"/>
               <a:t>, с подкрепата на </a:t>
             </a:r>
             <a:r>
-              <a:rPr lang="en-US" sz="1100" dirty="0">
+              <a:rPr lang="en-US" sz="1100">
                 <a:hlinkClick r:id="rId3"/>
               </a:rPr>
               <a:t>SoftUni</a:t>
@@ -2665,7 +2909,7 @@
     </p:spTree>
     <p:extLst>
       <p:ext uri="{BB962C8B-B14F-4D97-AF65-F5344CB8AC3E}">
-        <p14:creationId xmlns:p14="http://schemas.microsoft.com/office/powerpoint/2010/main" val="1117642675"/>
+        <p14:creationId xmlns:p14="http://schemas.microsoft.com/office/powerpoint/2010/main" val="4027159490"/>
       </p:ext>
     </p:extLst>
   </p:cSld>
@@ -2754,7 +2998,7 @@
           <p:cNvPr id="6" name="Footer Placeholder 7">
             <a:extLst>
               <a:ext uri="{FF2B5EF4-FFF2-40B4-BE49-F238E27FC236}">
-                <a16:creationId xmlns:a16="http://schemas.microsoft.com/office/drawing/2014/main" id="{831AFD4C-D5A4-4438-945F-69757AEAE940}"/>
+                <a16:creationId xmlns:a16="http://schemas.microsoft.com/office/drawing/2014/main" id="{3010C10F-5C2B-94DA-D9E4-44AF4A5C6992}"/>
               </a:ext>
             </a:extLst>
           </p:cNvPr>
@@ -2807,7 +3051,7 @@
     </p:spTree>
     <p:extLst>
       <p:ext uri="{BB962C8B-B14F-4D97-AF65-F5344CB8AC3E}">
-        <p14:creationId xmlns:p14="http://schemas.microsoft.com/office/powerpoint/2010/main" val="3758620145"/>
+        <p14:creationId xmlns:p14="http://schemas.microsoft.com/office/powerpoint/2010/main" val="2470511223"/>
       </p:ext>
     </p:extLst>
   </p:cSld>
@@ -2858,7 +3102,9 @@
         </p:nvSpPr>
         <p:spPr/>
         <p:txBody>
-          <a:bodyPr/>
+          <a:bodyPr>
+            <a:normAutofit/>
+          </a:bodyPr>
           <a:lstStyle/>
           <a:p>
             <a:endParaRPr lang="en-US" dirty="0"/>
@@ -2872,7 +3118,7 @@
             <a:spLocks noGrp="1"/>
           </p:cNvSpPr>
           <p:nvPr>
-            <p:ph type="sldNum" sz="quarter" idx="5"/>
+            <p:ph type="sldNum" sz="quarter" idx="10"/>
           </p:nvPr>
         </p:nvSpPr>
         <p:spPr/>
@@ -2883,7 +3129,7 @@
             <a:fld id="{2BF067CD-8E6B-4360-9AA8-C5DF2A48A6D1}" type="slidenum">
               <a:rPr lang="en-US" smtClean="0"/>
               <a:pPr/>
-              <a:t>26</a:t>
+              <a:t>25</a:t>
             </a:fld>
             <a:endParaRPr lang="en-US" dirty="0"/>
           </a:p>
@@ -2894,7 +3140,7 @@
           <p:cNvPr id="6" name="Footer Placeholder 7">
             <a:extLst>
               <a:ext uri="{FF2B5EF4-FFF2-40B4-BE49-F238E27FC236}">
-                <a16:creationId xmlns:a16="http://schemas.microsoft.com/office/drawing/2014/main" id="{0DC922E6-CD6A-DFFC-200D-5E732211C95D}"/>
+                <a16:creationId xmlns:a16="http://schemas.microsoft.com/office/drawing/2014/main" id="{71B6FEE5-3694-5CFB-E58C-1EF4E10412F3}"/>
               </a:ext>
             </a:extLst>
           </p:cNvPr>
@@ -2947,7 +3193,7 @@
     </p:spTree>
     <p:extLst>
       <p:ext uri="{BB962C8B-B14F-4D97-AF65-F5344CB8AC3E}">
-        <p14:creationId xmlns:p14="http://schemas.microsoft.com/office/powerpoint/2010/main" val="1532374807"/>
+        <p14:creationId xmlns:p14="http://schemas.microsoft.com/office/powerpoint/2010/main" val="1117642675"/>
       </p:ext>
     </p:extLst>
   </p:cSld>
@@ -11644,8 +11890,8 @@
           <a:lstStyle/>
           <a:p>
             <a:r>
-              <a:rPr lang="bg-BG"/>
-              <a:t>Попълване на данни в таблица (3)</a:t>
+              <a:rPr lang="bg-BG" dirty="0"/>
+              <a:t>Попълване на данни в таблица (2)</a:t>
             </a:r>
             <a:endParaRPr lang="en-US" dirty="0"/>
           </a:p>
@@ -12236,7 +12482,7 @@
           <p:cNvPr id="2" name="Slide Number Placeholder 1">
             <a:extLst>
               <a:ext uri="{FF2B5EF4-FFF2-40B4-BE49-F238E27FC236}">
-                <a16:creationId xmlns:a16="http://schemas.microsoft.com/office/drawing/2014/main" id="{811D4260-FBEB-AF12-2311-E0ACFEA507C0}"/>
+                <a16:creationId xmlns:a16="http://schemas.microsoft.com/office/drawing/2014/main" id="{C75D8E5B-70B1-CD36-FAB4-088BF5C6469E}"/>
               </a:ext>
             </a:extLst>
           </p:cNvPr>
@@ -12266,7 +12512,7 @@
           <p:cNvPr id="3" name="Text Placeholder 2">
             <a:extLst>
               <a:ext uri="{FF2B5EF4-FFF2-40B4-BE49-F238E27FC236}">
-                <a16:creationId xmlns:a16="http://schemas.microsoft.com/office/drawing/2014/main" id="{F0D140AB-3526-4BE2-08A4-50CAFDCB99CE}"/>
+                <a16:creationId xmlns:a16="http://schemas.microsoft.com/office/drawing/2014/main" id="{071C7F40-986C-9C86-6564-A65278869C6F}"/>
               </a:ext>
             </a:extLst>
           </p:cNvPr>
@@ -12282,31 +12528,7 @@
           <a:bodyPr/>
           <a:lstStyle/>
           <a:p>
-            <a:r>
-              <a:rPr lang="en-US" dirty="0"/>
-              <a:t>TODO: show how</a:t>
-            </a:r>
-          </a:p>
-          <a:p>
-            <a:endParaRPr lang="en-US" dirty="0"/>
-          </a:p>
-          <a:p>
-            <a:r>
-              <a:rPr lang="en-US" dirty="0"/>
-              <a:t>TODO: show how</a:t>
-            </a:r>
-          </a:p>
-          <a:p>
-            <a:endParaRPr lang="en-US" dirty="0"/>
-          </a:p>
-          <a:p>
-            <a:r>
-              <a:rPr lang="en-US" dirty="0"/>
-              <a:t>TODO: show how</a:t>
-            </a:r>
-          </a:p>
-          <a:p>
-            <a:endParaRPr lang="en-US" dirty="0"/>
+            <a:endParaRPr lang="en-US"/>
           </a:p>
         </p:txBody>
       </p:sp>
@@ -12315,7 +12537,7 @@
           <p:cNvPr id="4" name="Title 3">
             <a:extLst>
               <a:ext uri="{FF2B5EF4-FFF2-40B4-BE49-F238E27FC236}">
-                <a16:creationId xmlns:a16="http://schemas.microsoft.com/office/drawing/2014/main" id="{FEBBE443-695E-9235-55B1-8A8E81E6FFFB}"/>
+                <a16:creationId xmlns:a16="http://schemas.microsoft.com/office/drawing/2014/main" id="{D3407BC4-420B-58B4-89A5-FB57FB24AB84}"/>
               </a:ext>
             </a:extLst>
           </p:cNvPr>
@@ -12337,7 +12559,15 @@
             </a:r>
             <a:r>
               <a:rPr lang="en-US" dirty="0"/>
-              <a:t> (2)</a:t>
+              <a:t> (</a:t>
+            </a:r>
+            <a:r>
+              <a:rPr lang="bg-BG" dirty="0"/>
+              <a:t>2</a:t>
+            </a:r>
+            <a:r>
+              <a:rPr lang="en-US" dirty="0"/>
+              <a:t>)</a:t>
             </a:r>
           </a:p>
         </p:txBody>
@@ -12345,7 +12575,7 @@
     </p:spTree>
     <p:extLst>
       <p:ext uri="{BB962C8B-B14F-4D97-AF65-F5344CB8AC3E}">
-        <p14:creationId xmlns:p14="http://schemas.microsoft.com/office/powerpoint/2010/main" val="3719980113"/>
+        <p14:creationId xmlns:p14="http://schemas.microsoft.com/office/powerpoint/2010/main" val="3419514475"/>
       </p:ext>
     </p:extLst>
   </p:cSld>
@@ -12385,7 +12615,7 @@
           <p:cNvPr id="2" name="Slide Number Placeholder 1">
             <a:extLst>
               <a:ext uri="{FF2B5EF4-FFF2-40B4-BE49-F238E27FC236}">
-                <a16:creationId xmlns:a16="http://schemas.microsoft.com/office/drawing/2014/main" id="{F9AA9DB2-2E1C-D04E-12DD-CD9D87008507}"/>
+                <a16:creationId xmlns:a16="http://schemas.microsoft.com/office/drawing/2014/main" id="{811D4260-FBEB-AF12-2311-E0ACFEA507C0}"/>
               </a:ext>
             </a:extLst>
           </p:cNvPr>
@@ -12412,10 +12642,118 @@
       </p:sp>
       <p:sp>
         <p:nvSpPr>
+          <p:cNvPr id="3" name="Text Placeholder 2">
+            <a:extLst>
+              <a:ext uri="{FF2B5EF4-FFF2-40B4-BE49-F238E27FC236}">
+                <a16:creationId xmlns:a16="http://schemas.microsoft.com/office/drawing/2014/main" id="{F0D140AB-3526-4BE2-08A4-50CAFDCB99CE}"/>
+              </a:ext>
+            </a:extLst>
+          </p:cNvPr>
+          <p:cNvSpPr>
+            <a:spLocks noGrp="1"/>
+          </p:cNvSpPr>
+          <p:nvPr>
+            <p:ph type="body" sz="quarter" idx="10"/>
+          </p:nvPr>
+        </p:nvSpPr>
+        <p:spPr>
+          <a:xfrm>
+            <a:off x="190402" y="1196125"/>
+            <a:ext cx="7570598" cy="5528766"/>
+          </a:xfrm>
+        </p:spPr>
+        <p:txBody>
+          <a:bodyPr/>
+          <a:lstStyle/>
+          <a:p>
+            <a:r>
+              <a:rPr lang="ru-RU" dirty="0"/>
+              <a:t>В раздела </a:t>
+            </a:r>
+            <a:r>
+              <a:rPr lang="en-US" b="1" dirty="0"/>
+              <a:t>Database Tools</a:t>
+            </a:r>
+            <a:r>
+              <a:rPr lang="ru-RU" dirty="0"/>
+              <a:t>, в групата </a:t>
+            </a:r>
+            <a:r>
+              <a:rPr lang="en-US" b="1" dirty="0"/>
+              <a:t>Relationships</a:t>
+            </a:r>
+            <a:r>
+              <a:rPr lang="ru-RU" dirty="0"/>
+              <a:t> натиснете </a:t>
+            </a:r>
+            <a:r>
+              <a:rPr lang="en-US" b="1" dirty="0"/>
+              <a:t>Relationships</a:t>
+            </a:r>
+            <a:endParaRPr lang="bg-BG" b="1" dirty="0"/>
+          </a:p>
+          <a:p>
+            <a:r>
+              <a:rPr lang="bg-BG" dirty="0"/>
+              <a:t>Вдясно се показват </a:t>
+            </a:r>
+            <a:r>
+              <a:rPr lang="bg-BG" b="1" dirty="0">
+                <a:solidFill>
+                  <a:schemeClr val="bg1"/>
+                </a:solidFill>
+              </a:rPr>
+              <a:t>таблици</a:t>
+            </a:r>
+          </a:p>
+          <a:p>
+            <a:pPr lvl="1"/>
+            <a:r>
+              <a:rPr lang="bg-BG" dirty="0"/>
+              <a:t>Избираме </a:t>
+            </a:r>
+            <a:r>
+              <a:rPr lang="en-US" b="1" dirty="0"/>
+              <a:t>Students</a:t>
+            </a:r>
+            <a:r>
+              <a:rPr lang="en-US" dirty="0"/>
+              <a:t> </a:t>
+            </a:r>
+            <a:r>
+              <a:rPr lang="bg-BG" dirty="0"/>
+              <a:t>и </a:t>
+            </a:r>
+            <a:r>
+              <a:rPr lang="en-US" b="1" dirty="0"/>
+              <a:t>Towns</a:t>
+            </a:r>
+            <a:r>
+              <a:rPr lang="bg-BG" dirty="0"/>
+              <a:t>, като натсикаме </a:t>
+            </a:r>
+            <a:r>
+              <a:rPr lang="bg-BG" b="1" dirty="0"/>
+              <a:t>двукратно</a:t>
+            </a:r>
+            <a:r>
+              <a:rPr lang="bg-BG" dirty="0"/>
+              <a:t> върху тях:</a:t>
+            </a:r>
+            <a:endParaRPr lang="en-US" dirty="0"/>
+          </a:p>
+          <a:p>
+            <a:pPr lvl="1"/>
+            <a:endParaRPr lang="en-US" dirty="0"/>
+          </a:p>
+        </p:txBody>
+      </p:sp>
+      <p:sp>
+        <p:nvSpPr>
           <p:cNvPr id="4" name="Title 3">
             <a:extLst>
               <a:ext uri="{FF2B5EF4-FFF2-40B4-BE49-F238E27FC236}">
-                <a16:creationId xmlns:a16="http://schemas.microsoft.com/office/drawing/2014/main" id="{7DD6F817-4FB5-A154-9E70-AEC38B682860}"/>
+                <a16:creationId xmlns:a16="http://schemas.microsoft.com/office/drawing/2014/main" id="{FEBBE443-695E-9235-55B1-8A8E81E6FFFB}"/>
               </a:ext>
             </a:extLst>
           </p:cNvPr>
@@ -12433,7 +12771,7 @@
           <a:p>
             <a:r>
               <a:rPr lang="bg-BG" dirty="0"/>
-              <a:t>Връзки между таблиците</a:t>
+              <a:t>Връзка между таблици (1)</a:t>
             </a:r>
             <a:endParaRPr lang="en-US" dirty="0"/>
           </a:p>
@@ -12444,7 +12782,7 @@
           <p:cNvPr id="6" name="Picture 5">
             <a:extLst>
               <a:ext uri="{FF2B5EF4-FFF2-40B4-BE49-F238E27FC236}">
-                <a16:creationId xmlns:a16="http://schemas.microsoft.com/office/drawing/2014/main" id="{491F319D-6D5B-E6C5-2DE8-0D1A17ED7CD9}"/>
+                <a16:creationId xmlns:a16="http://schemas.microsoft.com/office/drawing/2014/main" id="{7A0FD021-10E9-AD21-C63E-F5E0C089E97A}"/>
               </a:ext>
             </a:extLst>
           </p:cNvPr>
@@ -12454,15 +12792,15 @@
           <p:nvPr/>
         </p:nvPicPr>
         <p:blipFill>
-          <a:blip r:embed="rId2"/>
+          <a:blip r:embed="rId3"/>
           <a:stretch>
             <a:fillRect/>
           </a:stretch>
         </p:blipFill>
         <p:spPr>
           <a:xfrm>
-            <a:off x="2547937" y="1404000"/>
-            <a:ext cx="7096125" cy="1590675"/>
+            <a:off x="8256000" y="1344945"/>
+            <a:ext cx="3195000" cy="2014865"/>
           </a:xfrm>
           <a:prstGeom prst="rect">
             <a:avLst/>
@@ -12481,7 +12819,7 @@
           <p:cNvPr id="8" name="Picture 7">
             <a:extLst>
               <a:ext uri="{FF2B5EF4-FFF2-40B4-BE49-F238E27FC236}">
-                <a16:creationId xmlns:a16="http://schemas.microsoft.com/office/drawing/2014/main" id="{CD41D2B0-143D-E5F0-507A-412D31372D23}"/>
+                <a16:creationId xmlns:a16="http://schemas.microsoft.com/office/drawing/2014/main" id="{F3BC7140-A707-55A1-7A26-50EE412CA614}"/>
               </a:ext>
             </a:extLst>
           </p:cNvPr>
@@ -12491,15 +12829,179 @@
           <p:nvPr/>
         </p:nvPicPr>
         <p:blipFill>
-          <a:blip r:embed="rId3"/>
+          <a:blip r:embed="rId4"/>
           <a:stretch>
             <a:fillRect/>
           </a:stretch>
         </p:blipFill>
         <p:spPr>
           <a:xfrm>
-            <a:off x="3008961" y="3548325"/>
-            <a:ext cx="6174077" cy="3017311"/>
+            <a:off x="8256000" y="3654000"/>
+            <a:ext cx="3195000" cy="3003539"/>
+          </a:xfrm>
+          <a:prstGeom prst="rect">
+            <a:avLst/>
+          </a:prstGeom>
+        </p:spPr>
+      </p:pic>
+      <p:sp>
+        <p:nvSpPr>
+          <p:cNvPr id="11" name="Rectangle: Rounded Corners 17">
+            <a:extLst>
+              <a:ext uri="{FF2B5EF4-FFF2-40B4-BE49-F238E27FC236}">
+                <a16:creationId xmlns:a16="http://schemas.microsoft.com/office/drawing/2014/main" id="{27A0957A-DCDC-2DC7-F386-66ED3215A62E}"/>
+              </a:ext>
+            </a:extLst>
+          </p:cNvPr>
+          <p:cNvSpPr/>
+          <p:nvPr/>
+        </p:nvSpPr>
+        <p:spPr>
+          <a:xfrm>
+            <a:off x="8841000" y="2013902"/>
+            <a:ext cx="1143000" cy="1055098"/>
+          </a:xfrm>
+          <a:prstGeom prst="roundRect">
+            <a:avLst>
+              <a:gd name="adj" fmla="val 5385"/>
+            </a:avLst>
+          </a:prstGeom>
+          <a:noFill/>
+          <a:ln w="57150">
+            <a:solidFill>
+              <a:schemeClr val="tx1"/>
+            </a:solidFill>
+            <a:prstDash val="solid"/>
+          </a:ln>
+        </p:spPr>
+        <p:style>
+          <a:lnRef idx="2">
+            <a:schemeClr val="accent1">
+              <a:shade val="50000"/>
+            </a:schemeClr>
+          </a:lnRef>
+          <a:fillRef idx="1">
+            <a:schemeClr val="accent1"/>
+          </a:fillRef>
+          <a:effectRef idx="0">
+            <a:schemeClr val="accent1"/>
+          </a:effectRef>
+          <a:fontRef idx="minor">
+            <a:schemeClr val="lt1"/>
+          </a:fontRef>
+        </p:style>
+        <p:txBody>
+          <a:bodyPr rtlCol="0" anchor="t"/>
+          <a:lstStyle/>
+          <a:p>
+            <a:pPr algn="ctr"/>
+            <a:endParaRPr lang="en-US" sz="2799" b="1" dirty="0">
+              <a:solidFill>
+                <a:srgbClr val="FBEEDC"/>
+              </a:solidFill>
+              <a:effectLst>
+                <a:outerShdw blurRad="38100" dist="38100" dir="2700000" algn="tl">
+                  <a:srgbClr val="000000">
+                    <a:alpha val="43137"/>
+                  </a:srgbClr>
+                </a:outerShdw>
+              </a:effectLst>
+              <a:latin typeface="Consolas" panose="020B0609020204030204" pitchFamily="49" charset="0"/>
+            </a:endParaRPr>
+          </a:p>
+        </p:txBody>
+      </p:sp>
+      <p:sp>
+        <p:nvSpPr>
+          <p:cNvPr id="12" name="Rectangle: Rounded Corners 17">
+            <a:extLst>
+              <a:ext uri="{FF2B5EF4-FFF2-40B4-BE49-F238E27FC236}">
+                <a16:creationId xmlns:a16="http://schemas.microsoft.com/office/drawing/2014/main" id="{1EDE7215-4001-DDC0-8AF1-6E159C3AF5C4}"/>
+              </a:ext>
+            </a:extLst>
+          </p:cNvPr>
+          <p:cNvSpPr/>
+          <p:nvPr/>
+        </p:nvSpPr>
+        <p:spPr>
+          <a:xfrm>
+            <a:off x="9606000" y="1570692"/>
+            <a:ext cx="1485000" cy="304800"/>
+          </a:xfrm>
+          <a:prstGeom prst="roundRect">
+            <a:avLst>
+              <a:gd name="adj" fmla="val 5385"/>
+            </a:avLst>
+          </a:prstGeom>
+          <a:noFill/>
+          <a:ln w="57150">
+            <a:solidFill>
+              <a:schemeClr val="tx1"/>
+            </a:solidFill>
+            <a:prstDash val="solid"/>
+          </a:ln>
+        </p:spPr>
+        <p:style>
+          <a:lnRef idx="2">
+            <a:schemeClr val="accent1">
+              <a:shade val="50000"/>
+            </a:schemeClr>
+          </a:lnRef>
+          <a:fillRef idx="1">
+            <a:schemeClr val="accent1"/>
+          </a:fillRef>
+          <a:effectRef idx="0">
+            <a:schemeClr val="accent1"/>
+          </a:effectRef>
+          <a:fontRef idx="minor">
+            <a:schemeClr val="lt1"/>
+          </a:fontRef>
+        </p:style>
+        <p:txBody>
+          <a:bodyPr rtlCol="0" anchor="t"/>
+          <a:lstStyle/>
+          <a:p>
+            <a:pPr algn="ctr"/>
+            <a:endParaRPr lang="en-US" sz="2799" b="1" dirty="0">
+              <a:solidFill>
+                <a:srgbClr val="FBEEDC"/>
+              </a:solidFill>
+              <a:effectLst>
+                <a:outerShdw blurRad="38100" dist="38100" dir="2700000" algn="tl">
+                  <a:srgbClr val="000000">
+                    <a:alpha val="43137"/>
+                  </a:srgbClr>
+                </a:outerShdw>
+              </a:effectLst>
+              <a:latin typeface="Consolas" panose="020B0609020204030204" pitchFamily="49" charset="0"/>
+            </a:endParaRPr>
+          </a:p>
+        </p:txBody>
+      </p:sp>
+      <p:pic>
+        <p:nvPicPr>
+          <p:cNvPr id="14" name="Picture 13">
+            <a:extLst>
+              <a:ext uri="{FF2B5EF4-FFF2-40B4-BE49-F238E27FC236}">
+                <a16:creationId xmlns:a16="http://schemas.microsoft.com/office/drawing/2014/main" id="{7AFDE60B-731D-6102-0B31-CDECF27798B9}"/>
+              </a:ext>
+            </a:extLst>
+          </p:cNvPr>
+          <p:cNvPicPr>
+            <a:picLocks noChangeAspect="1"/>
+          </p:cNvPicPr>
+          <p:nvPr/>
+        </p:nvPicPr>
+        <p:blipFill>
+          <a:blip r:embed="rId5"/>
+          <a:stretch>
+            <a:fillRect/>
+          </a:stretch>
+        </p:blipFill>
+        <p:spPr>
+          <a:xfrm>
+            <a:off x="1911000" y="4419000"/>
+            <a:ext cx="4259980" cy="1953000"/>
           </a:xfrm>
           <a:prstGeom prst="rect">
             <a:avLst/>
@@ -12513,86 +13015,10 @@
           </a:ln>
         </p:spPr>
       </p:pic>
-      <p:sp>
-        <p:nvSpPr>
-          <p:cNvPr id="9" name="Arrow: Down 8">
-            <a:extLst>
-              <a:ext uri="{FF2B5EF4-FFF2-40B4-BE49-F238E27FC236}">
-                <a16:creationId xmlns:a16="http://schemas.microsoft.com/office/drawing/2014/main" id="{F7236181-A7FC-6311-030F-2C5462827DBD}"/>
-              </a:ext>
-            </a:extLst>
-          </p:cNvPr>
-          <p:cNvSpPr/>
-          <p:nvPr/>
-        </p:nvSpPr>
-        <p:spPr bwMode="auto">
-          <a:xfrm>
-            <a:off x="5983499" y="3114000"/>
-            <a:ext cx="225000" cy="315000"/>
-          </a:xfrm>
-          <a:prstGeom prst="downArrow">
-            <a:avLst/>
-          </a:prstGeom>
-          <a:solidFill>
-            <a:schemeClr val="dk2">
-              <a:alpha val="80000"/>
-            </a:schemeClr>
-          </a:solidFill>
-          <a:ln w="19050">
-            <a:solidFill>
-              <a:schemeClr val="tx1">
-                <a:lumMod val="75000"/>
-                <a:alpha val="80000"/>
-              </a:schemeClr>
-            </a:solidFill>
-          </a:ln>
-          <a:effectLst/>
-        </p:spPr>
-        <p:style>
-          <a:lnRef idx="2">
-            <a:schemeClr val="accent1">
-              <a:shade val="50000"/>
-            </a:schemeClr>
-          </a:lnRef>
-          <a:fillRef idx="1001">
-            <a:schemeClr val="dk2"/>
-          </a:fillRef>
-          <a:effectRef idx="0">
-            <a:schemeClr val="accent1"/>
-          </a:effectRef>
-          <a:fontRef idx="minor">
-            <a:schemeClr val="lt1"/>
-          </a:fontRef>
-        </p:style>
-        <p:txBody>
-          <a:bodyPr rot="0" spcFirstLastPara="0" vertOverflow="overflow" horzOverflow="overflow" vert="horz" wrap="square" lIns="91440" tIns="45720" rIns="91440" bIns="45720" numCol="1" spcCol="0" rtlCol="0" fromWordArt="0" anchor="ctr" anchorCtr="0" forceAA="0" compatLnSpc="1">
-            <a:prstTxWarp prst="textNoShape">
-              <a:avLst/>
-            </a:prstTxWarp>
-            <a:noAutofit/>
-          </a:bodyPr>
-          <a:lstStyle/>
-          <a:p>
-            <a:pPr algn="ctr"/>
-            <a:endParaRPr lang="en-US" sz="2800" b="1" dirty="0">
-              <a:solidFill>
-                <a:srgbClr val="FFFFFF"/>
-              </a:solidFill>
-              <a:effectLst>
-                <a:outerShdw blurRad="38100" dist="38100" dir="2700000" algn="tl">
-                  <a:srgbClr val="000000">
-                    <a:alpha val="43137"/>
-                  </a:srgbClr>
-                </a:outerShdw>
-              </a:effectLst>
-            </a:endParaRPr>
-          </a:p>
-        </p:txBody>
-      </p:sp>
     </p:spTree>
     <p:extLst>
       <p:ext uri="{BB962C8B-B14F-4D97-AF65-F5344CB8AC3E}">
-        <p14:creationId xmlns:p14="http://schemas.microsoft.com/office/powerpoint/2010/main" val="3675393052"/>
+        <p14:creationId xmlns:p14="http://schemas.microsoft.com/office/powerpoint/2010/main" val="3719980113"/>
       </p:ext>
     </p:extLst>
   </p:cSld>
@@ -12607,6 +13033,264 @@
       <p:transition spd="slow" advClick="0" advTm="5000"/>
     </mc:Fallback>
   </mc:AlternateContent>
+  <p:timing>
+    <p:tnLst>
+      <p:par>
+        <p:cTn id="1" dur="indefinite" restart="never" nodeType="tmRoot">
+          <p:childTnLst>
+            <p:seq concurrent="1" nextAc="seek">
+              <p:cTn id="2" dur="indefinite" nodeType="mainSeq">
+                <p:childTnLst>
+                  <p:par>
+                    <p:cTn id="3" fill="hold">
+                      <p:stCondLst>
+                        <p:cond delay="indefinite"/>
+                      </p:stCondLst>
+                      <p:childTnLst>
+                        <p:par>
+                          <p:cTn id="4" fill="hold">
+                            <p:stCondLst>
+                              <p:cond delay="0"/>
+                            </p:stCondLst>
+                            <p:childTnLst>
+                              <p:par>
+                                <p:cTn id="5" presetID="1" presetClass="entr" presetSubtype="0" fill="hold" grpId="0" nodeType="clickEffect">
+                                  <p:stCondLst>
+                                    <p:cond delay="0"/>
+                                  </p:stCondLst>
+                                  <p:childTnLst>
+                                    <p:set>
+                                      <p:cBhvr>
+                                        <p:cTn id="6" dur="1" fill="hold">
+                                          <p:stCondLst>
+                                            <p:cond delay="0"/>
+                                          </p:stCondLst>
+                                        </p:cTn>
+                                        <p:tgtEl>
+                                          <p:spTgt spid="11"/>
+                                        </p:tgtEl>
+                                        <p:attrNameLst>
+                                          <p:attrName>style.visibility</p:attrName>
+                                        </p:attrNameLst>
+                                      </p:cBhvr>
+                                      <p:to>
+                                        <p:strVal val="visible"/>
+                                      </p:to>
+                                    </p:set>
+                                  </p:childTnLst>
+                                </p:cTn>
+                              </p:par>
+                              <p:par>
+                                <p:cTn id="7" presetID="1" presetClass="entr" presetSubtype="0" fill="hold" grpId="0" nodeType="withEffect">
+                                  <p:stCondLst>
+                                    <p:cond delay="0"/>
+                                  </p:stCondLst>
+                                  <p:childTnLst>
+                                    <p:set>
+                                      <p:cBhvr>
+                                        <p:cTn id="8" dur="1" fill="hold">
+                                          <p:stCondLst>
+                                            <p:cond delay="0"/>
+                                          </p:stCondLst>
+                                        </p:cTn>
+                                        <p:tgtEl>
+                                          <p:spTgt spid="12"/>
+                                        </p:tgtEl>
+                                        <p:attrNameLst>
+                                          <p:attrName>style.visibility</p:attrName>
+                                        </p:attrNameLst>
+                                      </p:cBhvr>
+                                      <p:to>
+                                        <p:strVal val="visible"/>
+                                      </p:to>
+                                    </p:set>
+                                  </p:childTnLst>
+                                </p:cTn>
+                              </p:par>
+                            </p:childTnLst>
+                          </p:cTn>
+                        </p:par>
+                      </p:childTnLst>
+                    </p:cTn>
+                  </p:par>
+                  <p:par>
+                    <p:cTn id="9" fill="hold">
+                      <p:stCondLst>
+                        <p:cond delay="indefinite"/>
+                      </p:stCondLst>
+                      <p:childTnLst>
+                        <p:par>
+                          <p:cTn id="10" fill="hold">
+                            <p:stCondLst>
+                              <p:cond delay="0"/>
+                            </p:stCondLst>
+                            <p:childTnLst>
+                              <p:par>
+                                <p:cTn id="11" presetID="1" presetClass="entr" presetSubtype="0" fill="hold" nodeType="clickEffect">
+                                  <p:stCondLst>
+                                    <p:cond delay="0"/>
+                                  </p:stCondLst>
+                                  <p:childTnLst>
+                                    <p:set>
+                                      <p:cBhvr>
+                                        <p:cTn id="12" dur="1" fill="hold">
+                                          <p:stCondLst>
+                                            <p:cond delay="0"/>
+                                          </p:stCondLst>
+                                        </p:cTn>
+                                        <p:tgtEl>
+                                          <p:spTgt spid="3">
+                                            <p:txEl>
+                                              <p:pRg st="1" end="1"/>
+                                            </p:txEl>
+                                          </p:spTgt>
+                                        </p:tgtEl>
+                                        <p:attrNameLst>
+                                          <p:attrName>style.visibility</p:attrName>
+                                        </p:attrNameLst>
+                                      </p:cBhvr>
+                                      <p:to>
+                                        <p:strVal val="visible"/>
+                                      </p:to>
+                                    </p:set>
+                                  </p:childTnLst>
+                                </p:cTn>
+                              </p:par>
+                              <p:par>
+                                <p:cTn id="13" presetID="1" presetClass="entr" presetSubtype="0" fill="hold" nodeType="withEffect">
+                                  <p:stCondLst>
+                                    <p:cond delay="0"/>
+                                  </p:stCondLst>
+                                  <p:childTnLst>
+                                    <p:set>
+                                      <p:cBhvr>
+                                        <p:cTn id="14" dur="1" fill="hold">
+                                          <p:stCondLst>
+                                            <p:cond delay="0"/>
+                                          </p:stCondLst>
+                                        </p:cTn>
+                                        <p:tgtEl>
+                                          <p:spTgt spid="8"/>
+                                        </p:tgtEl>
+                                        <p:attrNameLst>
+                                          <p:attrName>style.visibility</p:attrName>
+                                        </p:attrNameLst>
+                                      </p:cBhvr>
+                                      <p:to>
+                                        <p:strVal val="visible"/>
+                                      </p:to>
+                                    </p:set>
+                                  </p:childTnLst>
+                                </p:cTn>
+                              </p:par>
+                            </p:childTnLst>
+                          </p:cTn>
+                        </p:par>
+                      </p:childTnLst>
+                    </p:cTn>
+                  </p:par>
+                  <p:par>
+                    <p:cTn id="15" fill="hold">
+                      <p:stCondLst>
+                        <p:cond delay="indefinite"/>
+                      </p:stCondLst>
+                      <p:childTnLst>
+                        <p:par>
+                          <p:cTn id="16" fill="hold">
+                            <p:stCondLst>
+                              <p:cond delay="0"/>
+                            </p:stCondLst>
+                            <p:childTnLst>
+                              <p:par>
+                                <p:cTn id="17" presetID="1" presetClass="entr" presetSubtype="0" fill="hold" nodeType="clickEffect">
+                                  <p:stCondLst>
+                                    <p:cond delay="0"/>
+                                  </p:stCondLst>
+                                  <p:childTnLst>
+                                    <p:set>
+                                      <p:cBhvr>
+                                        <p:cTn id="18" dur="1" fill="hold">
+                                          <p:stCondLst>
+                                            <p:cond delay="0"/>
+                                          </p:stCondLst>
+                                        </p:cTn>
+                                        <p:tgtEl>
+                                          <p:spTgt spid="3">
+                                            <p:txEl>
+                                              <p:pRg st="2" end="2"/>
+                                            </p:txEl>
+                                          </p:spTgt>
+                                        </p:tgtEl>
+                                        <p:attrNameLst>
+                                          <p:attrName>style.visibility</p:attrName>
+                                        </p:attrNameLst>
+                                      </p:cBhvr>
+                                      <p:to>
+                                        <p:strVal val="visible"/>
+                                      </p:to>
+                                    </p:set>
+                                  </p:childTnLst>
+                                </p:cTn>
+                              </p:par>
+                              <p:par>
+                                <p:cTn id="19" presetID="1" presetClass="entr" presetSubtype="0" fill="hold" nodeType="withEffect">
+                                  <p:stCondLst>
+                                    <p:cond delay="0"/>
+                                  </p:stCondLst>
+                                  <p:childTnLst>
+                                    <p:set>
+                                      <p:cBhvr>
+                                        <p:cTn id="20" dur="1" fill="hold">
+                                          <p:stCondLst>
+                                            <p:cond delay="0"/>
+                                          </p:stCondLst>
+                                        </p:cTn>
+                                        <p:tgtEl>
+                                          <p:spTgt spid="14"/>
+                                        </p:tgtEl>
+                                        <p:attrNameLst>
+                                          <p:attrName>style.visibility</p:attrName>
+                                        </p:attrNameLst>
+                                      </p:cBhvr>
+                                      <p:to>
+                                        <p:strVal val="visible"/>
+                                      </p:to>
+                                    </p:set>
+                                  </p:childTnLst>
+                                </p:cTn>
+                              </p:par>
+                            </p:childTnLst>
+                          </p:cTn>
+                        </p:par>
+                      </p:childTnLst>
+                    </p:cTn>
+                  </p:par>
+                </p:childTnLst>
+              </p:cTn>
+              <p:prevCondLst>
+                <p:cond evt="onPrev" delay="0">
+                  <p:tgtEl>
+                    <p:sldTgt/>
+                  </p:tgtEl>
+                </p:cond>
+              </p:prevCondLst>
+              <p:nextCondLst>
+                <p:cond evt="onNext" delay="0">
+                  <p:tgtEl>
+                    <p:sldTgt/>
+                  </p:tgtEl>
+                </p:cond>
+              </p:nextCondLst>
+            </p:seq>
+          </p:childTnLst>
+        </p:cTn>
+      </p:par>
+    </p:tnLst>
+    <p:bldLst>
+      <p:bldP spid="11" grpId="0" animBg="1"/>
+      <p:bldP spid="12" grpId="0" animBg="1"/>
+    </p:bldLst>
+  </p:timing>
 </p:sld>
 </file>
 
@@ -12684,14 +13368,34 @@
             </a:pPr>
             <a:r>
               <a:rPr lang="bg-BG" dirty="0"/>
-              <a:t>Създаване на таблици и </a:t>
+              <a:t>Създаване на </a:t>
+            </a:r>
+            <a:r>
+              <a:rPr lang="bg-BG" b="1" dirty="0">
+                <a:solidFill>
+                  <a:schemeClr val="bg1"/>
+                </a:solidFill>
+              </a:rPr>
+              <a:t>таблици</a:t>
+            </a:r>
+            <a:r>
+              <a:rPr lang="bg-BG" dirty="0"/>
+              <a:t> и </a:t>
             </a:r>
             <a:br>
               <a:rPr lang="bg-BG" dirty="0"/>
             </a:br>
             <a:r>
               <a:rPr lang="bg-BG" dirty="0"/>
-              <a:t>попълване на данни</a:t>
+              <a:t>попълване на </a:t>
+            </a:r>
+            <a:r>
+              <a:rPr lang="bg-BG" b="1" dirty="0">
+                <a:solidFill>
+                  <a:schemeClr val="bg1"/>
+                </a:solidFill>
+              </a:rPr>
+              <a:t>данни</a:t>
             </a:r>
           </a:p>
           <a:p>
@@ -13261,6 +13965,739 @@
           <a:chExt cx="0" cy="0"/>
         </a:xfrm>
       </p:grpSpPr>
+      <p:sp>
+        <p:nvSpPr>
+          <p:cNvPr id="2" name="Slide Number Placeholder 1">
+            <a:extLst>
+              <a:ext uri="{FF2B5EF4-FFF2-40B4-BE49-F238E27FC236}">
+                <a16:creationId xmlns:a16="http://schemas.microsoft.com/office/drawing/2014/main" id="{811D4260-FBEB-AF12-2311-E0ACFEA507C0}"/>
+              </a:ext>
+            </a:extLst>
+          </p:cNvPr>
+          <p:cNvSpPr>
+            <a:spLocks noGrp="1"/>
+          </p:cNvSpPr>
+          <p:nvPr>
+            <p:ph type="sldNum" sz="quarter" idx="5"/>
+          </p:nvPr>
+        </p:nvSpPr>
+        <p:spPr>
+          <a:xfrm>
+            <a:off x="11753030" y="6507000"/>
+            <a:ext cx="367414" cy="297000"/>
+          </a:xfrm>
+        </p:spPr>
+        <p:txBody>
+          <a:bodyPr/>
+          <a:lstStyle/>
+          <a:p>
+            <a:fld id="{2BF067CD-8E6B-4360-9AA8-C5DF2A48A6D1}" type="slidenum">
+              <a:rPr lang="en-US" noProof="0" smtClean="0"/>
+              <a:pPr/>
+              <a:t>20</a:t>
+            </a:fld>
+            <a:endParaRPr lang="en-US" noProof="0" dirty="0"/>
+          </a:p>
+        </p:txBody>
+      </p:sp>
+      <p:sp>
+        <p:nvSpPr>
+          <p:cNvPr id="21" name="Text Placeholder 20">
+            <a:extLst>
+              <a:ext uri="{FF2B5EF4-FFF2-40B4-BE49-F238E27FC236}">
+                <a16:creationId xmlns:a16="http://schemas.microsoft.com/office/drawing/2014/main" id="{D64AA654-557D-8DB6-5CE1-8EEDACD326D4}"/>
+              </a:ext>
+            </a:extLst>
+          </p:cNvPr>
+          <p:cNvSpPr>
+            <a:spLocks noGrp="1"/>
+          </p:cNvSpPr>
+          <p:nvPr>
+            <p:ph type="body" sz="quarter" idx="10"/>
+          </p:nvPr>
+        </p:nvSpPr>
+        <p:spPr>
+          <a:xfrm>
+            <a:off x="190402" y="1196125"/>
+            <a:ext cx="11987118" cy="5607838"/>
+          </a:xfrm>
+        </p:spPr>
+        <p:txBody>
+          <a:bodyPr/>
+          <a:lstStyle/>
+          <a:p>
+            <a:r>
+              <a:rPr lang="bg-BG" dirty="0"/>
+              <a:t>Задържаме с левия бутон върху колоната </a:t>
+            </a:r>
+            <a:r>
+              <a:rPr lang="en-US" b="1" dirty="0"/>
+              <a:t>Town</a:t>
+            </a:r>
+            <a:r>
+              <a:rPr lang="en-US" dirty="0"/>
+              <a:t> </a:t>
+            </a:r>
+            <a:r>
+              <a:rPr lang="bg-BG" dirty="0"/>
+              <a:t>от таблицата </a:t>
+            </a:r>
+            <a:r>
+              <a:rPr lang="en-US" b="1" dirty="0"/>
+              <a:t>Students</a:t>
+            </a:r>
+          </a:p>
+          <a:p>
+            <a:r>
+              <a:rPr lang="bg-BG" dirty="0"/>
+              <a:t>След това я </a:t>
+            </a:r>
+            <a:r>
+              <a:rPr lang="bg-BG" b="1" dirty="0"/>
+              <a:t>местим</a:t>
+            </a:r>
+            <a:r>
+              <a:rPr lang="bg-BG" dirty="0"/>
+              <a:t> и я </a:t>
+            </a:r>
+            <a:r>
+              <a:rPr lang="bg-BG" b="1" dirty="0"/>
+              <a:t>поставяме</a:t>
+            </a:r>
+            <a:r>
+              <a:rPr lang="bg-BG" dirty="0"/>
+              <a:t> върху колоната</a:t>
+            </a:r>
+            <a:r>
+              <a:rPr lang="en-US" dirty="0"/>
+              <a:t> </a:t>
+            </a:r>
+            <a:r>
+              <a:rPr lang="en-US" b="1" dirty="0"/>
+              <a:t>ID</a:t>
+            </a:r>
+            <a:r>
+              <a:rPr lang="bg-BG" dirty="0"/>
+              <a:t> </a:t>
+            </a:r>
+            <a:endParaRPr lang="en-US" dirty="0"/>
+          </a:p>
+        </p:txBody>
+      </p:sp>
+      <p:sp>
+        <p:nvSpPr>
+          <p:cNvPr id="4" name="Title 3">
+            <a:extLst>
+              <a:ext uri="{FF2B5EF4-FFF2-40B4-BE49-F238E27FC236}">
+                <a16:creationId xmlns:a16="http://schemas.microsoft.com/office/drawing/2014/main" id="{FEBBE443-695E-9235-55B1-8A8E81E6FFFB}"/>
+              </a:ext>
+            </a:extLst>
+          </p:cNvPr>
+          <p:cNvSpPr>
+            <a:spLocks noGrp="1"/>
+          </p:cNvSpPr>
+          <p:nvPr>
+            <p:ph type="title"/>
+          </p:nvPr>
+        </p:nvSpPr>
+        <p:spPr>
+          <a:xfrm>
+            <a:off x="190406" y="100750"/>
+            <a:ext cx="10270594" cy="882654"/>
+          </a:xfrm>
+        </p:spPr>
+        <p:txBody>
+          <a:bodyPr/>
+          <a:lstStyle/>
+          <a:p>
+            <a:r>
+              <a:rPr lang="bg-BG" dirty="0"/>
+              <a:t>Връзка между таблици (2)</a:t>
+            </a:r>
+            <a:endParaRPr lang="en-US" dirty="0"/>
+          </a:p>
+        </p:txBody>
+      </p:sp>
+      <p:pic>
+        <p:nvPicPr>
+          <p:cNvPr id="23" name="Picture 22">
+            <a:extLst>
+              <a:ext uri="{FF2B5EF4-FFF2-40B4-BE49-F238E27FC236}">
+                <a16:creationId xmlns:a16="http://schemas.microsoft.com/office/drawing/2014/main" id="{F4FFDDCC-7862-F4E9-7E79-058E923E476D}"/>
+              </a:ext>
+            </a:extLst>
+          </p:cNvPr>
+          <p:cNvPicPr>
+            <a:picLocks noChangeAspect="1"/>
+          </p:cNvPicPr>
+          <p:nvPr/>
+        </p:nvPicPr>
+        <p:blipFill>
+          <a:blip r:embed="rId3"/>
+          <a:stretch>
+            <a:fillRect/>
+          </a:stretch>
+        </p:blipFill>
+        <p:spPr>
+          <a:xfrm>
+            <a:off x="3571746" y="3744000"/>
+            <a:ext cx="5224430" cy="2385384"/>
+          </a:xfrm>
+          <a:prstGeom prst="rect">
+            <a:avLst/>
+          </a:prstGeom>
+          <a:ln>
+            <a:solidFill>
+              <a:schemeClr val="bg2">
+                <a:lumMod val="75000"/>
+              </a:schemeClr>
+            </a:solidFill>
+          </a:ln>
+        </p:spPr>
+      </p:pic>
+      <p:sp>
+        <p:nvSpPr>
+          <p:cNvPr id="24" name="Rectangle: Rounded Corners 17">
+            <a:extLst>
+              <a:ext uri="{FF2B5EF4-FFF2-40B4-BE49-F238E27FC236}">
+                <a16:creationId xmlns:a16="http://schemas.microsoft.com/office/drawing/2014/main" id="{DF8410F3-A989-F1F7-A0BC-31DEBC51509A}"/>
+              </a:ext>
+            </a:extLst>
+          </p:cNvPr>
+          <p:cNvSpPr/>
+          <p:nvPr/>
+        </p:nvSpPr>
+        <p:spPr>
+          <a:xfrm>
+            <a:off x="3891000" y="5647434"/>
+            <a:ext cx="1530000" cy="315000"/>
+          </a:xfrm>
+          <a:prstGeom prst="roundRect">
+            <a:avLst>
+              <a:gd name="adj" fmla="val 5385"/>
+            </a:avLst>
+          </a:prstGeom>
+          <a:noFill/>
+          <a:ln w="57150">
+            <a:solidFill>
+              <a:schemeClr val="tx1"/>
+            </a:solidFill>
+            <a:prstDash val="solid"/>
+          </a:ln>
+        </p:spPr>
+        <p:style>
+          <a:lnRef idx="2">
+            <a:schemeClr val="accent1">
+              <a:shade val="50000"/>
+            </a:schemeClr>
+          </a:lnRef>
+          <a:fillRef idx="1">
+            <a:schemeClr val="accent1"/>
+          </a:fillRef>
+          <a:effectRef idx="0">
+            <a:schemeClr val="accent1"/>
+          </a:effectRef>
+          <a:fontRef idx="minor">
+            <a:schemeClr val="lt1"/>
+          </a:fontRef>
+        </p:style>
+        <p:txBody>
+          <a:bodyPr rtlCol="0" anchor="t"/>
+          <a:lstStyle/>
+          <a:p>
+            <a:pPr algn="ctr"/>
+            <a:endParaRPr lang="en-US" sz="2799" b="1" dirty="0">
+              <a:solidFill>
+                <a:srgbClr val="FBEEDC"/>
+              </a:solidFill>
+              <a:effectLst>
+                <a:outerShdw blurRad="38100" dist="38100" dir="2700000" algn="tl">
+                  <a:srgbClr val="000000">
+                    <a:alpha val="43137"/>
+                  </a:srgbClr>
+                </a:outerShdw>
+              </a:effectLst>
+              <a:latin typeface="Consolas" panose="020B0609020204030204" pitchFamily="49" charset="0"/>
+            </a:endParaRPr>
+          </a:p>
+        </p:txBody>
+      </p:sp>
+      <p:sp>
+        <p:nvSpPr>
+          <p:cNvPr id="25" name="Rectangle: Rounded Corners 17">
+            <a:extLst>
+              <a:ext uri="{FF2B5EF4-FFF2-40B4-BE49-F238E27FC236}">
+                <a16:creationId xmlns:a16="http://schemas.microsoft.com/office/drawing/2014/main" id="{D9182FFD-CF56-C425-2224-CDBD29F018EB}"/>
+              </a:ext>
+            </a:extLst>
+          </p:cNvPr>
+          <p:cNvSpPr/>
+          <p:nvPr/>
+        </p:nvSpPr>
+        <p:spPr>
+          <a:xfrm>
+            <a:off x="6726000" y="4329000"/>
+            <a:ext cx="945000" cy="270000"/>
+          </a:xfrm>
+          <a:prstGeom prst="roundRect">
+            <a:avLst>
+              <a:gd name="adj" fmla="val 5385"/>
+            </a:avLst>
+          </a:prstGeom>
+          <a:noFill/>
+          <a:ln w="57150">
+            <a:solidFill>
+              <a:schemeClr val="tx1"/>
+            </a:solidFill>
+            <a:prstDash val="solid"/>
+          </a:ln>
+        </p:spPr>
+        <p:style>
+          <a:lnRef idx="2">
+            <a:schemeClr val="accent1">
+              <a:shade val="50000"/>
+            </a:schemeClr>
+          </a:lnRef>
+          <a:fillRef idx="1">
+            <a:schemeClr val="accent1"/>
+          </a:fillRef>
+          <a:effectRef idx="0">
+            <a:schemeClr val="accent1"/>
+          </a:effectRef>
+          <a:fontRef idx="minor">
+            <a:schemeClr val="lt1"/>
+          </a:fontRef>
+        </p:style>
+        <p:txBody>
+          <a:bodyPr rtlCol="0" anchor="t"/>
+          <a:lstStyle/>
+          <a:p>
+            <a:pPr algn="ctr"/>
+            <a:endParaRPr lang="en-US" sz="2799" b="1" dirty="0">
+              <a:solidFill>
+                <a:srgbClr val="FBEEDC"/>
+              </a:solidFill>
+              <a:effectLst>
+                <a:outerShdw blurRad="38100" dist="38100" dir="2700000" algn="tl">
+                  <a:srgbClr val="000000">
+                    <a:alpha val="43137"/>
+                  </a:srgbClr>
+                </a:outerShdw>
+              </a:effectLst>
+              <a:latin typeface="Consolas" panose="020B0609020204030204" pitchFamily="49" charset="0"/>
+            </a:endParaRPr>
+          </a:p>
+        </p:txBody>
+      </p:sp>
+    </p:spTree>
+    <p:extLst>
+      <p:ext uri="{BB962C8B-B14F-4D97-AF65-F5344CB8AC3E}">
+        <p14:creationId xmlns:p14="http://schemas.microsoft.com/office/powerpoint/2010/main" val="2927030063"/>
+      </p:ext>
+    </p:extLst>
+  </p:cSld>
+  <p:clrMapOvr>
+    <a:masterClrMapping/>
+  </p:clrMapOvr>
+  <mc:AlternateContent xmlns:mc="http://schemas.openxmlformats.org/markup-compatibility/2006" xmlns:p14="http://schemas.microsoft.com/office/powerpoint/2010/main">
+    <mc:Choice Requires="p14">
+      <p:transition spd="slow" p14:dur="2000" advClick="0" advTm="5000"/>
+    </mc:Choice>
+    <mc:Fallback xmlns="">
+      <p:transition spd="slow" advClick="0" advTm="5000"/>
+    </mc:Fallback>
+  </mc:AlternateContent>
+  <p:timing>
+    <p:tnLst>
+      <p:par>
+        <p:cTn id="1" dur="indefinite" restart="never" nodeType="tmRoot">
+          <p:childTnLst>
+            <p:seq concurrent="1" nextAc="seek">
+              <p:cTn id="2" dur="indefinite" nodeType="mainSeq">
+                <p:childTnLst>
+                  <p:par>
+                    <p:cTn id="3" fill="hold">
+                      <p:stCondLst>
+                        <p:cond delay="indefinite"/>
+                      </p:stCondLst>
+                      <p:childTnLst>
+                        <p:par>
+                          <p:cTn id="4" fill="hold">
+                            <p:stCondLst>
+                              <p:cond delay="0"/>
+                            </p:stCondLst>
+                            <p:childTnLst>
+                              <p:par>
+                                <p:cTn id="5" presetID="1" presetClass="entr" presetSubtype="0" fill="hold" grpId="0" nodeType="clickEffect">
+                                  <p:stCondLst>
+                                    <p:cond delay="0"/>
+                                  </p:stCondLst>
+                                  <p:childTnLst>
+                                    <p:set>
+                                      <p:cBhvr>
+                                        <p:cTn id="6" dur="1" fill="hold">
+                                          <p:stCondLst>
+                                            <p:cond delay="0"/>
+                                          </p:stCondLst>
+                                        </p:cTn>
+                                        <p:tgtEl>
+                                          <p:spTgt spid="24"/>
+                                        </p:tgtEl>
+                                        <p:attrNameLst>
+                                          <p:attrName>style.visibility</p:attrName>
+                                        </p:attrNameLst>
+                                      </p:cBhvr>
+                                      <p:to>
+                                        <p:strVal val="visible"/>
+                                      </p:to>
+                                    </p:set>
+                                  </p:childTnLst>
+                                </p:cTn>
+                              </p:par>
+                            </p:childTnLst>
+                          </p:cTn>
+                        </p:par>
+                      </p:childTnLst>
+                    </p:cTn>
+                  </p:par>
+                  <p:par>
+                    <p:cTn id="7" fill="hold">
+                      <p:stCondLst>
+                        <p:cond delay="indefinite"/>
+                      </p:stCondLst>
+                      <p:childTnLst>
+                        <p:par>
+                          <p:cTn id="8" fill="hold">
+                            <p:stCondLst>
+                              <p:cond delay="0"/>
+                            </p:stCondLst>
+                            <p:childTnLst>
+                              <p:par>
+                                <p:cTn id="9" presetID="1" presetClass="entr" presetSubtype="0" fill="hold" nodeType="clickEffect">
+                                  <p:stCondLst>
+                                    <p:cond delay="0"/>
+                                  </p:stCondLst>
+                                  <p:childTnLst>
+                                    <p:set>
+                                      <p:cBhvr>
+                                        <p:cTn id="10" dur="1" fill="hold">
+                                          <p:stCondLst>
+                                            <p:cond delay="0"/>
+                                          </p:stCondLst>
+                                        </p:cTn>
+                                        <p:tgtEl>
+                                          <p:spTgt spid="21">
+                                            <p:txEl>
+                                              <p:pRg st="1" end="1"/>
+                                            </p:txEl>
+                                          </p:spTgt>
+                                        </p:tgtEl>
+                                        <p:attrNameLst>
+                                          <p:attrName>style.visibility</p:attrName>
+                                        </p:attrNameLst>
+                                      </p:cBhvr>
+                                      <p:to>
+                                        <p:strVal val="visible"/>
+                                      </p:to>
+                                    </p:set>
+                                  </p:childTnLst>
+                                </p:cTn>
+                              </p:par>
+                            </p:childTnLst>
+                          </p:cTn>
+                        </p:par>
+                      </p:childTnLst>
+                    </p:cTn>
+                  </p:par>
+                  <p:par>
+                    <p:cTn id="11" fill="hold">
+                      <p:stCondLst>
+                        <p:cond delay="indefinite"/>
+                      </p:stCondLst>
+                      <p:childTnLst>
+                        <p:par>
+                          <p:cTn id="12" fill="hold">
+                            <p:stCondLst>
+                              <p:cond delay="0"/>
+                            </p:stCondLst>
+                            <p:childTnLst>
+                              <p:par>
+                                <p:cTn id="13" presetID="1" presetClass="entr" presetSubtype="0" fill="hold" grpId="0" nodeType="clickEffect">
+                                  <p:stCondLst>
+                                    <p:cond delay="0"/>
+                                  </p:stCondLst>
+                                  <p:childTnLst>
+                                    <p:set>
+                                      <p:cBhvr>
+                                        <p:cTn id="14" dur="1" fill="hold">
+                                          <p:stCondLst>
+                                            <p:cond delay="0"/>
+                                          </p:stCondLst>
+                                        </p:cTn>
+                                        <p:tgtEl>
+                                          <p:spTgt spid="25"/>
+                                        </p:tgtEl>
+                                        <p:attrNameLst>
+                                          <p:attrName>style.visibility</p:attrName>
+                                        </p:attrNameLst>
+                                      </p:cBhvr>
+                                      <p:to>
+                                        <p:strVal val="visible"/>
+                                      </p:to>
+                                    </p:set>
+                                  </p:childTnLst>
+                                </p:cTn>
+                              </p:par>
+                            </p:childTnLst>
+                          </p:cTn>
+                        </p:par>
+                      </p:childTnLst>
+                    </p:cTn>
+                  </p:par>
+                </p:childTnLst>
+              </p:cTn>
+              <p:prevCondLst>
+                <p:cond evt="onPrev" delay="0">
+                  <p:tgtEl>
+                    <p:sldTgt/>
+                  </p:tgtEl>
+                </p:cond>
+              </p:prevCondLst>
+              <p:nextCondLst>
+                <p:cond evt="onNext" delay="0">
+                  <p:tgtEl>
+                    <p:sldTgt/>
+                  </p:tgtEl>
+                </p:cond>
+              </p:nextCondLst>
+            </p:seq>
+          </p:childTnLst>
+        </p:cTn>
+      </p:par>
+    </p:tnLst>
+    <p:bldLst>
+      <p:bldP spid="24" grpId="0" animBg="1"/>
+      <p:bldP spid="25" grpId="0" animBg="1"/>
+    </p:bldLst>
+  </p:timing>
+</p:sld>
+</file>
+
+<file path=ppt/slides/slide21.xml><?xml version="1.0" encoding="utf-8"?>
+<p:sld xmlns:a="http://schemas.openxmlformats.org/drawingml/2006/main" xmlns:r="http://schemas.openxmlformats.org/officeDocument/2006/relationships" xmlns:p="http://schemas.openxmlformats.org/presentationml/2006/main">
+  <p:cSld>
+    <p:spTree>
+      <p:nvGrpSpPr>
+        <p:cNvPr id="1" name=""/>
+        <p:cNvGrpSpPr/>
+        <p:nvPr/>
+      </p:nvGrpSpPr>
+      <p:grpSpPr>
+        <a:xfrm>
+          <a:off x="0" y="0"/>
+          <a:ext cx="0" cy="0"/>
+          <a:chOff x="0" y="0"/>
+          <a:chExt cx="0" cy="0"/>
+        </a:xfrm>
+      </p:grpSpPr>
+      <p:sp>
+        <p:nvSpPr>
+          <p:cNvPr id="2" name="Slide Number Placeholder 1">
+            <a:extLst>
+              <a:ext uri="{FF2B5EF4-FFF2-40B4-BE49-F238E27FC236}">
+                <a16:creationId xmlns:a16="http://schemas.microsoft.com/office/drawing/2014/main" id="{F9AA9DB2-2E1C-D04E-12DD-CD9D87008507}"/>
+              </a:ext>
+            </a:extLst>
+          </p:cNvPr>
+          <p:cNvSpPr>
+            <a:spLocks noGrp="1"/>
+          </p:cNvSpPr>
+          <p:nvPr>
+            <p:ph type="sldNum" sz="quarter" idx="5"/>
+          </p:nvPr>
+        </p:nvSpPr>
+        <p:spPr>
+          <a:xfrm>
+            <a:off x="11753030" y="6507000"/>
+            <a:ext cx="367414" cy="297000"/>
+          </a:xfrm>
+        </p:spPr>
+        <p:txBody>
+          <a:bodyPr/>
+          <a:lstStyle/>
+          <a:p>
+            <a:fld id="{2BF067CD-8E6B-4360-9AA8-C5DF2A48A6D1}" type="slidenum">
+              <a:rPr lang="en-US" noProof="0" smtClean="0"/>
+              <a:pPr/>
+              <a:t>21</a:t>
+            </a:fld>
+            <a:endParaRPr lang="en-US" noProof="0" dirty="0"/>
+          </a:p>
+        </p:txBody>
+      </p:sp>
+      <p:sp>
+        <p:nvSpPr>
+          <p:cNvPr id="7" name="Text Placeholder 6">
+            <a:extLst>
+              <a:ext uri="{FF2B5EF4-FFF2-40B4-BE49-F238E27FC236}">
+                <a16:creationId xmlns:a16="http://schemas.microsoft.com/office/drawing/2014/main" id="{9F05E7CD-445A-ED9D-80F0-BC4FCC3CB96E}"/>
+              </a:ext>
+            </a:extLst>
+          </p:cNvPr>
+          <p:cNvSpPr>
+            <a:spLocks noGrp="1"/>
+          </p:cNvSpPr>
+          <p:nvPr>
+            <p:ph type="body" sz="quarter" idx="10"/>
+          </p:nvPr>
+        </p:nvSpPr>
+        <p:spPr/>
+        <p:txBody>
+          <a:bodyPr/>
+          <a:lstStyle/>
+          <a:p>
+            <a:pPr>
+              <a:buClr>
+                <a:schemeClr val="tx1"/>
+              </a:buClr>
+            </a:pPr>
+            <a:r>
+              <a:rPr lang="bg-BG" b="1" dirty="0">
+                <a:solidFill>
+                  <a:schemeClr val="bg1"/>
+                </a:solidFill>
+              </a:rPr>
+              <a:t>Връзката</a:t>
+            </a:r>
+            <a:r>
+              <a:rPr lang="bg-BG" dirty="0"/>
+              <a:t> между таблиците се </a:t>
+            </a:r>
+            <a:r>
+              <a:rPr lang="bg-BG" b="1" dirty="0">
+                <a:solidFill>
+                  <a:schemeClr val="bg1"/>
+                </a:solidFill>
+              </a:rPr>
+              <a:t>визуализира</a:t>
+            </a:r>
+            <a:r>
+              <a:rPr lang="bg-BG" dirty="0"/>
+              <a:t>:</a:t>
+            </a:r>
+            <a:endParaRPr lang="en-US" dirty="0"/>
+          </a:p>
+        </p:txBody>
+      </p:sp>
+      <p:sp>
+        <p:nvSpPr>
+          <p:cNvPr id="4" name="Title 3">
+            <a:extLst>
+              <a:ext uri="{FF2B5EF4-FFF2-40B4-BE49-F238E27FC236}">
+                <a16:creationId xmlns:a16="http://schemas.microsoft.com/office/drawing/2014/main" id="{7DD6F817-4FB5-A154-9E70-AEC38B682860}"/>
+              </a:ext>
+            </a:extLst>
+          </p:cNvPr>
+          <p:cNvSpPr>
+            <a:spLocks noGrp="1"/>
+          </p:cNvSpPr>
+          <p:nvPr>
+            <p:ph type="title"/>
+          </p:nvPr>
+        </p:nvSpPr>
+        <p:spPr>
+          <a:xfrm>
+            <a:off x="190406" y="100750"/>
+            <a:ext cx="10270594" cy="882654"/>
+          </a:xfrm>
+        </p:spPr>
+        <p:txBody>
+          <a:bodyPr/>
+          <a:lstStyle/>
+          <a:p>
+            <a:r>
+              <a:rPr lang="bg-BG" dirty="0"/>
+              <a:t>Връзка между таблици (3)</a:t>
+            </a:r>
+            <a:endParaRPr lang="en-US" dirty="0"/>
+          </a:p>
+        </p:txBody>
+      </p:sp>
+      <p:pic>
+        <p:nvPicPr>
+          <p:cNvPr id="8" name="Picture 7">
+            <a:extLst>
+              <a:ext uri="{FF2B5EF4-FFF2-40B4-BE49-F238E27FC236}">
+                <a16:creationId xmlns:a16="http://schemas.microsoft.com/office/drawing/2014/main" id="{CD41D2B0-143D-E5F0-507A-412D31372D23}"/>
+              </a:ext>
+            </a:extLst>
+          </p:cNvPr>
+          <p:cNvPicPr>
+            <a:picLocks noChangeAspect="1"/>
+          </p:cNvPicPr>
+          <p:nvPr/>
+        </p:nvPicPr>
+        <p:blipFill>
+          <a:blip r:embed="rId2"/>
+          <a:stretch>
+            <a:fillRect/>
+          </a:stretch>
+        </p:blipFill>
+        <p:spPr>
+          <a:xfrm>
+            <a:off x="2598774" y="2394000"/>
+            <a:ext cx="6994451" cy="3418233"/>
+          </a:xfrm>
+          <a:prstGeom prst="rect">
+            <a:avLst/>
+          </a:prstGeom>
+          <a:ln>
+            <a:solidFill>
+              <a:schemeClr val="bg2">
+                <a:lumMod val="75000"/>
+              </a:schemeClr>
+            </a:solidFill>
+          </a:ln>
+        </p:spPr>
+      </p:pic>
+    </p:spTree>
+    <p:extLst>
+      <p:ext uri="{BB962C8B-B14F-4D97-AF65-F5344CB8AC3E}">
+        <p14:creationId xmlns:p14="http://schemas.microsoft.com/office/powerpoint/2010/main" val="3675393052"/>
+      </p:ext>
+    </p:extLst>
+  </p:cSld>
+  <p:clrMapOvr>
+    <a:masterClrMapping/>
+  </p:clrMapOvr>
+  <mc:AlternateContent xmlns:mc="http://schemas.openxmlformats.org/markup-compatibility/2006" xmlns:p14="http://schemas.microsoft.com/office/powerpoint/2010/main">
+    <mc:Choice Requires="p14">
+      <p:transition spd="slow" p14:dur="2000" advClick="0" advTm="5000"/>
+    </mc:Choice>
+    <mc:Fallback xmlns="">
+      <p:transition spd="slow" advClick="0" advTm="5000"/>
+    </mc:Fallback>
+  </mc:AlternateContent>
+</p:sld>
+</file>
+
+<file path=ppt/slides/slide22.xml><?xml version="1.0" encoding="utf-8"?>
+<p:sld xmlns:a="http://schemas.openxmlformats.org/drawingml/2006/main" xmlns:r="http://schemas.openxmlformats.org/officeDocument/2006/relationships" xmlns:p="http://schemas.openxmlformats.org/presentationml/2006/main">
+  <p:cSld>
+    <p:spTree>
+      <p:nvGrpSpPr>
+        <p:cNvPr id="1" name=""/>
+        <p:cNvGrpSpPr/>
+        <p:nvPr/>
+      </p:nvGrpSpPr>
+      <p:grpSpPr>
+        <a:xfrm>
+          <a:off x="0" y="0"/>
+          <a:ext cx="0" cy="0"/>
+          <a:chOff x="0" y="0"/>
+          <a:chExt cx="0" cy="0"/>
+        </a:xfrm>
+      </p:grpSpPr>
       <p:pic>
         <p:nvPicPr>
           <p:cNvPr id="3076" name="Picture 4" descr="What Is Considered An External Data Source"/>
@@ -13365,7 +14802,7 @@
 </p:sld>
 </file>
 
-<file path=ppt/slides/slide21.xml><?xml version="1.0" encoding="utf-8"?>
+<file path=ppt/slides/slide23.xml><?xml version="1.0" encoding="utf-8"?>
 <p:sld xmlns:a="http://schemas.openxmlformats.org/drawingml/2006/main" xmlns:r="http://schemas.openxmlformats.org/officeDocument/2006/relationships" xmlns:p="http://schemas.openxmlformats.org/presentationml/2006/main">
   <p:cSld>
     <p:spTree>
@@ -13701,7 +15138,7 @@
             <a:fld id="{2BF067CD-8E6B-4360-9AA8-C5DF2A48A6D1}" type="slidenum">
               <a:rPr lang="en-US" noProof="0" smtClean="0"/>
               <a:pPr/>
-              <a:t>21</a:t>
+              <a:t>23</a:t>
             </a:fld>
             <a:endParaRPr lang="en-US" noProof="0" dirty="0"/>
           </a:p>
@@ -14083,7 +15520,7 @@
 </p:sld>
 </file>
 
-<file path=ppt/slides/slide22.xml><?xml version="1.0" encoding="utf-8"?>
+<file path=ppt/slides/slide24.xml><?xml version="1.0" encoding="utf-8"?>
 <p:sld xmlns:a="http://schemas.openxmlformats.org/drawingml/2006/main" xmlns:r="http://schemas.openxmlformats.org/officeDocument/2006/relationships" xmlns:p="http://schemas.openxmlformats.org/presentationml/2006/main">
   <p:cSld>
     <p:spTree>
@@ -14417,7 +15854,7 @@
             <a:fld id="{2BF067CD-8E6B-4360-9AA8-C5DF2A48A6D1}" type="slidenum">
               <a:rPr lang="en-US" noProof="0" smtClean="0"/>
               <a:pPr/>
-              <a:t>22</a:t>
+              <a:t>24</a:t>
             </a:fld>
             <a:endParaRPr lang="en-US" noProof="0" dirty="0"/>
           </a:p>
@@ -14603,7 +16040,7 @@
 </p:sld>
 </file>
 
-<file path=ppt/slides/slide23.xml><?xml version="1.0" encoding="utf-8"?>
+<file path=ppt/slides/slide25.xml><?xml version="1.0" encoding="utf-8"?>
 <p:sld xmlns:a="http://schemas.openxmlformats.org/drawingml/2006/main" xmlns:r="http://schemas.openxmlformats.org/officeDocument/2006/relationships" xmlns:p="http://schemas.openxmlformats.org/presentationml/2006/main">
   <p:cSld>
     <p:spTree>
@@ -14946,7 +16383,7 @@
             <a:fld id="{2BF067CD-8E6B-4360-9AA8-C5DF2A48A6D1}" type="slidenum">
               <a:rPr lang="en-US" noProof="0" smtClean="0"/>
               <a:pPr/>
-              <a:t>23</a:t>
+              <a:t>25</a:t>
             </a:fld>
             <a:endParaRPr lang="en-US" noProof="0" dirty="0"/>
           </a:p>
@@ -15128,7 +16565,7 @@
 </p:sld>
 </file>
 
-<file path=ppt/slides/slide24.xml><?xml version="1.0" encoding="utf-8"?>
+<file path=ppt/slides/slide26.xml><?xml version="1.0" encoding="utf-8"?>
 <p:sld xmlns:a="http://schemas.openxmlformats.org/drawingml/2006/main" xmlns:r="http://schemas.openxmlformats.org/officeDocument/2006/relationships" xmlns:p="http://schemas.openxmlformats.org/presentationml/2006/main">
   <p:cSld>
     <p:spTree>
@@ -15774,7 +17211,7 @@
             <a:fld id="{2BF067CD-8E6B-4360-9AA8-C5DF2A48A6D1}" type="slidenum">
               <a:rPr lang="en-US" noProof="0" smtClean="0"/>
               <a:pPr/>
-              <a:t>24</a:t>
+              <a:t>26</a:t>
             </a:fld>
             <a:endParaRPr lang="en-US" noProof="0" dirty="0"/>
           </a:p>
@@ -16027,7 +17464,7 @@
 </p:sld>
 </file>
 
-<file path=ppt/slides/slide25.xml><?xml version="1.0" encoding="utf-8"?>
+<file path=ppt/slides/slide27.xml><?xml version="1.0" encoding="utf-8"?>
 <p:sld xmlns:a="http://schemas.openxmlformats.org/drawingml/2006/main" xmlns:r="http://schemas.openxmlformats.org/officeDocument/2006/relationships" xmlns:p="http://schemas.openxmlformats.org/presentationml/2006/main">
   <p:cSld>
     <p:spTree>
@@ -16289,7 +17726,7 @@
             <a:fld id="{2BF067CD-8E6B-4360-9AA8-C5DF2A48A6D1}" type="slidenum">
               <a:rPr lang="en-US" noProof="0" smtClean="0"/>
               <a:pPr/>
-              <a:t>25</a:t>
+              <a:t>27</a:t>
             </a:fld>
             <a:endParaRPr lang="en-US" noProof="0" dirty="0"/>
           </a:p>
@@ -16394,7 +17831,7 @@
 </p:sld>
 </file>
 
-<file path=ppt/slides/slide26.xml><?xml version="1.0" encoding="utf-8"?>
+<file path=ppt/slides/slide28.xml><?xml version="1.0" encoding="utf-8"?>
 <p:sld xmlns:a="http://schemas.openxmlformats.org/drawingml/2006/main" xmlns:r="http://schemas.openxmlformats.org/officeDocument/2006/relationships" xmlns:p="http://schemas.openxmlformats.org/presentationml/2006/main">
   <p:cSld>
     <p:spTree>
@@ -16692,7 +18129,7 @@
             <a:fld id="{2BF067CD-8E6B-4360-9AA8-C5DF2A48A6D1}" type="slidenum">
               <a:rPr lang="en-US" noProof="0" smtClean="0"/>
               <a:pPr/>
-              <a:t>26</a:t>
+              <a:t>28</a:t>
             </a:fld>
             <a:endParaRPr lang="en-US" noProof="0" dirty="0"/>
           </a:p>
@@ -16873,7 +18310,7 @@
 </p:sld>
 </file>
 
-<file path=ppt/slides/slide27.xml><?xml version="1.0" encoding="utf-8"?>
+<file path=ppt/slides/slide29.xml><?xml version="1.0" encoding="utf-8"?>
 <p:sld xmlns:a="http://schemas.openxmlformats.org/drawingml/2006/main" xmlns:r="http://schemas.openxmlformats.org/officeDocument/2006/relationships" xmlns:p="http://schemas.openxmlformats.org/presentationml/2006/main">
   <p:cSld>
     <p:spTree>
@@ -17210,7 +18647,7 @@
             <a:fld id="{2BF067CD-8E6B-4360-9AA8-C5DF2A48A6D1}" type="slidenum">
               <a:rPr lang="en-US" noProof="0" smtClean="0"/>
               <a:pPr/>
-              <a:t>27</a:t>
+              <a:t>29</a:t>
             </a:fld>
             <a:endParaRPr lang="en-US" noProof="0" dirty="0"/>
           </a:p>
@@ -17410,7 +18847,136 @@
 </p:sld>
 </file>
 
-<file path=ppt/slides/slide28.xml><?xml version="1.0" encoding="utf-8"?>
+<file path=ppt/slides/slide3.xml><?xml version="1.0" encoding="utf-8"?>
+<p:sld xmlns:a="http://schemas.openxmlformats.org/drawingml/2006/main" xmlns:r="http://schemas.openxmlformats.org/officeDocument/2006/relationships" xmlns:p="http://schemas.openxmlformats.org/presentationml/2006/main">
+  <p:cSld>
+    <p:spTree>
+      <p:nvGrpSpPr>
+        <p:cNvPr id="1" name=""/>
+        <p:cNvGrpSpPr/>
+        <p:nvPr/>
+      </p:nvGrpSpPr>
+      <p:grpSpPr>
+        <a:xfrm>
+          <a:off x="0" y="0"/>
+          <a:ext cx="0" cy="0"/>
+          <a:chOff x="0" y="0"/>
+          <a:chExt cx="0" cy="0"/>
+        </a:xfrm>
+      </p:grpSpPr>
+      <p:pic>
+        <p:nvPicPr>
+          <p:cNvPr id="4" name="Picture 2" descr="Microsoft Access - Wikipedia"/>
+          <p:cNvPicPr>
+            <a:picLocks noChangeAspect="1" noChangeArrowheads="1"/>
+          </p:cNvPicPr>
+          <p:nvPr/>
+        </p:nvPicPr>
+        <p:blipFill>
+          <a:blip r:embed="rId2" cstate="print"/>
+          <a:srcRect/>
+          <a:stretch>
+            <a:fillRect/>
+          </a:stretch>
+        </p:blipFill>
+        <p:spPr bwMode="auto">
+          <a:xfrm>
+            <a:off x="4666146" y="1447800"/>
+            <a:ext cx="2496654" cy="2438400"/>
+          </a:xfrm>
+          <a:prstGeom prst="rect">
+            <a:avLst/>
+          </a:prstGeom>
+          <a:noFill/>
+          <a:effectLst>
+            <a:glow rad="63500">
+              <a:schemeClr val="accent6">
+                <a:satMod val="175000"/>
+                <a:alpha val="40000"/>
+              </a:schemeClr>
+            </a:glow>
+          </a:effectLst>
+        </p:spPr>
+      </p:pic>
+      <p:sp>
+        <p:nvSpPr>
+          <p:cNvPr id="6" name="Подзаглавие 5">
+            <a:extLst>
+              <a:ext uri="{FF2B5EF4-FFF2-40B4-BE49-F238E27FC236}">
+                <a16:creationId xmlns:a16="http://schemas.microsoft.com/office/drawing/2014/main" id="{D1252222-B017-12B5-E520-4A6ECD688780}"/>
+              </a:ext>
+            </a:extLst>
+          </p:cNvPr>
+          <p:cNvSpPr>
+            <a:spLocks noGrp="1"/>
+          </p:cNvSpPr>
+          <p:nvPr>
+            <p:ph type="subTitle" sz="quarter" idx="11"/>
+          </p:nvPr>
+        </p:nvSpPr>
+        <p:spPr/>
+        <p:txBody>
+          <a:bodyPr/>
+          <a:lstStyle/>
+          <a:p>
+            <a:r>
+              <a:rPr lang="en-US"/>
+              <a:t>MS Access</a:t>
+            </a:r>
+            <a:endParaRPr lang="bg-BG"/>
+          </a:p>
+        </p:txBody>
+      </p:sp>
+      <p:sp>
+        <p:nvSpPr>
+          <p:cNvPr id="8" name="Заглавие 7">
+            <a:extLst>
+              <a:ext uri="{FF2B5EF4-FFF2-40B4-BE49-F238E27FC236}">
+                <a16:creationId xmlns:a16="http://schemas.microsoft.com/office/drawing/2014/main" id="{A20158A9-C0F2-0C69-056B-DB3F3CEE6500}"/>
+              </a:ext>
+            </a:extLst>
+          </p:cNvPr>
+          <p:cNvSpPr>
+            <a:spLocks noGrp="1"/>
+          </p:cNvSpPr>
+          <p:nvPr>
+            <p:ph type="title" sz="quarter" idx="10"/>
+          </p:nvPr>
+        </p:nvSpPr>
+        <p:spPr/>
+        <p:txBody>
+          <a:bodyPr/>
+          <a:lstStyle/>
+          <a:p>
+            <a:r>
+              <a:rPr lang="bg-BG"/>
+              <a:t>Същност и употреба</a:t>
+            </a:r>
+          </a:p>
+        </p:txBody>
+      </p:sp>
+    </p:spTree>
+    <p:extLst>
+      <p:ext uri="{BB962C8B-B14F-4D97-AF65-F5344CB8AC3E}">
+        <p14:creationId xmlns:p14="http://schemas.microsoft.com/office/powerpoint/2010/main" val="149984738"/>
+      </p:ext>
+    </p:extLst>
+  </p:cSld>
+  <p:clrMapOvr>
+    <a:masterClrMapping/>
+  </p:clrMapOvr>
+  <mc:AlternateContent xmlns:mc="http://schemas.openxmlformats.org/markup-compatibility/2006" xmlns:p14="http://schemas.microsoft.com/office/powerpoint/2010/main">
+    <mc:Choice Requires="p14">
+      <p:transition spd="slow" p14:dur="2000" advClick="0" advTm="5000"/>
+    </mc:Choice>
+    <mc:Fallback xmlns="">
+      <p:transition spd="slow" advClick="0" advTm="5000"/>
+    </mc:Fallback>
+  </mc:AlternateContent>
+</p:sld>
+</file>
+
+<file path=ppt/slides/slide30.xml><?xml version="1.0" encoding="utf-8"?>
 <p:sld xmlns:a="http://schemas.openxmlformats.org/drawingml/2006/main" xmlns:r="http://schemas.openxmlformats.org/officeDocument/2006/relationships" xmlns:p="http://schemas.openxmlformats.org/presentationml/2006/main">
   <p:cSld>
     <p:spTree>
@@ -17818,7 +19384,7 @@
             <a:fld id="{2BF067CD-8E6B-4360-9AA8-C5DF2A48A6D1}" type="slidenum">
               <a:rPr lang="en-US" noProof="0" smtClean="0"/>
               <a:pPr/>
-              <a:t>28</a:t>
+              <a:t>30</a:t>
             </a:fld>
             <a:endParaRPr lang="en-US" noProof="0" dirty="0"/>
           </a:p>
@@ -18046,7 +19612,7 @@
 </p:sld>
 </file>
 
-<file path=ppt/slides/slide29.xml><?xml version="1.0" encoding="utf-8"?>
+<file path=ppt/slides/slide31.xml><?xml version="1.0" encoding="utf-8"?>
 <p:sld xmlns:a="http://schemas.openxmlformats.org/drawingml/2006/main" xmlns:r="http://schemas.openxmlformats.org/officeDocument/2006/relationships" xmlns:p="http://schemas.openxmlformats.org/presentationml/2006/main">
   <p:cSld>
     <p:spTree>
@@ -18338,7 +19904,7 @@
             <a:fld id="{2BF067CD-8E6B-4360-9AA8-C5DF2A48A6D1}" type="slidenum">
               <a:rPr lang="en-US" noProof="0" smtClean="0"/>
               <a:pPr/>
-              <a:t>29</a:t>
+              <a:t>31</a:t>
             </a:fld>
             <a:endParaRPr lang="en-US" noProof="0" dirty="0"/>
           </a:p>
@@ -18649,136 +20215,7 @@
 </p:sld>
 </file>
 
-<file path=ppt/slides/slide3.xml><?xml version="1.0" encoding="utf-8"?>
-<p:sld xmlns:a="http://schemas.openxmlformats.org/drawingml/2006/main" xmlns:r="http://schemas.openxmlformats.org/officeDocument/2006/relationships" xmlns:p="http://schemas.openxmlformats.org/presentationml/2006/main">
-  <p:cSld>
-    <p:spTree>
-      <p:nvGrpSpPr>
-        <p:cNvPr id="1" name=""/>
-        <p:cNvGrpSpPr/>
-        <p:nvPr/>
-      </p:nvGrpSpPr>
-      <p:grpSpPr>
-        <a:xfrm>
-          <a:off x="0" y="0"/>
-          <a:ext cx="0" cy="0"/>
-          <a:chOff x="0" y="0"/>
-          <a:chExt cx="0" cy="0"/>
-        </a:xfrm>
-      </p:grpSpPr>
-      <p:pic>
-        <p:nvPicPr>
-          <p:cNvPr id="4" name="Picture 2" descr="Microsoft Access - Wikipedia"/>
-          <p:cNvPicPr>
-            <a:picLocks noChangeAspect="1" noChangeArrowheads="1"/>
-          </p:cNvPicPr>
-          <p:nvPr/>
-        </p:nvPicPr>
-        <p:blipFill>
-          <a:blip r:embed="rId2" cstate="print"/>
-          <a:srcRect/>
-          <a:stretch>
-            <a:fillRect/>
-          </a:stretch>
-        </p:blipFill>
-        <p:spPr bwMode="auto">
-          <a:xfrm>
-            <a:off x="4666146" y="1447800"/>
-            <a:ext cx="2496654" cy="2438400"/>
-          </a:xfrm>
-          <a:prstGeom prst="rect">
-            <a:avLst/>
-          </a:prstGeom>
-          <a:noFill/>
-          <a:effectLst>
-            <a:glow rad="63500">
-              <a:schemeClr val="accent6">
-                <a:satMod val="175000"/>
-                <a:alpha val="40000"/>
-              </a:schemeClr>
-            </a:glow>
-          </a:effectLst>
-        </p:spPr>
-      </p:pic>
-      <p:sp>
-        <p:nvSpPr>
-          <p:cNvPr id="6" name="Подзаглавие 5">
-            <a:extLst>
-              <a:ext uri="{FF2B5EF4-FFF2-40B4-BE49-F238E27FC236}">
-                <a16:creationId xmlns:a16="http://schemas.microsoft.com/office/drawing/2014/main" id="{D1252222-B017-12B5-E520-4A6ECD688780}"/>
-              </a:ext>
-            </a:extLst>
-          </p:cNvPr>
-          <p:cNvSpPr>
-            <a:spLocks noGrp="1"/>
-          </p:cNvSpPr>
-          <p:nvPr>
-            <p:ph type="subTitle" sz="quarter" idx="11"/>
-          </p:nvPr>
-        </p:nvSpPr>
-        <p:spPr/>
-        <p:txBody>
-          <a:bodyPr/>
-          <a:lstStyle/>
-          <a:p>
-            <a:r>
-              <a:rPr lang="en-US"/>
-              <a:t>MS Access</a:t>
-            </a:r>
-            <a:endParaRPr lang="bg-BG"/>
-          </a:p>
-        </p:txBody>
-      </p:sp>
-      <p:sp>
-        <p:nvSpPr>
-          <p:cNvPr id="8" name="Заглавие 7">
-            <a:extLst>
-              <a:ext uri="{FF2B5EF4-FFF2-40B4-BE49-F238E27FC236}">
-                <a16:creationId xmlns:a16="http://schemas.microsoft.com/office/drawing/2014/main" id="{A20158A9-C0F2-0C69-056B-DB3F3CEE6500}"/>
-              </a:ext>
-            </a:extLst>
-          </p:cNvPr>
-          <p:cNvSpPr>
-            <a:spLocks noGrp="1"/>
-          </p:cNvSpPr>
-          <p:nvPr>
-            <p:ph type="title" sz="quarter" idx="10"/>
-          </p:nvPr>
-        </p:nvSpPr>
-        <p:spPr/>
-        <p:txBody>
-          <a:bodyPr/>
-          <a:lstStyle/>
-          <a:p>
-            <a:r>
-              <a:rPr lang="bg-BG"/>
-              <a:t>Същност и употреба</a:t>
-            </a:r>
-          </a:p>
-        </p:txBody>
-      </p:sp>
-    </p:spTree>
-    <p:extLst>
-      <p:ext uri="{BB962C8B-B14F-4D97-AF65-F5344CB8AC3E}">
-        <p14:creationId xmlns:p14="http://schemas.microsoft.com/office/powerpoint/2010/main" val="149984738"/>
-      </p:ext>
-    </p:extLst>
-  </p:cSld>
-  <p:clrMapOvr>
-    <a:masterClrMapping/>
-  </p:clrMapOvr>
-  <mc:AlternateContent xmlns:mc="http://schemas.openxmlformats.org/markup-compatibility/2006" xmlns:p14="http://schemas.microsoft.com/office/powerpoint/2010/main">
-    <mc:Choice Requires="p14">
-      <p:transition spd="slow" p14:dur="2000" advClick="0" advTm="5000"/>
-    </mc:Choice>
-    <mc:Fallback xmlns="">
-      <p:transition spd="slow" advClick="0" advTm="5000"/>
-    </mc:Fallback>
-  </mc:AlternateContent>
-</p:sld>
-</file>
-
-<file path=ppt/slides/slide30.xml><?xml version="1.0" encoding="utf-8"?>
+<file path=ppt/slides/slide32.xml><?xml version="1.0" encoding="utf-8"?>
 <p:sld xmlns:a="http://schemas.openxmlformats.org/drawingml/2006/main" xmlns:r="http://schemas.openxmlformats.org/officeDocument/2006/relationships" xmlns:p="http://schemas.openxmlformats.org/presentationml/2006/main">
   <p:cSld>
     <p:spTree>
@@ -19071,7 +20508,7 @@
             <a:fld id="{2BF067CD-8E6B-4360-9AA8-C5DF2A48A6D1}" type="slidenum">
               <a:rPr lang="en-US" noProof="0" smtClean="0"/>
               <a:pPr/>
-              <a:t>30</a:t>
+              <a:t>32</a:t>
             </a:fld>
             <a:endParaRPr lang="en-US" noProof="0" dirty="0"/>
           </a:p>
@@ -19208,7 +20645,7 @@
 </p:sld>
 </file>
 
-<file path=ppt/slides/slide31.xml><?xml version="1.0" encoding="utf-8"?>
+<file path=ppt/slides/slide33.xml><?xml version="1.0" encoding="utf-8"?>
 <p:sld xmlns:a="http://schemas.openxmlformats.org/drawingml/2006/main" xmlns:r="http://schemas.openxmlformats.org/officeDocument/2006/relationships" xmlns:p="http://schemas.openxmlformats.org/presentationml/2006/main">
   <p:cSld>
     <p:spTree>
@@ -19548,7 +20985,7 @@
             <a:fld id="{2BF067CD-8E6B-4360-9AA8-C5DF2A48A6D1}" type="slidenum">
               <a:rPr lang="en-US" noProof="0" smtClean="0"/>
               <a:pPr/>
-              <a:t>31</a:t>
+              <a:t>33</a:t>
             </a:fld>
             <a:endParaRPr lang="en-US" noProof="0" dirty="0"/>
           </a:p>
@@ -19681,7 +21118,7 @@
 </p:sld>
 </file>
 
-<file path=ppt/slides/slide32.xml><?xml version="1.0" encoding="utf-8"?>
+<file path=ppt/slides/slide34.xml><?xml version="1.0" encoding="utf-8"?>
 <p:sld xmlns:a="http://schemas.openxmlformats.org/drawingml/2006/main" xmlns:r="http://schemas.openxmlformats.org/officeDocument/2006/relationships" xmlns:p="http://schemas.openxmlformats.org/presentationml/2006/main">
   <p:cSld>
     <p:spTree>
@@ -19969,7 +21406,7 @@
             <a:fld id="{2BF067CD-8E6B-4360-9AA8-C5DF2A48A6D1}" type="slidenum">
               <a:rPr lang="en-US" noProof="0" smtClean="0"/>
               <a:pPr/>
-              <a:t>32</a:t>
+              <a:t>34</a:t>
             </a:fld>
             <a:endParaRPr lang="en-US" noProof="0" dirty="0"/>
           </a:p>
@@ -20102,7 +21539,7 @@
 </p:sld>
 </file>
 
-<file path=ppt/slides/slide33.xml><?xml version="1.0" encoding="utf-8"?>
+<file path=ppt/slides/slide35.xml><?xml version="1.0" encoding="utf-8"?>
 <p:sld xmlns:a="http://schemas.openxmlformats.org/drawingml/2006/main" xmlns:r="http://schemas.openxmlformats.org/officeDocument/2006/relationships" xmlns:p="http://schemas.openxmlformats.org/presentationml/2006/main">
   <p:cSld>
     <p:spTree>
@@ -20383,7 +21820,7 @@
             <a:fld id="{2BF067CD-8E6B-4360-9AA8-C5DF2A48A6D1}" type="slidenum">
               <a:rPr lang="en-US" noProof="0" smtClean="0"/>
               <a:pPr/>
-              <a:t>33</a:t>
+              <a:t>35</a:t>
             </a:fld>
             <a:endParaRPr lang="en-US" noProof="0" dirty="0"/>
           </a:p>
@@ -20534,7 +21971,7 @@
 </p:sld>
 </file>
 
-<file path=ppt/slides/slide34.xml><?xml version="1.0" encoding="utf-8"?>
+<file path=ppt/slides/slide36.xml><?xml version="1.0" encoding="utf-8"?>
 <p:sld xmlns:a="http://schemas.openxmlformats.org/drawingml/2006/main" xmlns:r="http://schemas.openxmlformats.org/officeDocument/2006/relationships" xmlns:p="http://schemas.openxmlformats.org/presentationml/2006/main">
   <p:cSld>
     <p:spTree>
@@ -20774,7 +22211,7 @@
             <a:fld id="{2BF067CD-8E6B-4360-9AA8-C5DF2A48A6D1}" type="slidenum">
               <a:rPr lang="en-US" noProof="0" smtClean="0"/>
               <a:pPr/>
-              <a:t>34</a:t>
+              <a:t>36</a:t>
             </a:fld>
             <a:endParaRPr lang="en-US" noProof="0" dirty="0"/>
           </a:p>
@@ -20880,7 +22317,7 @@
 </p:sld>
 </file>
 
-<file path=ppt/slides/slide35.xml><?xml version="1.0" encoding="utf-8"?>
+<file path=ppt/slides/slide37.xml><?xml version="1.0" encoding="utf-8"?>
 <p:sld xmlns:a="http://schemas.openxmlformats.org/drawingml/2006/main" xmlns:r="http://schemas.openxmlformats.org/officeDocument/2006/relationships" xmlns:p="http://schemas.openxmlformats.org/presentationml/2006/main">
   <p:cSld>
     <p:spTree>
@@ -20989,7 +22426,15 @@
                   <a:schemeClr val="bg1"/>
                 </a:solidFill>
               </a:rPr>
-              <a:t>Service Principle name</a:t>
+              <a:t>Service Principle </a:t>
+            </a:r>
+            <a:r>
+              <a:rPr lang="bg-BG" b="1" dirty="0">
+                <a:solidFill>
+                  <a:schemeClr val="bg1"/>
+                </a:solidFill>
+              </a:rPr>
+              <a:t>име</a:t>
             </a:r>
             <a:r>
               <a:rPr lang="ru-RU" dirty="0"/>
@@ -21104,7 +22549,7 @@
             <a:fld id="{2BF067CD-8E6B-4360-9AA8-C5DF2A48A6D1}" type="slidenum">
               <a:rPr lang="en-US" noProof="0" smtClean="0"/>
               <a:pPr/>
-              <a:t>35</a:t>
+              <a:t>37</a:t>
             </a:fld>
             <a:endParaRPr lang="en-US" noProof="0" dirty="0"/>
           </a:p>
@@ -21206,7 +22651,7 @@
 </p:sld>
 </file>
 
-<file path=ppt/slides/slide36.xml><?xml version="1.0" encoding="utf-8"?>
+<file path=ppt/slides/slide38.xml><?xml version="1.0" encoding="utf-8"?>
 <p:sld xmlns:a="http://schemas.openxmlformats.org/drawingml/2006/main" xmlns:r="http://schemas.openxmlformats.org/officeDocument/2006/relationships" xmlns:p="http://schemas.openxmlformats.org/presentationml/2006/main">
   <p:cSld>
     <p:spTree>
@@ -21373,7 +22818,7 @@
             <a:fld id="{2BF067CD-8E6B-4360-9AA8-C5DF2A48A6D1}" type="slidenum">
               <a:rPr lang="en-US" noProof="0" smtClean="0"/>
               <a:pPr/>
-              <a:t>36</a:t>
+              <a:t>38</a:t>
             </a:fld>
             <a:endParaRPr lang="en-US" noProof="0" dirty="0"/>
           </a:p>
@@ -21400,7 +22845,7 @@
 </p:sld>
 </file>
 
-<file path=ppt/slides/slide37.xml><?xml version="1.0" encoding="utf-8"?>
+<file path=ppt/slides/slide39.xml><?xml version="1.0" encoding="utf-8"?>
 <p:sld xmlns:a="http://schemas.openxmlformats.org/drawingml/2006/main" xmlns:r="http://schemas.openxmlformats.org/officeDocument/2006/relationships" xmlns:p="http://schemas.openxmlformats.org/presentationml/2006/main">
   <p:cSld>
     <p:spTree>
@@ -21555,7 +23000,7 @@
             </a:r>
             <a:r>
               <a:rPr lang="ru-RU" dirty="0"/>
-              <a:t>, които искате да импортирате</a:t>
+              <a:t>, която искате да импортирате</a:t>
             </a:r>
             <a:endParaRPr lang="en-US" dirty="0"/>
           </a:p>
@@ -21634,90 +23079,6 @@
           </a:p>
         </p:txBody>
       </p:sp>
-      <p:pic>
-        <p:nvPicPr>
-          <p:cNvPr id="1026" name="Picture 2" descr="List of tables to link or import">
-            <a:extLst>
-              <a:ext uri="{FF2B5EF4-FFF2-40B4-BE49-F238E27FC236}">
-                <a16:creationId xmlns:a16="http://schemas.microsoft.com/office/drawing/2014/main" id="{EC0B1CA3-3F70-AE90-C17E-F462685D9656}"/>
-              </a:ext>
-            </a:extLst>
-          </p:cNvPr>
-          <p:cNvPicPr>
-            <a:picLocks noChangeAspect="1" noChangeArrowheads="1"/>
-          </p:cNvPicPr>
-          <p:nvPr/>
-        </p:nvPicPr>
-        <p:blipFill>
-          <a:blip r:embed="rId2">
-            <a:extLst>
-              <a:ext uri="{28A0092B-C50C-407E-A947-70E740481C1C}">
-                <a14:useLocalDpi xmlns:a14="http://schemas.microsoft.com/office/drawing/2010/main" val="0"/>
-              </a:ext>
-            </a:extLst>
-          </a:blip>
-          <a:srcRect/>
-          <a:stretch>
-            <a:fillRect/>
-          </a:stretch>
-        </p:blipFill>
-        <p:spPr bwMode="auto">
-          <a:xfrm>
-            <a:off x="2303375" y="4192055"/>
-            <a:ext cx="4727597" cy="1980145"/>
-          </a:xfrm>
-          <a:prstGeom prst="rect">
-            <a:avLst/>
-          </a:prstGeom>
-          <a:noFill/>
-          <a:extLst>
-            <a:ext uri="{909E8E84-426E-40DD-AFC4-6F175D3DCCD1}">
-              <a14:hiddenFill xmlns:a14="http://schemas.microsoft.com/office/drawing/2010/main">
-                <a:solidFill>
-                  <a:srgbClr val="FFFFFF"/>
-                </a:solidFill>
-              </a14:hiddenFill>
-            </a:ext>
-          </a:extLst>
-        </p:spPr>
-      </p:pic>
-      <p:pic>
-        <p:nvPicPr>
-          <p:cNvPr id="11" name="Picture 10">
-            <a:extLst>
-              <a:ext uri="{FF2B5EF4-FFF2-40B4-BE49-F238E27FC236}">
-                <a16:creationId xmlns:a16="http://schemas.microsoft.com/office/drawing/2014/main" id="{5B092682-25EF-044F-D97B-EC454B73E406}"/>
-              </a:ext>
-            </a:extLst>
-          </p:cNvPr>
-          <p:cNvPicPr>
-            <a:picLocks noChangeAspect="1"/>
-          </p:cNvPicPr>
-          <p:nvPr/>
-        </p:nvPicPr>
-        <p:blipFill>
-          <a:blip r:embed="rId3"/>
-          <a:stretch>
-            <a:fillRect/>
-          </a:stretch>
-        </p:blipFill>
-        <p:spPr>
-          <a:xfrm>
-            <a:off x="7797800" y="4638540"/>
-            <a:ext cx="2108200" cy="1143000"/>
-          </a:xfrm>
-          <a:prstGeom prst="rect">
-            <a:avLst/>
-          </a:prstGeom>
-          <a:ln>
-            <a:solidFill>
-              <a:schemeClr val="bg2">
-                <a:lumMod val="75000"/>
-              </a:schemeClr>
-            </a:solidFill>
-          </a:ln>
-        </p:spPr>
-      </p:pic>
       <p:sp>
         <p:nvSpPr>
           <p:cNvPr id="5" name="Slide Number">
@@ -21754,103 +23115,59 @@
             <a:fld id="{2BF067CD-8E6B-4360-9AA8-C5DF2A48A6D1}" type="slidenum">
               <a:rPr lang="en-US" noProof="0" smtClean="0"/>
               <a:pPr/>
-              <a:t>37</a:t>
+              <a:t>39</a:t>
             </a:fld>
             <a:endParaRPr lang="en-US" noProof="0" dirty="0"/>
           </a:p>
         </p:txBody>
       </p:sp>
-      <p:sp>
-        <p:nvSpPr>
-          <p:cNvPr id="2" name="Rectangle: Rounded Corners 1">
+      <p:pic>
+        <p:nvPicPr>
+          <p:cNvPr id="1028" name="Picture 4" descr="Data, import, information, table icon - Download on Iconfinder">
             <a:extLst>
               <a:ext uri="{FF2B5EF4-FFF2-40B4-BE49-F238E27FC236}">
-                <a16:creationId xmlns:a16="http://schemas.microsoft.com/office/drawing/2014/main" id="{3AAADFEB-EE35-0718-D558-65A97620D00D}"/>
+                <a16:creationId xmlns:a16="http://schemas.microsoft.com/office/drawing/2014/main" id="{A4953463-59CD-FAFA-9158-EEE00AE47E63}"/>
               </a:ext>
             </a:extLst>
           </p:cNvPr>
-          <p:cNvSpPr/>
+          <p:cNvPicPr>
+            <a:picLocks noChangeAspect="1" noChangeArrowheads="1"/>
+          </p:cNvPicPr>
           <p:nvPr/>
-        </p:nvSpPr>
+        </p:nvPicPr>
+        <p:blipFill>
+          <a:blip r:embed="rId2">
+            <a:extLst>
+              <a:ext uri="{28A0092B-C50C-407E-A947-70E740481C1C}">
+                <a14:useLocalDpi xmlns:a14="http://schemas.microsoft.com/office/drawing/2010/main" val="0"/>
+              </a:ext>
+            </a:extLst>
+          </a:blip>
+          <a:srcRect/>
+          <a:stretch>
+            <a:fillRect/>
+          </a:stretch>
+        </p:blipFill>
         <p:spPr bwMode="auto">
           <a:xfrm>
-            <a:off x="5151000" y="3979334"/>
-            <a:ext cx="4005000" cy="1251872"/>
+            <a:off x="5466000" y="3429000"/>
+            <a:ext cx="3195000" cy="3195000"/>
           </a:xfrm>
-          <a:prstGeom prst="roundRect">
+          <a:prstGeom prst="rect">
             <a:avLst/>
           </a:prstGeom>
-          <a:solidFill>
-            <a:schemeClr val="dk2">
-              <a:alpha val="80000"/>
-            </a:schemeClr>
-          </a:solidFill>
-          <a:ln w="19050">
-            <a:solidFill>
-              <a:schemeClr val="tx1">
-                <a:lumMod val="75000"/>
-                <a:alpha val="80000"/>
-              </a:schemeClr>
-            </a:solidFill>
-          </a:ln>
-          <a:effectLst/>
+          <a:noFill/>
+          <a:extLst>
+            <a:ext uri="{909E8E84-426E-40DD-AFC4-6F175D3DCCD1}">
+              <a14:hiddenFill xmlns:a14="http://schemas.microsoft.com/office/drawing/2010/main">
+                <a:solidFill>
+                  <a:srgbClr val="FFFFFF"/>
+                </a:solidFill>
+              </a14:hiddenFill>
+            </a:ext>
+          </a:extLst>
         </p:spPr>
-        <p:style>
-          <a:lnRef idx="2">
-            <a:schemeClr val="accent1">
-              <a:shade val="50000"/>
-            </a:schemeClr>
-          </a:lnRef>
-          <a:fillRef idx="1001">
-            <a:schemeClr val="dk2"/>
-          </a:fillRef>
-          <a:effectRef idx="0">
-            <a:schemeClr val="accent1"/>
-          </a:effectRef>
-          <a:fontRef idx="minor">
-            <a:schemeClr val="lt1"/>
-          </a:fontRef>
-        </p:style>
-        <p:txBody>
-          <a:bodyPr rot="0" spcFirstLastPara="0" vertOverflow="overflow" horzOverflow="overflow" vert="horz" wrap="square" lIns="91440" tIns="45720" rIns="91440" bIns="45720" numCol="1" spcCol="0" rtlCol="0" fromWordArt="0" anchor="ctr" anchorCtr="0" forceAA="0" compatLnSpc="1">
-            <a:prstTxWarp prst="textNoShape">
-              <a:avLst/>
-            </a:prstTxWarp>
-            <a:noAutofit/>
-          </a:bodyPr>
-          <a:lstStyle/>
-          <a:p>
-            <a:pPr algn="ctr"/>
-            <a:r>
-              <a:rPr lang="bg-BG" sz="2800" b="1" dirty="0">
-                <a:solidFill>
-                  <a:srgbClr val="FFFFFF"/>
-                </a:solidFill>
-                <a:effectLst>
-                  <a:outerShdw blurRad="38100" dist="38100" dir="2700000" algn="tl">
-                    <a:srgbClr val="000000">
-                      <a:alpha val="43137"/>
-                    </a:srgbClr>
-                  </a:outerShdw>
-                </a:effectLst>
-              </a:rPr>
-              <a:t>Счупени таблици!</a:t>
-            </a:r>
-            <a:endParaRPr lang="en-US" sz="2800" b="1" dirty="0">
-              <a:solidFill>
-                <a:srgbClr val="FFFFFF"/>
-              </a:solidFill>
-              <a:effectLst>
-                <a:outerShdw blurRad="38100" dist="38100" dir="2700000" algn="tl">
-                  <a:srgbClr val="000000">
-                    <a:alpha val="43137"/>
-                  </a:srgbClr>
-                </a:outerShdw>
-              </a:effectLst>
-            </a:endParaRPr>
-          </a:p>
-        </p:txBody>
-      </p:sp>
+      </p:pic>
     </p:spTree>
     <p:extLst>
       <p:ext uri="{BB962C8B-B14F-4D97-AF65-F5344CB8AC3E}">
@@ -21872,7 +23189,199 @@
 </p:sld>
 </file>
 
-<file path=ppt/slides/slide38.xml><?xml version="1.0" encoding="utf-8"?>
+<file path=ppt/slides/slide4.xml><?xml version="1.0" encoding="utf-8"?>
+<p:sld xmlns:a="http://schemas.openxmlformats.org/drawingml/2006/main" xmlns:r="http://schemas.openxmlformats.org/officeDocument/2006/relationships" xmlns:p="http://schemas.openxmlformats.org/presentationml/2006/main">
+  <p:cSld>
+    <p:spTree>
+      <p:nvGrpSpPr>
+        <p:cNvPr id="1" name=""/>
+        <p:cNvGrpSpPr/>
+        <p:nvPr/>
+      </p:nvGrpSpPr>
+      <p:grpSpPr>
+        <a:xfrm>
+          <a:off x="0" y="0"/>
+          <a:ext cx="0" cy="0"/>
+          <a:chOff x="0" y="0"/>
+          <a:chExt cx="0" cy="0"/>
+        </a:xfrm>
+      </p:grpSpPr>
+      <p:sp>
+        <p:nvSpPr>
+          <p:cNvPr id="2" name="Slide Number Placeholder 1">
+            <a:extLst>
+              <a:ext uri="{FF2B5EF4-FFF2-40B4-BE49-F238E27FC236}">
+                <a16:creationId xmlns:a16="http://schemas.microsoft.com/office/drawing/2014/main" id="{D7F19DF1-FB41-E88B-FE96-951FAF72DFD8}"/>
+              </a:ext>
+            </a:extLst>
+          </p:cNvPr>
+          <p:cNvSpPr>
+            <a:spLocks noGrp="1"/>
+          </p:cNvSpPr>
+          <p:nvPr>
+            <p:ph type="sldNum" sz="quarter" idx="5"/>
+          </p:nvPr>
+        </p:nvSpPr>
+        <p:spPr>
+          <a:xfrm>
+            <a:off x="11753030" y="6507000"/>
+            <a:ext cx="367414" cy="297000"/>
+          </a:xfrm>
+        </p:spPr>
+        <p:txBody>
+          <a:bodyPr/>
+          <a:lstStyle/>
+          <a:p>
+            <a:fld id="{2BF067CD-8E6B-4360-9AA8-C5DF2A48A6D1}" type="slidenum">
+              <a:rPr lang="en-US" noProof="0" smtClean="0"/>
+              <a:pPr/>
+              <a:t>4</a:t>
+            </a:fld>
+            <a:endParaRPr lang="en-US" noProof="0" dirty="0"/>
+          </a:p>
+        </p:txBody>
+      </p:sp>
+      <p:sp>
+        <p:nvSpPr>
+          <p:cNvPr id="8" name="Text Placeholder 7">
+            <a:extLst>
+              <a:ext uri="{FF2B5EF4-FFF2-40B4-BE49-F238E27FC236}">
+                <a16:creationId xmlns:a16="http://schemas.microsoft.com/office/drawing/2014/main" id="{1F73F9FF-2320-5E8D-6E65-B55D0A29447B}"/>
+              </a:ext>
+            </a:extLst>
+          </p:cNvPr>
+          <p:cNvSpPr>
+            <a:spLocks noGrp="1"/>
+          </p:cNvSpPr>
+          <p:nvPr>
+            <p:ph type="body" sz="quarter" idx="10"/>
+          </p:nvPr>
+        </p:nvSpPr>
+        <p:spPr>
+          <a:xfrm>
+            <a:off x="8121000" y="1196125"/>
+            <a:ext cx="3887498" cy="5528766"/>
+          </a:xfrm>
+        </p:spPr>
+        <p:txBody>
+          <a:bodyPr>
+            <a:normAutofit/>
+          </a:bodyPr>
+          <a:lstStyle/>
+          <a:p>
+            <a:r>
+              <a:rPr lang="en-US" sz="3200" b="1" dirty="0"/>
+              <a:t>MS Access</a:t>
+            </a:r>
+          </a:p>
+          <a:p>
+            <a:pPr lvl="1"/>
+            <a:r>
+              <a:rPr lang="bg-BG" sz="2800" dirty="0"/>
+              <a:t>Настолна система за менажиране на бази данни</a:t>
+            </a:r>
+          </a:p>
+          <a:p>
+            <a:pPr lvl="1"/>
+            <a:r>
+              <a:rPr lang="bg-BG" sz="2800" dirty="0"/>
+              <a:t>Таблици, връзки, заявки, отчети, формуляри</a:t>
+            </a:r>
+            <a:endParaRPr lang="en-US" sz="2800" dirty="0"/>
+          </a:p>
+        </p:txBody>
+      </p:sp>
+      <p:sp>
+        <p:nvSpPr>
+          <p:cNvPr id="4" name="Title 3">
+            <a:extLst>
+              <a:ext uri="{FF2B5EF4-FFF2-40B4-BE49-F238E27FC236}">
+                <a16:creationId xmlns:a16="http://schemas.microsoft.com/office/drawing/2014/main" id="{6682D1C9-1C3D-D45B-5274-8A21AF0A2592}"/>
+              </a:ext>
+            </a:extLst>
+          </p:cNvPr>
+          <p:cNvSpPr>
+            <a:spLocks noGrp="1"/>
+          </p:cNvSpPr>
+          <p:nvPr>
+            <p:ph type="title"/>
+          </p:nvPr>
+        </p:nvSpPr>
+        <p:spPr>
+          <a:xfrm>
+            <a:off x="190406" y="100750"/>
+            <a:ext cx="10270594" cy="882654"/>
+          </a:xfrm>
+        </p:spPr>
+        <p:txBody>
+          <a:bodyPr/>
+          <a:lstStyle/>
+          <a:p>
+            <a:r>
+              <a:rPr lang="bg-BG" dirty="0"/>
+              <a:t>Какво е </a:t>
+            </a:r>
+            <a:r>
+              <a:rPr lang="en-US" dirty="0"/>
+              <a:t>MS Access?</a:t>
+            </a:r>
+          </a:p>
+        </p:txBody>
+      </p:sp>
+      <p:pic>
+        <p:nvPicPr>
+          <p:cNvPr id="5" name="Picture 2" descr="Access: Working with Tables">
+            <a:extLst>
+              <a:ext uri="{FF2B5EF4-FFF2-40B4-BE49-F238E27FC236}">
+                <a16:creationId xmlns:a16="http://schemas.microsoft.com/office/drawing/2014/main" id="{01DB5ED8-EF17-B90D-1148-58E8B3ACC3B6}"/>
+              </a:ext>
+            </a:extLst>
+          </p:cNvPr>
+          <p:cNvPicPr>
+            <a:picLocks noChangeAspect="1" noChangeArrowheads="1"/>
+          </p:cNvPicPr>
+          <p:nvPr/>
+        </p:nvPicPr>
+        <p:blipFill>
+          <a:blip r:embed="rId2" cstate="print"/>
+          <a:srcRect/>
+          <a:stretch>
+            <a:fillRect/>
+          </a:stretch>
+        </p:blipFill>
+        <p:spPr bwMode="auto">
+          <a:xfrm>
+            <a:off x="370242" y="1404000"/>
+            <a:ext cx="7579438" cy="5220000"/>
+          </a:xfrm>
+          <a:prstGeom prst="rect">
+            <a:avLst/>
+          </a:prstGeom>
+          <a:noFill/>
+        </p:spPr>
+      </p:pic>
+    </p:spTree>
+    <p:extLst>
+      <p:ext uri="{BB962C8B-B14F-4D97-AF65-F5344CB8AC3E}">
+        <p14:creationId xmlns:p14="http://schemas.microsoft.com/office/powerpoint/2010/main" val="724375268"/>
+      </p:ext>
+    </p:extLst>
+  </p:cSld>
+  <p:clrMapOvr>
+    <a:masterClrMapping/>
+  </p:clrMapOvr>
+  <mc:AlternateContent xmlns:mc="http://schemas.openxmlformats.org/markup-compatibility/2006" xmlns:p14="http://schemas.microsoft.com/office/powerpoint/2010/main">
+    <mc:Choice Requires="p14">
+      <p:transition spd="slow" p14:dur="2000" advClick="0" advTm="5000"/>
+    </mc:Choice>
+    <mc:Fallback xmlns="">
+      <p:transition spd="slow" advClick="0" advTm="5000"/>
+    </mc:Fallback>
+  </mc:AlternateContent>
+</p:sld>
+</file>
+
+<file path=ppt/slides/slide40.xml><?xml version="1.0" encoding="utf-8"?>
 <p:sld xmlns:a="http://schemas.openxmlformats.org/drawingml/2006/main" xmlns:r="http://schemas.openxmlformats.org/officeDocument/2006/relationships" xmlns:p="http://schemas.openxmlformats.org/presentationml/2006/main">
   <p:cSld>
     <p:spTree>
@@ -22500,7 +24009,7 @@
             <a:fld id="{2BF067CD-8E6B-4360-9AA8-C5DF2A48A6D1}" type="slidenum">
               <a:rPr lang="en-US" noProof="0" smtClean="0"/>
               <a:pPr/>
-              <a:t>38</a:t>
+              <a:t>40</a:t>
             </a:fld>
             <a:endParaRPr lang="en-US" noProof="0" dirty="0"/>
           </a:p>
@@ -22686,7 +24195,7 @@
 </p:sld>
 </file>
 
-<file path=ppt/slides/slide39.xml><?xml version="1.0" encoding="utf-8"?>
+<file path=ppt/slides/slide41.xml><?xml version="1.0" encoding="utf-8"?>
 <p:sld xmlns:a="http://schemas.openxmlformats.org/drawingml/2006/main" xmlns:r="http://schemas.openxmlformats.org/officeDocument/2006/relationships" xmlns:p="http://schemas.openxmlformats.org/presentationml/2006/main">
   <p:cSld>
     <p:spTree>
@@ -22876,199 +24385,7 @@
 </p:sld>
 </file>
 
-<file path=ppt/slides/slide4.xml><?xml version="1.0" encoding="utf-8"?>
-<p:sld xmlns:a="http://schemas.openxmlformats.org/drawingml/2006/main" xmlns:r="http://schemas.openxmlformats.org/officeDocument/2006/relationships" xmlns:p="http://schemas.openxmlformats.org/presentationml/2006/main">
-  <p:cSld>
-    <p:spTree>
-      <p:nvGrpSpPr>
-        <p:cNvPr id="1" name=""/>
-        <p:cNvGrpSpPr/>
-        <p:nvPr/>
-      </p:nvGrpSpPr>
-      <p:grpSpPr>
-        <a:xfrm>
-          <a:off x="0" y="0"/>
-          <a:ext cx="0" cy="0"/>
-          <a:chOff x="0" y="0"/>
-          <a:chExt cx="0" cy="0"/>
-        </a:xfrm>
-      </p:grpSpPr>
-      <p:sp>
-        <p:nvSpPr>
-          <p:cNvPr id="2" name="Slide Number Placeholder 1">
-            <a:extLst>
-              <a:ext uri="{FF2B5EF4-FFF2-40B4-BE49-F238E27FC236}">
-                <a16:creationId xmlns:a16="http://schemas.microsoft.com/office/drawing/2014/main" id="{D7F19DF1-FB41-E88B-FE96-951FAF72DFD8}"/>
-              </a:ext>
-            </a:extLst>
-          </p:cNvPr>
-          <p:cNvSpPr>
-            <a:spLocks noGrp="1"/>
-          </p:cNvSpPr>
-          <p:nvPr>
-            <p:ph type="sldNum" sz="quarter" idx="5"/>
-          </p:nvPr>
-        </p:nvSpPr>
-        <p:spPr>
-          <a:xfrm>
-            <a:off x="11753030" y="6507000"/>
-            <a:ext cx="367414" cy="297000"/>
-          </a:xfrm>
-        </p:spPr>
-        <p:txBody>
-          <a:bodyPr/>
-          <a:lstStyle/>
-          <a:p>
-            <a:fld id="{2BF067CD-8E6B-4360-9AA8-C5DF2A48A6D1}" type="slidenum">
-              <a:rPr lang="en-US" noProof="0" smtClean="0"/>
-              <a:pPr/>
-              <a:t>4</a:t>
-            </a:fld>
-            <a:endParaRPr lang="en-US" noProof="0" dirty="0"/>
-          </a:p>
-        </p:txBody>
-      </p:sp>
-      <p:sp>
-        <p:nvSpPr>
-          <p:cNvPr id="8" name="Text Placeholder 7">
-            <a:extLst>
-              <a:ext uri="{FF2B5EF4-FFF2-40B4-BE49-F238E27FC236}">
-                <a16:creationId xmlns:a16="http://schemas.microsoft.com/office/drawing/2014/main" id="{1F73F9FF-2320-5E8D-6E65-B55D0A29447B}"/>
-              </a:ext>
-            </a:extLst>
-          </p:cNvPr>
-          <p:cNvSpPr>
-            <a:spLocks noGrp="1"/>
-          </p:cNvSpPr>
-          <p:nvPr>
-            <p:ph type="body" sz="quarter" idx="10"/>
-          </p:nvPr>
-        </p:nvSpPr>
-        <p:spPr>
-          <a:xfrm>
-            <a:off x="8121000" y="1196125"/>
-            <a:ext cx="3887498" cy="5528766"/>
-          </a:xfrm>
-        </p:spPr>
-        <p:txBody>
-          <a:bodyPr>
-            <a:normAutofit/>
-          </a:bodyPr>
-          <a:lstStyle/>
-          <a:p>
-            <a:r>
-              <a:rPr lang="en-US" sz="3200" b="1" dirty="0"/>
-              <a:t>MS Access</a:t>
-            </a:r>
-          </a:p>
-          <a:p>
-            <a:pPr lvl="1"/>
-            <a:r>
-              <a:rPr lang="bg-BG" sz="2800" dirty="0"/>
-              <a:t>Настолна система за менажиране на бази данни</a:t>
-            </a:r>
-          </a:p>
-          <a:p>
-            <a:pPr lvl="1"/>
-            <a:r>
-              <a:rPr lang="bg-BG" sz="2800" dirty="0"/>
-              <a:t>Таблици, връзки, заявки, отчети, формуляри</a:t>
-            </a:r>
-            <a:endParaRPr lang="en-US" sz="2800" dirty="0"/>
-          </a:p>
-        </p:txBody>
-      </p:sp>
-      <p:sp>
-        <p:nvSpPr>
-          <p:cNvPr id="4" name="Title 3">
-            <a:extLst>
-              <a:ext uri="{FF2B5EF4-FFF2-40B4-BE49-F238E27FC236}">
-                <a16:creationId xmlns:a16="http://schemas.microsoft.com/office/drawing/2014/main" id="{6682D1C9-1C3D-D45B-5274-8A21AF0A2592}"/>
-              </a:ext>
-            </a:extLst>
-          </p:cNvPr>
-          <p:cNvSpPr>
-            <a:spLocks noGrp="1"/>
-          </p:cNvSpPr>
-          <p:nvPr>
-            <p:ph type="title"/>
-          </p:nvPr>
-        </p:nvSpPr>
-        <p:spPr>
-          <a:xfrm>
-            <a:off x="190406" y="100750"/>
-            <a:ext cx="10270594" cy="882654"/>
-          </a:xfrm>
-        </p:spPr>
-        <p:txBody>
-          <a:bodyPr/>
-          <a:lstStyle/>
-          <a:p>
-            <a:r>
-              <a:rPr lang="bg-BG" dirty="0"/>
-              <a:t>Какво е </a:t>
-            </a:r>
-            <a:r>
-              <a:rPr lang="en-US" dirty="0"/>
-              <a:t>MS Access?</a:t>
-            </a:r>
-          </a:p>
-        </p:txBody>
-      </p:sp>
-      <p:pic>
-        <p:nvPicPr>
-          <p:cNvPr id="5" name="Picture 2" descr="Access: Working with Tables">
-            <a:extLst>
-              <a:ext uri="{FF2B5EF4-FFF2-40B4-BE49-F238E27FC236}">
-                <a16:creationId xmlns:a16="http://schemas.microsoft.com/office/drawing/2014/main" id="{01DB5ED8-EF17-B90D-1148-58E8B3ACC3B6}"/>
-              </a:ext>
-            </a:extLst>
-          </p:cNvPr>
-          <p:cNvPicPr>
-            <a:picLocks noChangeAspect="1" noChangeArrowheads="1"/>
-          </p:cNvPicPr>
-          <p:nvPr/>
-        </p:nvPicPr>
-        <p:blipFill>
-          <a:blip r:embed="rId2" cstate="print"/>
-          <a:srcRect/>
-          <a:stretch>
-            <a:fillRect/>
-          </a:stretch>
-        </p:blipFill>
-        <p:spPr bwMode="auto">
-          <a:xfrm>
-            <a:off x="370242" y="1404000"/>
-            <a:ext cx="7579438" cy="5220000"/>
-          </a:xfrm>
-          <a:prstGeom prst="rect">
-            <a:avLst/>
-          </a:prstGeom>
-          <a:noFill/>
-        </p:spPr>
-      </p:pic>
-    </p:spTree>
-    <p:extLst>
-      <p:ext uri="{BB962C8B-B14F-4D97-AF65-F5344CB8AC3E}">
-        <p14:creationId xmlns:p14="http://schemas.microsoft.com/office/powerpoint/2010/main" val="724375268"/>
-      </p:ext>
-    </p:extLst>
-  </p:cSld>
-  <p:clrMapOvr>
-    <a:masterClrMapping/>
-  </p:clrMapOvr>
-  <mc:AlternateContent xmlns:mc="http://schemas.openxmlformats.org/markup-compatibility/2006" xmlns:p14="http://schemas.microsoft.com/office/powerpoint/2010/main">
-    <mc:Choice Requires="p14">
-      <p:transition spd="slow" p14:dur="2000" advClick="0" advTm="5000"/>
-    </mc:Choice>
-    <mc:Fallback xmlns="">
-      <p:transition spd="slow" advClick="0" advTm="5000"/>
-    </mc:Fallback>
-  </mc:AlternateContent>
-</p:sld>
-</file>
-
-<file path=ppt/slides/slide40.xml><?xml version="1.0" encoding="utf-8"?>
+<file path=ppt/slides/slide42.xml><?xml version="1.0" encoding="utf-8"?>
 <p:sld xmlns:a="http://schemas.openxmlformats.org/drawingml/2006/main" xmlns:r="http://schemas.openxmlformats.org/officeDocument/2006/relationships" xmlns:p="http://schemas.openxmlformats.org/presentationml/2006/main">
   <p:cSld>
     <p:spTree>
@@ -23424,7 +24741,7 @@
             <a:fld id="{2BF067CD-8E6B-4360-9AA8-C5DF2A48A6D1}" type="slidenum">
               <a:rPr lang="en-US" noProof="0" smtClean="0"/>
               <a:pPr/>
-              <a:t>40</a:t>
+              <a:t>42</a:t>
             </a:fld>
             <a:endParaRPr lang="en-US" noProof="0" dirty="0"/>
           </a:p>

</xml_diff>

<commit_message>
Updating slides for MS Access - Basics
</commit_message>
<xml_diff>
--- a/Courses/Software-Sciences/Module-3-Databases-New/13-MS-Access/11-MS-Access-Basics.pptx
+++ b/Courses/Software-Sciences/Module-3-Databases-New/13-MS-Access/11-MS-Access-Basics.pptx
@@ -16,11 +16,11 @@
     <p:sldId id="511" r:id="rId4"/>
     <p:sldId id="580" r:id="rId5"/>
     <p:sldId id="522" r:id="rId6"/>
-    <p:sldId id="581" r:id="rId7"/>
-    <p:sldId id="527" r:id="rId8"/>
-    <p:sldId id="588" r:id="rId9"/>
-    <p:sldId id="590" r:id="rId10"/>
-    <p:sldId id="591" r:id="rId11"/>
+    <p:sldId id="527" r:id="rId7"/>
+    <p:sldId id="588" r:id="rId8"/>
+    <p:sldId id="590" r:id="rId9"/>
+    <p:sldId id="591" r:id="rId10"/>
+    <p:sldId id="581" r:id="rId11"/>
     <p:sldId id="523" r:id="rId12"/>
     <p:sldId id="525" r:id="rId13"/>
     <p:sldId id="528" r:id="rId14"/>
@@ -167,7 +167,6 @@
             <p14:sldId id="511"/>
             <p14:sldId id="580"/>
             <p14:sldId id="522"/>
-            <p14:sldId id="581"/>
             <p14:sldId id="527"/>
           </p14:sldIdLst>
         </p14:section>
@@ -176,6 +175,7 @@
             <p14:sldId id="588"/>
             <p14:sldId id="590"/>
             <p14:sldId id="591"/>
+            <p14:sldId id="581"/>
           </p14:sldIdLst>
         </p14:section>
         <p14:section name="Създаване на таблици и попълване на данни" id="{88EB3967-9F31-46D3-92C6-CE5DA32A0EF2}">
@@ -341,7 +341,7 @@
           <a:p>
             <a:fld id="{4E087215-0C8F-4762-A664-737A353EC9A4}" type="datetimeFigureOut">
               <a:rPr lang="bg-BG" smtClean="0"/>
-              <a:t>11.12.2023 г.</a:t>
+              <a:t>18.12.2023 г.</a:t>
             </a:fld>
             <a:endParaRPr lang="bg-BG"/>
           </a:p>
@@ -537,7 +537,7 @@
           <a:p>
             <a:fld id="{72D84649-876A-46C9-8472-14CB09C070D8}" type="datetimeFigureOut">
               <a:rPr lang="en-US" smtClean="0"/>
-              <a:t>12/11/2023</a:t>
+              <a:t>12/18/2023</a:t>
             </a:fld>
             <a:endParaRPr lang="en-US"/>
           </a:p>
@@ -1049,7 +1049,7 @@
             <a:fld id="{2BF067CD-8E6B-4360-9AA8-C5DF2A48A6D1}" type="slidenum">
               <a:rPr lang="en-US" smtClean="0"/>
               <a:pPr/>
-              <a:t>28</a:t>
+              <a:t>27</a:t>
             </a:fld>
             <a:endParaRPr lang="en-US" dirty="0"/>
           </a:p>
@@ -1060,7 +1060,7 @@
           <p:cNvPr id="6" name="Footer Placeholder 7">
             <a:extLst>
               <a:ext uri="{FF2B5EF4-FFF2-40B4-BE49-F238E27FC236}">
-                <a16:creationId xmlns:a16="http://schemas.microsoft.com/office/drawing/2014/main" id="{831AFD4C-D5A4-4438-945F-69757AEAE940}"/>
+                <a16:creationId xmlns:a16="http://schemas.microsoft.com/office/drawing/2014/main" id="{71B6FEE5-3694-5CFB-E58C-1EF4E10412F3}"/>
               </a:ext>
             </a:extLst>
           </p:cNvPr>
@@ -1113,7 +1113,7 @@
     </p:spTree>
     <p:extLst>
       <p:ext uri="{BB962C8B-B14F-4D97-AF65-F5344CB8AC3E}">
-        <p14:creationId xmlns:p14="http://schemas.microsoft.com/office/powerpoint/2010/main" val="3758620145"/>
+        <p14:creationId xmlns:p14="http://schemas.microsoft.com/office/powerpoint/2010/main" val="1117642675"/>
       </p:ext>
     </p:extLst>
   </p:cSld>
@@ -1164,7 +1164,9 @@
         </p:nvSpPr>
         <p:spPr/>
         <p:txBody>
-          <a:bodyPr/>
+          <a:bodyPr>
+            <a:normAutofit/>
+          </a:bodyPr>
           <a:lstStyle/>
           <a:p>
             <a:endParaRPr lang="en-US" dirty="0"/>
@@ -1178,7 +1180,7 @@
             <a:spLocks noGrp="1"/>
           </p:cNvSpPr>
           <p:nvPr>
-            <p:ph type="sldNum" sz="quarter" idx="5"/>
+            <p:ph type="sldNum" sz="quarter" idx="10"/>
           </p:nvPr>
         </p:nvSpPr>
         <p:spPr/>
@@ -1189,7 +1191,7 @@
             <a:fld id="{2BF067CD-8E6B-4360-9AA8-C5DF2A48A6D1}" type="slidenum">
               <a:rPr lang="en-US" smtClean="0"/>
               <a:pPr/>
-              <a:t>30</a:t>
+              <a:t>28</a:t>
             </a:fld>
             <a:endParaRPr lang="en-US" dirty="0"/>
           </a:p>
@@ -1200,7 +1202,7 @@
           <p:cNvPr id="6" name="Footer Placeholder 7">
             <a:extLst>
               <a:ext uri="{FF2B5EF4-FFF2-40B4-BE49-F238E27FC236}">
-                <a16:creationId xmlns:a16="http://schemas.microsoft.com/office/drawing/2014/main" id="{0DC922E6-CD6A-DFFC-200D-5E732211C95D}"/>
+                <a16:creationId xmlns:a16="http://schemas.microsoft.com/office/drawing/2014/main" id="{831AFD4C-D5A4-4438-945F-69757AEAE940}"/>
               </a:ext>
             </a:extLst>
           </p:cNvPr>
@@ -1253,7 +1255,7 @@
     </p:spTree>
     <p:extLst>
       <p:ext uri="{BB962C8B-B14F-4D97-AF65-F5344CB8AC3E}">
-        <p14:creationId xmlns:p14="http://schemas.microsoft.com/office/powerpoint/2010/main" val="1532374807"/>
+        <p14:creationId xmlns:p14="http://schemas.microsoft.com/office/powerpoint/2010/main" val="3758620145"/>
       </p:ext>
     </p:extLst>
   </p:cSld>
@@ -1313,129 +1315,23 @@
       </p:sp>
       <p:sp>
         <p:nvSpPr>
-          <p:cNvPr id="7" name="Slide Number Placeholder 5">
-            <a:extLst>
-              <a:ext uri="{FF2B5EF4-FFF2-40B4-BE49-F238E27FC236}">
-                <a16:creationId xmlns:a16="http://schemas.microsoft.com/office/drawing/2014/main" id="{E65F1CA9-65DC-416B-8882-B3A5E415CE67}"/>
-              </a:ext>
-            </a:extLst>
-          </p:cNvPr>
-          <p:cNvSpPr txBox="1">
-            <a:spLocks/>
+          <p:cNvPr id="4" name="Slide Number Placeholder 3"/>
+          <p:cNvSpPr>
+            <a:spLocks noGrp="1"/>
           </p:cNvSpPr>
-          <p:nvPr/>
+          <p:nvPr>
+            <p:ph type="sldNum" sz="quarter" idx="5"/>
+          </p:nvPr>
         </p:nvSpPr>
-        <p:spPr>
-          <a:xfrm>
-            <a:off x="6488999" y="8847000"/>
-            <a:ext cx="367414" cy="297000"/>
-          </a:xfrm>
-          <a:prstGeom prst="rect">
-            <a:avLst/>
-          </a:prstGeom>
-        </p:spPr>
+        <p:spPr/>
         <p:txBody>
-          <a:bodyPr vert="horz" lIns="91440" tIns="45720" rIns="91440" bIns="45720" rtlCol="0" anchor="b"/>
-          <a:lstStyle>
-            <a:defPPr>
-              <a:defRPr lang="en-US"/>
-            </a:defPPr>
-            <a:lvl1pPr marL="0" algn="r" defTabSz="914400" rtl="0" eaLnBrk="1" latinLnBrk="0" hangingPunct="1">
-              <a:defRPr sz="1200" kern="1200">
-                <a:solidFill>
-                  <a:schemeClr val="tx1"/>
-                </a:solidFill>
-                <a:latin typeface="+mn-lt"/>
-                <a:ea typeface="+mn-ea"/>
-                <a:cs typeface="+mn-cs"/>
-              </a:defRPr>
-            </a:lvl1pPr>
-            <a:lvl2pPr marL="457200" algn="l" defTabSz="914400" rtl="0" eaLnBrk="1" latinLnBrk="0" hangingPunct="1">
-              <a:defRPr sz="1800" kern="1200">
-                <a:solidFill>
-                  <a:schemeClr val="tx1"/>
-                </a:solidFill>
-                <a:latin typeface="+mn-lt"/>
-                <a:ea typeface="+mn-ea"/>
-                <a:cs typeface="+mn-cs"/>
-              </a:defRPr>
-            </a:lvl2pPr>
-            <a:lvl3pPr marL="914400" algn="l" defTabSz="914400" rtl="0" eaLnBrk="1" latinLnBrk="0" hangingPunct="1">
-              <a:defRPr sz="1800" kern="1200">
-                <a:solidFill>
-                  <a:schemeClr val="tx1"/>
-                </a:solidFill>
-                <a:latin typeface="+mn-lt"/>
-                <a:ea typeface="+mn-ea"/>
-                <a:cs typeface="+mn-cs"/>
-              </a:defRPr>
-            </a:lvl3pPr>
-            <a:lvl4pPr marL="1371600" algn="l" defTabSz="914400" rtl="0" eaLnBrk="1" latinLnBrk="0" hangingPunct="1">
-              <a:defRPr sz="1800" kern="1200">
-                <a:solidFill>
-                  <a:schemeClr val="tx1"/>
-                </a:solidFill>
-                <a:latin typeface="+mn-lt"/>
-                <a:ea typeface="+mn-ea"/>
-                <a:cs typeface="+mn-cs"/>
-              </a:defRPr>
-            </a:lvl4pPr>
-            <a:lvl5pPr marL="1828800" algn="l" defTabSz="914400" rtl="0" eaLnBrk="1" latinLnBrk="0" hangingPunct="1">
-              <a:defRPr sz="1800" kern="1200">
-                <a:solidFill>
-                  <a:schemeClr val="tx1"/>
-                </a:solidFill>
-                <a:latin typeface="+mn-lt"/>
-                <a:ea typeface="+mn-ea"/>
-                <a:cs typeface="+mn-cs"/>
-              </a:defRPr>
-            </a:lvl5pPr>
-            <a:lvl6pPr marL="2286000" algn="l" defTabSz="914400" rtl="0" eaLnBrk="1" latinLnBrk="0" hangingPunct="1">
-              <a:defRPr sz="1800" kern="1200">
-                <a:solidFill>
-                  <a:schemeClr val="tx1"/>
-                </a:solidFill>
-                <a:latin typeface="+mn-lt"/>
-                <a:ea typeface="+mn-ea"/>
-                <a:cs typeface="+mn-cs"/>
-              </a:defRPr>
-            </a:lvl6pPr>
-            <a:lvl7pPr marL="2743200" algn="l" defTabSz="914400" rtl="0" eaLnBrk="1" latinLnBrk="0" hangingPunct="1">
-              <a:defRPr sz="1800" kern="1200">
-                <a:solidFill>
-                  <a:schemeClr val="tx1"/>
-                </a:solidFill>
-                <a:latin typeface="+mn-lt"/>
-                <a:ea typeface="+mn-ea"/>
-                <a:cs typeface="+mn-cs"/>
-              </a:defRPr>
-            </a:lvl7pPr>
-            <a:lvl8pPr marL="3200400" algn="l" defTabSz="914400" rtl="0" eaLnBrk="1" latinLnBrk="0" hangingPunct="1">
-              <a:defRPr sz="1800" kern="1200">
-                <a:solidFill>
-                  <a:schemeClr val="tx1"/>
-                </a:solidFill>
-                <a:latin typeface="+mn-lt"/>
-                <a:ea typeface="+mn-ea"/>
-                <a:cs typeface="+mn-cs"/>
-              </a:defRPr>
-            </a:lvl8pPr>
-            <a:lvl9pPr marL="3657600" algn="l" defTabSz="914400" rtl="0" eaLnBrk="1" latinLnBrk="0" hangingPunct="1">
-              <a:defRPr sz="1800" kern="1200">
-                <a:solidFill>
-                  <a:schemeClr val="tx1"/>
-                </a:solidFill>
-                <a:latin typeface="+mn-lt"/>
-                <a:ea typeface="+mn-ea"/>
-                <a:cs typeface="+mn-cs"/>
-              </a:defRPr>
-            </a:lvl9pPr>
-          </a:lstStyle>
-          <a:p>
-            <a:fld id="{3EBA5BD7-F043-4D1B-AA17-CD412FC534DE}" type="slidenum">
+          <a:bodyPr/>
+          <a:lstStyle/>
+          <a:p>
+            <a:fld id="{2BF067CD-8E6B-4360-9AA8-C5DF2A48A6D1}" type="slidenum">
               <a:rPr lang="en-US" smtClean="0"/>
               <a:pPr/>
-              <a:t>42</a:t>
+              <a:t>30</a:t>
             </a:fld>
             <a:endParaRPr lang="en-US" dirty="0"/>
           </a:p>
@@ -1443,10 +1339,10 @@
       </p:sp>
       <p:sp>
         <p:nvSpPr>
-          <p:cNvPr id="5" name="Footer Placeholder 7">
+          <p:cNvPr id="6" name="Footer Placeholder 7">
             <a:extLst>
               <a:ext uri="{FF2B5EF4-FFF2-40B4-BE49-F238E27FC236}">
-                <a16:creationId xmlns:a16="http://schemas.microsoft.com/office/drawing/2014/main" id="{912A3AAE-885B-D70C-2870-9BDE460702C3}"/>
+                <a16:creationId xmlns:a16="http://schemas.microsoft.com/office/drawing/2014/main" id="{0DC922E6-CD6A-DFFC-200D-5E732211C95D}"/>
               </a:ext>
             </a:extLst>
           </p:cNvPr>
@@ -1499,7 +1395,7 @@
     </p:spTree>
     <p:extLst>
       <p:ext uri="{BB962C8B-B14F-4D97-AF65-F5344CB8AC3E}">
-        <p14:creationId xmlns:p14="http://schemas.microsoft.com/office/powerpoint/2010/main" val="1661027275"/>
+        <p14:creationId xmlns:p14="http://schemas.microsoft.com/office/powerpoint/2010/main" val="1532374807"/>
       </p:ext>
     </p:extLst>
   </p:cSld>
@@ -1562,6 +1458,252 @@
           <p:cNvPr id="7" name="Slide Number Placeholder 5">
             <a:extLst>
               <a:ext uri="{FF2B5EF4-FFF2-40B4-BE49-F238E27FC236}">
+                <a16:creationId xmlns:a16="http://schemas.microsoft.com/office/drawing/2014/main" id="{E65F1CA9-65DC-416B-8882-B3A5E415CE67}"/>
+              </a:ext>
+            </a:extLst>
+          </p:cNvPr>
+          <p:cNvSpPr txBox="1">
+            <a:spLocks/>
+          </p:cNvSpPr>
+          <p:nvPr/>
+        </p:nvSpPr>
+        <p:spPr>
+          <a:xfrm>
+            <a:off x="6488999" y="8847000"/>
+            <a:ext cx="367414" cy="297000"/>
+          </a:xfrm>
+          <a:prstGeom prst="rect">
+            <a:avLst/>
+          </a:prstGeom>
+        </p:spPr>
+        <p:txBody>
+          <a:bodyPr vert="horz" lIns="91440" tIns="45720" rIns="91440" bIns="45720" rtlCol="0" anchor="b"/>
+          <a:lstStyle>
+            <a:defPPr>
+              <a:defRPr lang="en-US"/>
+            </a:defPPr>
+            <a:lvl1pPr marL="0" algn="r" defTabSz="914400" rtl="0" eaLnBrk="1" latinLnBrk="0" hangingPunct="1">
+              <a:defRPr sz="1200" kern="1200">
+                <a:solidFill>
+                  <a:schemeClr val="tx1"/>
+                </a:solidFill>
+                <a:latin typeface="+mn-lt"/>
+                <a:ea typeface="+mn-ea"/>
+                <a:cs typeface="+mn-cs"/>
+              </a:defRPr>
+            </a:lvl1pPr>
+            <a:lvl2pPr marL="457200" algn="l" defTabSz="914400" rtl="0" eaLnBrk="1" latinLnBrk="0" hangingPunct="1">
+              <a:defRPr sz="1800" kern="1200">
+                <a:solidFill>
+                  <a:schemeClr val="tx1"/>
+                </a:solidFill>
+                <a:latin typeface="+mn-lt"/>
+                <a:ea typeface="+mn-ea"/>
+                <a:cs typeface="+mn-cs"/>
+              </a:defRPr>
+            </a:lvl2pPr>
+            <a:lvl3pPr marL="914400" algn="l" defTabSz="914400" rtl="0" eaLnBrk="1" latinLnBrk="0" hangingPunct="1">
+              <a:defRPr sz="1800" kern="1200">
+                <a:solidFill>
+                  <a:schemeClr val="tx1"/>
+                </a:solidFill>
+                <a:latin typeface="+mn-lt"/>
+                <a:ea typeface="+mn-ea"/>
+                <a:cs typeface="+mn-cs"/>
+              </a:defRPr>
+            </a:lvl3pPr>
+            <a:lvl4pPr marL="1371600" algn="l" defTabSz="914400" rtl="0" eaLnBrk="1" latinLnBrk="0" hangingPunct="1">
+              <a:defRPr sz="1800" kern="1200">
+                <a:solidFill>
+                  <a:schemeClr val="tx1"/>
+                </a:solidFill>
+                <a:latin typeface="+mn-lt"/>
+                <a:ea typeface="+mn-ea"/>
+                <a:cs typeface="+mn-cs"/>
+              </a:defRPr>
+            </a:lvl4pPr>
+            <a:lvl5pPr marL="1828800" algn="l" defTabSz="914400" rtl="0" eaLnBrk="1" latinLnBrk="0" hangingPunct="1">
+              <a:defRPr sz="1800" kern="1200">
+                <a:solidFill>
+                  <a:schemeClr val="tx1"/>
+                </a:solidFill>
+                <a:latin typeface="+mn-lt"/>
+                <a:ea typeface="+mn-ea"/>
+                <a:cs typeface="+mn-cs"/>
+              </a:defRPr>
+            </a:lvl5pPr>
+            <a:lvl6pPr marL="2286000" algn="l" defTabSz="914400" rtl="0" eaLnBrk="1" latinLnBrk="0" hangingPunct="1">
+              <a:defRPr sz="1800" kern="1200">
+                <a:solidFill>
+                  <a:schemeClr val="tx1"/>
+                </a:solidFill>
+                <a:latin typeface="+mn-lt"/>
+                <a:ea typeface="+mn-ea"/>
+                <a:cs typeface="+mn-cs"/>
+              </a:defRPr>
+            </a:lvl6pPr>
+            <a:lvl7pPr marL="2743200" algn="l" defTabSz="914400" rtl="0" eaLnBrk="1" latinLnBrk="0" hangingPunct="1">
+              <a:defRPr sz="1800" kern="1200">
+                <a:solidFill>
+                  <a:schemeClr val="tx1"/>
+                </a:solidFill>
+                <a:latin typeface="+mn-lt"/>
+                <a:ea typeface="+mn-ea"/>
+                <a:cs typeface="+mn-cs"/>
+              </a:defRPr>
+            </a:lvl7pPr>
+            <a:lvl8pPr marL="3200400" algn="l" defTabSz="914400" rtl="0" eaLnBrk="1" latinLnBrk="0" hangingPunct="1">
+              <a:defRPr sz="1800" kern="1200">
+                <a:solidFill>
+                  <a:schemeClr val="tx1"/>
+                </a:solidFill>
+                <a:latin typeface="+mn-lt"/>
+                <a:ea typeface="+mn-ea"/>
+                <a:cs typeface="+mn-cs"/>
+              </a:defRPr>
+            </a:lvl8pPr>
+            <a:lvl9pPr marL="3657600" algn="l" defTabSz="914400" rtl="0" eaLnBrk="1" latinLnBrk="0" hangingPunct="1">
+              <a:defRPr sz="1800" kern="1200">
+                <a:solidFill>
+                  <a:schemeClr val="tx1"/>
+                </a:solidFill>
+                <a:latin typeface="+mn-lt"/>
+                <a:ea typeface="+mn-ea"/>
+                <a:cs typeface="+mn-cs"/>
+              </a:defRPr>
+            </a:lvl9pPr>
+          </a:lstStyle>
+          <a:p>
+            <a:fld id="{3EBA5BD7-F043-4D1B-AA17-CD412FC534DE}" type="slidenum">
+              <a:rPr lang="en-US" smtClean="0"/>
+              <a:pPr/>
+              <a:t>42</a:t>
+            </a:fld>
+            <a:endParaRPr lang="en-US" dirty="0"/>
+          </a:p>
+        </p:txBody>
+      </p:sp>
+      <p:sp>
+        <p:nvSpPr>
+          <p:cNvPr id="5" name="Footer Placeholder 7">
+            <a:extLst>
+              <a:ext uri="{FF2B5EF4-FFF2-40B4-BE49-F238E27FC236}">
+                <a16:creationId xmlns:a16="http://schemas.microsoft.com/office/drawing/2014/main" id="{912A3AAE-885B-D70C-2870-9BDE460702C3}"/>
+              </a:ext>
+            </a:extLst>
+          </p:cNvPr>
+          <p:cNvSpPr>
+            <a:spLocks noGrp="1"/>
+          </p:cNvSpPr>
+          <p:nvPr>
+            <p:ph type="ftr" sz="quarter" idx="4"/>
+          </p:nvPr>
+        </p:nvSpPr>
+        <p:spPr>
+          <a:xfrm>
+            <a:off x="-1" y="8892000"/>
+            <a:ext cx="6488999" cy="252000"/>
+          </a:xfrm>
+          <a:prstGeom prst="rect">
+            <a:avLst/>
+          </a:prstGeom>
+        </p:spPr>
+        <p:txBody>
+          <a:bodyPr vert="horz" lIns="91440" tIns="45720" rIns="91440" bIns="45720" rtlCol="0" anchor="b"/>
+          <a:lstStyle>
+            <a:lvl1pPr algn="l">
+              <a:defRPr sz="1100"/>
+            </a:lvl1pPr>
+          </a:lstStyle>
+          <a:p>
+            <a:r>
+              <a:rPr lang="bg-BG" sz="1100" dirty="0"/>
+              <a:t>Работна група </a:t>
+            </a:r>
+            <a:r>
+              <a:rPr lang="bg-BG" dirty="0"/>
+              <a:t>"Образование по програмиране и ИТ"</a:t>
+            </a:r>
+            <a:r>
+              <a:rPr lang="bg-BG" sz="1100" dirty="0"/>
+              <a:t>, с подкрепата на </a:t>
+            </a:r>
+            <a:r>
+              <a:rPr lang="en-US" sz="1100" dirty="0">
+                <a:hlinkClick r:id="rId3"/>
+              </a:rPr>
+              <a:t>SoftUni</a:t>
+            </a:r>
+            <a:endParaRPr lang="en-US" sz="1100" dirty="0"/>
+          </a:p>
+        </p:txBody>
+      </p:sp>
+    </p:spTree>
+    <p:extLst>
+      <p:ext uri="{BB962C8B-B14F-4D97-AF65-F5344CB8AC3E}">
+        <p14:creationId xmlns:p14="http://schemas.microsoft.com/office/powerpoint/2010/main" val="1661027275"/>
+      </p:ext>
+    </p:extLst>
+  </p:cSld>
+  <p:clrMapOvr>
+    <a:masterClrMapping/>
+  </p:clrMapOvr>
+</p:notes>
+</file>
+
+<file path=ppt/notesSlides/notesSlide14.xml><?xml version="1.0" encoding="utf-8"?>
+<p:notes xmlns:a="http://schemas.openxmlformats.org/drawingml/2006/main" xmlns:r="http://schemas.openxmlformats.org/officeDocument/2006/relationships" xmlns:p="http://schemas.openxmlformats.org/presentationml/2006/main">
+  <p:cSld>
+    <p:spTree>
+      <p:nvGrpSpPr>
+        <p:cNvPr id="1" name=""/>
+        <p:cNvGrpSpPr/>
+        <p:nvPr/>
+      </p:nvGrpSpPr>
+      <p:grpSpPr>
+        <a:xfrm>
+          <a:off x="0" y="0"/>
+          <a:ext cx="0" cy="0"/>
+          <a:chOff x="0" y="0"/>
+          <a:chExt cx="0" cy="0"/>
+        </a:xfrm>
+      </p:grpSpPr>
+      <p:sp>
+        <p:nvSpPr>
+          <p:cNvPr id="2" name="Slide Image Placeholder 1"/>
+          <p:cNvSpPr>
+            <a:spLocks noGrp="1" noRot="1" noChangeAspect="1"/>
+          </p:cNvSpPr>
+          <p:nvPr>
+            <p:ph type="sldImg"/>
+          </p:nvPr>
+        </p:nvSpPr>
+        <p:spPr/>
+      </p:sp>
+      <p:sp>
+        <p:nvSpPr>
+          <p:cNvPr id="3" name="Notes Placeholder 2"/>
+          <p:cNvSpPr>
+            <a:spLocks noGrp="1"/>
+          </p:cNvSpPr>
+          <p:nvPr>
+            <p:ph type="body" idx="1"/>
+          </p:nvPr>
+        </p:nvSpPr>
+        <p:spPr/>
+        <p:txBody>
+          <a:bodyPr/>
+          <a:lstStyle/>
+          <a:p>
+            <a:endParaRPr lang="en-US" dirty="0"/>
+          </a:p>
+        </p:txBody>
+      </p:sp>
+      <p:sp>
+        <p:nvSpPr>
+          <p:cNvPr id="7" name="Slide Number Placeholder 5">
+            <a:extLst>
+              <a:ext uri="{FF2B5EF4-FFF2-40B4-BE49-F238E27FC236}">
                 <a16:creationId xmlns:a16="http://schemas.microsoft.com/office/drawing/2014/main" id="{5049B984-F964-47FF-8179-0A3007CE21CD}"/>
               </a:ext>
             </a:extLst>
@@ -1755,7 +1897,7 @@
 </p:notes>
 </file>
 
-<file path=ppt/notesSlides/notesSlide14.xml><?xml version="1.0" encoding="utf-8"?>
+<file path=ppt/notesSlides/notesSlide15.xml><?xml version="1.0" encoding="utf-8"?>
 <p:notes xmlns:a="http://schemas.openxmlformats.org/drawingml/2006/main" xmlns:r="http://schemas.openxmlformats.org/officeDocument/2006/relationships" xmlns:p="http://schemas.openxmlformats.org/presentationml/2006/main">
   <p:cSld>
     <p:spTree>
@@ -2300,9 +2442,7 @@
         </p:nvSpPr>
         <p:spPr/>
         <p:txBody>
-          <a:bodyPr>
-            <a:normAutofit/>
-          </a:bodyPr>
+          <a:bodyPr/>
           <a:lstStyle/>
           <a:p>
             <a:endParaRPr lang="en-US" dirty="0"/>
@@ -2316,7 +2456,7 @@
             <a:spLocks noGrp="1"/>
           </p:cNvSpPr>
           <p:nvPr>
-            <p:ph type="sldNum" sz="quarter" idx="10"/>
+            <p:ph type="sldNum" sz="quarter" idx="5"/>
           </p:nvPr>
         </p:nvSpPr>
         <p:spPr/>
@@ -2326,8 +2466,7 @@
           <a:p>
             <a:fld id="{2BF067CD-8E6B-4360-9AA8-C5DF2A48A6D1}" type="slidenum">
               <a:rPr lang="en-US" smtClean="0"/>
-              <a:pPr/>
-              <a:t>12</a:t>
+              <a:t>4</a:t>
             </a:fld>
             <a:endParaRPr lang="en-US" dirty="0"/>
           </a:p>
@@ -2335,13 +2474,7 @@
       </p:sp>
       <p:sp>
         <p:nvSpPr>
-          <p:cNvPr id="6" name="Footer Placeholder 7">
-            <a:extLst>
-              <a:ext uri="{FF2B5EF4-FFF2-40B4-BE49-F238E27FC236}">
-                <a16:creationId xmlns:a16="http://schemas.microsoft.com/office/drawing/2014/main" id="{57BD34A9-61F6-28B6-ECB9-7376D465D4AD}"/>
-              </a:ext>
-            </a:extLst>
-          </p:cNvPr>
+          <p:cNvPr id="5" name="Footer Placeholder 4"/>
           <p:cNvSpPr>
             <a:spLocks noGrp="1"/>
           </p:cNvSpPr>
@@ -2349,37 +2482,25 @@
             <p:ph type="ftr" sz="quarter" idx="4"/>
           </p:nvPr>
         </p:nvSpPr>
-        <p:spPr>
-          <a:xfrm>
-            <a:off x="-1" y="8892000"/>
-            <a:ext cx="6488999" cy="252000"/>
-          </a:xfrm>
-          <a:prstGeom prst="rect">
-            <a:avLst/>
-          </a:prstGeom>
-        </p:spPr>
+        <p:spPr/>
         <p:txBody>
-          <a:bodyPr vert="horz" lIns="91440" tIns="45720" rIns="91440" bIns="45720" rtlCol="0" anchor="b"/>
-          <a:lstStyle>
-            <a:lvl1pPr algn="l">
-              <a:defRPr sz="1100"/>
-            </a:lvl1pPr>
-          </a:lstStyle>
-          <a:p>
-            <a:r>
-              <a:rPr lang="bg-BG" sz="1100" dirty="0"/>
+          <a:bodyPr/>
+          <a:lstStyle/>
+          <a:p>
+            <a:r>
+              <a:rPr lang="bg-BG" sz="1100"/>
               <a:t>Работна група </a:t>
             </a:r>
             <a:r>
-              <a:rPr lang="bg-BG" dirty="0"/>
+              <a:rPr lang="bg-BG"/>
               <a:t>"Образование по програмиране и ИТ"</a:t>
             </a:r>
             <a:r>
-              <a:rPr lang="bg-BG" sz="1100" dirty="0"/>
+              <a:rPr lang="bg-BG" sz="1100"/>
               <a:t>, с подкрепата на </a:t>
             </a:r>
             <a:r>
-              <a:rPr lang="en-US" sz="1100" dirty="0">
+              <a:rPr lang="en-US" sz="1100">
                 <a:hlinkClick r:id="rId3"/>
               </a:rPr>
               <a:t>SoftUni</a:t>
@@ -2391,7 +2512,7 @@
     </p:spTree>
     <p:extLst>
       <p:ext uri="{BB962C8B-B14F-4D97-AF65-F5344CB8AC3E}">
-        <p14:creationId xmlns:p14="http://schemas.microsoft.com/office/powerpoint/2010/main" val="531495249"/>
+        <p14:creationId xmlns:p14="http://schemas.microsoft.com/office/powerpoint/2010/main" val="4046548045"/>
       </p:ext>
     </p:extLst>
   </p:cSld>
@@ -2469,7 +2590,7 @@
             <a:fld id="{2BF067CD-8E6B-4360-9AA8-C5DF2A48A6D1}" type="slidenum">
               <a:rPr lang="en-US" smtClean="0"/>
               <a:pPr/>
-              <a:t>16</a:t>
+              <a:t>12</a:t>
             </a:fld>
             <a:endParaRPr lang="en-US" dirty="0"/>
           </a:p>
@@ -2480,7 +2601,7 @@
           <p:cNvPr id="6" name="Footer Placeholder 7">
             <a:extLst>
               <a:ext uri="{FF2B5EF4-FFF2-40B4-BE49-F238E27FC236}">
-                <a16:creationId xmlns:a16="http://schemas.microsoft.com/office/drawing/2014/main" id="{2B0A9A5B-352E-1A1F-4B1F-52F340567494}"/>
+                <a16:creationId xmlns:a16="http://schemas.microsoft.com/office/drawing/2014/main" id="{57BD34A9-61F6-28B6-ECB9-7376D465D4AD}"/>
               </a:ext>
             </a:extLst>
           </p:cNvPr>
@@ -2533,7 +2654,7 @@
     </p:spTree>
     <p:extLst>
       <p:ext uri="{BB962C8B-B14F-4D97-AF65-F5344CB8AC3E}">
-        <p14:creationId xmlns:p14="http://schemas.microsoft.com/office/powerpoint/2010/main" val="3754270084"/>
+        <p14:creationId xmlns:p14="http://schemas.microsoft.com/office/powerpoint/2010/main" val="531495249"/>
       </p:ext>
     </p:extLst>
   </p:cSld>
@@ -2611,7 +2732,7 @@
             <a:fld id="{2BF067CD-8E6B-4360-9AA8-C5DF2A48A6D1}" type="slidenum">
               <a:rPr lang="en-US" smtClean="0"/>
               <a:pPr/>
-              <a:t>17</a:t>
+              <a:t>16</a:t>
             </a:fld>
             <a:endParaRPr lang="en-US" dirty="0"/>
           </a:p>
@@ -2675,7 +2796,7 @@
     </p:spTree>
     <p:extLst>
       <p:ext uri="{BB962C8B-B14F-4D97-AF65-F5344CB8AC3E}">
-        <p14:creationId xmlns:p14="http://schemas.microsoft.com/office/powerpoint/2010/main" val="2894549338"/>
+        <p14:creationId xmlns:p14="http://schemas.microsoft.com/office/powerpoint/2010/main" val="3754270084"/>
       </p:ext>
     </p:extLst>
   </p:cSld>
@@ -2726,7 +2847,9 @@
         </p:nvSpPr>
         <p:spPr/>
         <p:txBody>
-          <a:bodyPr/>
+          <a:bodyPr>
+            <a:normAutofit/>
+          </a:bodyPr>
           <a:lstStyle/>
           <a:p>
             <a:endParaRPr lang="en-US" dirty="0"/>
@@ -2740,7 +2863,7 @@
             <a:spLocks noGrp="1"/>
           </p:cNvSpPr>
           <p:nvPr>
-            <p:ph type="sldNum" sz="quarter" idx="5"/>
+            <p:ph type="sldNum" sz="quarter" idx="10"/>
           </p:nvPr>
         </p:nvSpPr>
         <p:spPr/>
@@ -2750,7 +2873,8 @@
           <a:p>
             <a:fld id="{2BF067CD-8E6B-4360-9AA8-C5DF2A48A6D1}" type="slidenum">
               <a:rPr lang="en-US" smtClean="0"/>
-              <a:t>21</a:t>
+              <a:pPr/>
+              <a:t>17</a:t>
             </a:fld>
             <a:endParaRPr lang="en-US" dirty="0"/>
           </a:p>
@@ -2758,7 +2882,13 @@
       </p:sp>
       <p:sp>
         <p:nvSpPr>
-          <p:cNvPr id="5" name="Footer Placeholder 4"/>
+          <p:cNvPr id="6" name="Footer Placeholder 7">
+            <a:extLst>
+              <a:ext uri="{FF2B5EF4-FFF2-40B4-BE49-F238E27FC236}">
+                <a16:creationId xmlns:a16="http://schemas.microsoft.com/office/drawing/2014/main" id="{2B0A9A5B-352E-1A1F-4B1F-52F340567494}"/>
+              </a:ext>
+            </a:extLst>
+          </p:cNvPr>
           <p:cNvSpPr>
             <a:spLocks noGrp="1"/>
           </p:cNvSpPr>
@@ -2766,25 +2896,37 @@
             <p:ph type="ftr" sz="quarter" idx="4"/>
           </p:nvPr>
         </p:nvSpPr>
-        <p:spPr/>
+        <p:spPr>
+          <a:xfrm>
+            <a:off x="-1" y="8892000"/>
+            <a:ext cx="6488999" cy="252000"/>
+          </a:xfrm>
+          <a:prstGeom prst="rect">
+            <a:avLst/>
+          </a:prstGeom>
+        </p:spPr>
         <p:txBody>
-          <a:bodyPr/>
-          <a:lstStyle/>
-          <a:p>
-            <a:r>
-              <a:rPr lang="bg-BG" sz="1100"/>
+          <a:bodyPr vert="horz" lIns="91440" tIns="45720" rIns="91440" bIns="45720" rtlCol="0" anchor="b"/>
+          <a:lstStyle>
+            <a:lvl1pPr algn="l">
+              <a:defRPr sz="1100"/>
+            </a:lvl1pPr>
+          </a:lstStyle>
+          <a:p>
+            <a:r>
+              <a:rPr lang="bg-BG" sz="1100" dirty="0"/>
               <a:t>Работна група </a:t>
             </a:r>
             <a:r>
-              <a:rPr lang="bg-BG"/>
+              <a:rPr lang="bg-BG" dirty="0"/>
               <a:t>"Образование по програмиране и ИТ"</a:t>
             </a:r>
             <a:r>
-              <a:rPr lang="bg-BG" sz="1100"/>
+              <a:rPr lang="bg-BG" sz="1100" dirty="0"/>
               <a:t>, с подкрепата на </a:t>
             </a:r>
             <a:r>
-              <a:rPr lang="en-US" sz="1100">
+              <a:rPr lang="en-US" sz="1100" dirty="0">
                 <a:hlinkClick r:id="rId3"/>
               </a:rPr>
               <a:t>SoftUni</a:t>
@@ -2796,7 +2938,7 @@
     </p:spTree>
     <p:extLst>
       <p:ext uri="{BB962C8B-B14F-4D97-AF65-F5344CB8AC3E}">
-        <p14:creationId xmlns:p14="http://schemas.microsoft.com/office/powerpoint/2010/main" val="1901565328"/>
+        <p14:creationId xmlns:p14="http://schemas.microsoft.com/office/powerpoint/2010/main" val="2894549338"/>
       </p:ext>
     </p:extLst>
   </p:cSld>
@@ -2871,7 +3013,7 @@
           <a:p>
             <a:fld id="{2BF067CD-8E6B-4360-9AA8-C5DF2A48A6D1}" type="slidenum">
               <a:rPr lang="en-US" smtClean="0"/>
-              <a:t>22</a:t>
+              <a:t>21</a:t>
             </a:fld>
             <a:endParaRPr lang="en-US" dirty="0"/>
           </a:p>
@@ -2917,7 +3059,7 @@
     </p:spTree>
     <p:extLst>
       <p:ext uri="{BB962C8B-B14F-4D97-AF65-F5344CB8AC3E}">
-        <p14:creationId xmlns:p14="http://schemas.microsoft.com/office/powerpoint/2010/main" val="4027159490"/>
+        <p14:creationId xmlns:p14="http://schemas.microsoft.com/office/powerpoint/2010/main" val="1901565328"/>
       </p:ext>
     </p:extLst>
   </p:cSld>
@@ -2968,9 +3110,7 @@
         </p:nvSpPr>
         <p:spPr/>
         <p:txBody>
-          <a:bodyPr>
-            <a:normAutofit/>
-          </a:bodyPr>
+          <a:bodyPr/>
           <a:lstStyle/>
           <a:p>
             <a:endParaRPr lang="en-US" dirty="0"/>
@@ -2984,7 +3124,7 @@
             <a:spLocks noGrp="1"/>
           </p:cNvSpPr>
           <p:nvPr>
-            <p:ph type="sldNum" sz="quarter" idx="10"/>
+            <p:ph type="sldNum" sz="quarter" idx="5"/>
           </p:nvPr>
         </p:nvSpPr>
         <p:spPr/>
@@ -2994,8 +3134,7 @@
           <a:p>
             <a:fld id="{2BF067CD-8E6B-4360-9AA8-C5DF2A48A6D1}" type="slidenum">
               <a:rPr lang="en-US" smtClean="0"/>
-              <a:pPr/>
-              <a:t>26</a:t>
+              <a:t>22</a:t>
             </a:fld>
             <a:endParaRPr lang="en-US" dirty="0"/>
           </a:p>
@@ -3003,13 +3142,7 @@
       </p:sp>
       <p:sp>
         <p:nvSpPr>
-          <p:cNvPr id="6" name="Footer Placeholder 7">
-            <a:extLst>
-              <a:ext uri="{FF2B5EF4-FFF2-40B4-BE49-F238E27FC236}">
-                <a16:creationId xmlns:a16="http://schemas.microsoft.com/office/drawing/2014/main" id="{3010C10F-5C2B-94DA-D9E4-44AF4A5C6992}"/>
-              </a:ext>
-            </a:extLst>
-          </p:cNvPr>
+          <p:cNvPr id="5" name="Footer Placeholder 4"/>
           <p:cNvSpPr>
             <a:spLocks noGrp="1"/>
           </p:cNvSpPr>
@@ -3017,37 +3150,25 @@
             <p:ph type="ftr" sz="quarter" idx="4"/>
           </p:nvPr>
         </p:nvSpPr>
-        <p:spPr>
-          <a:xfrm>
-            <a:off x="-1" y="8892000"/>
-            <a:ext cx="6488999" cy="252000"/>
-          </a:xfrm>
-          <a:prstGeom prst="rect">
-            <a:avLst/>
-          </a:prstGeom>
-        </p:spPr>
+        <p:spPr/>
         <p:txBody>
-          <a:bodyPr vert="horz" lIns="91440" tIns="45720" rIns="91440" bIns="45720" rtlCol="0" anchor="b"/>
-          <a:lstStyle>
-            <a:lvl1pPr algn="l">
-              <a:defRPr sz="1100"/>
-            </a:lvl1pPr>
-          </a:lstStyle>
-          <a:p>
-            <a:r>
-              <a:rPr lang="bg-BG" sz="1100" dirty="0"/>
+          <a:bodyPr/>
+          <a:lstStyle/>
+          <a:p>
+            <a:r>
+              <a:rPr lang="bg-BG" sz="1100"/>
               <a:t>Работна група </a:t>
             </a:r>
             <a:r>
-              <a:rPr lang="bg-BG" dirty="0"/>
+              <a:rPr lang="bg-BG"/>
               <a:t>"Образование по програмиране и ИТ"</a:t>
             </a:r>
             <a:r>
-              <a:rPr lang="bg-BG" sz="1100" dirty="0"/>
+              <a:rPr lang="bg-BG" sz="1100"/>
               <a:t>, с подкрепата на </a:t>
             </a:r>
             <a:r>
-              <a:rPr lang="en-US" sz="1100" dirty="0">
+              <a:rPr lang="en-US" sz="1100">
                 <a:hlinkClick r:id="rId3"/>
               </a:rPr>
               <a:t>SoftUni</a:t>
@@ -3059,7 +3180,7 @@
     </p:spTree>
     <p:extLst>
       <p:ext uri="{BB962C8B-B14F-4D97-AF65-F5344CB8AC3E}">
-        <p14:creationId xmlns:p14="http://schemas.microsoft.com/office/powerpoint/2010/main" val="2470511223"/>
+        <p14:creationId xmlns:p14="http://schemas.microsoft.com/office/powerpoint/2010/main" val="4027159490"/>
       </p:ext>
     </p:extLst>
   </p:cSld>
@@ -3137,7 +3258,7 @@
             <a:fld id="{2BF067CD-8E6B-4360-9AA8-C5DF2A48A6D1}" type="slidenum">
               <a:rPr lang="en-US" smtClean="0"/>
               <a:pPr/>
-              <a:t>27</a:t>
+              <a:t>26</a:t>
             </a:fld>
             <a:endParaRPr lang="en-US" dirty="0"/>
           </a:p>
@@ -3148,7 +3269,7 @@
           <p:cNvPr id="6" name="Footer Placeholder 7">
             <a:extLst>
               <a:ext uri="{FF2B5EF4-FFF2-40B4-BE49-F238E27FC236}">
-                <a16:creationId xmlns:a16="http://schemas.microsoft.com/office/drawing/2014/main" id="{71B6FEE5-3694-5CFB-E58C-1EF4E10412F3}"/>
+                <a16:creationId xmlns:a16="http://schemas.microsoft.com/office/drawing/2014/main" id="{3010C10F-5C2B-94DA-D9E4-44AF4A5C6992}"/>
               </a:ext>
             </a:extLst>
           </p:cNvPr>
@@ -3201,7 +3322,7 @@
     </p:spTree>
     <p:extLst>
       <p:ext uri="{BB962C8B-B14F-4D97-AF65-F5344CB8AC3E}">
-        <p14:creationId xmlns:p14="http://schemas.microsoft.com/office/powerpoint/2010/main" val="1117642675"/>
+        <p14:creationId xmlns:p14="http://schemas.microsoft.com/office/powerpoint/2010/main" val="2470511223"/>
       </p:ext>
     </p:extLst>
   </p:cSld>
@@ -8532,7 +8653,7 @@
           <p:cNvPr id="2" name="Slide Number Placeholder 1">
             <a:extLst>
               <a:ext uri="{FF2B5EF4-FFF2-40B4-BE49-F238E27FC236}">
-                <a16:creationId xmlns:a16="http://schemas.microsoft.com/office/drawing/2014/main" id="{4A451BBE-07CA-CD8A-918C-AEC30C3F0AFF}"/>
+                <a16:creationId xmlns:a16="http://schemas.microsoft.com/office/drawing/2014/main" id="{55C31C9B-464B-265F-DF9C-24209503F6A3}"/>
               </a:ext>
             </a:extLst>
           </p:cNvPr>
@@ -8543,12 +8664,7 @@
             <p:ph type="sldNum" sz="quarter" idx="5"/>
           </p:nvPr>
         </p:nvSpPr>
-        <p:spPr>
-          <a:xfrm>
-            <a:off x="11753030" y="6507000"/>
-            <a:ext cx="367414" cy="297000"/>
-          </a:xfrm>
-        </p:spPr>
+        <p:spPr/>
         <p:txBody>
           <a:bodyPr/>
           <a:lstStyle/>
@@ -8567,7 +8683,7 @@
           <p:cNvPr id="3" name="Text Placeholder 2">
             <a:extLst>
               <a:ext uri="{FF2B5EF4-FFF2-40B4-BE49-F238E27FC236}">
-                <a16:creationId xmlns:a16="http://schemas.microsoft.com/office/drawing/2014/main" id="{EAA45F43-20C9-2083-32CF-9F5094C8FFF4}"/>
+                <a16:creationId xmlns:a16="http://schemas.microsoft.com/office/drawing/2014/main" id="{E2CC61BB-B002-69C8-E794-6FD5039D5408}"/>
               </a:ext>
             </a:extLst>
           </p:cNvPr>
@@ -8578,68 +8694,22 @@
             <p:ph type="body" sz="quarter" idx="10"/>
           </p:nvPr>
         </p:nvSpPr>
-        <p:spPr>
-          <a:xfrm>
-            <a:off x="190402" y="1196125"/>
-            <a:ext cx="11818096" cy="5528766"/>
-          </a:xfrm>
-        </p:spPr>
+        <p:spPr/>
         <p:txBody>
           <a:bodyPr/>
           <a:lstStyle/>
           <a:p>
             <a:r>
               <a:rPr lang="bg-BG" dirty="0"/>
-              <a:t>Натиснете </a:t>
-            </a:r>
-            <a:r>
-              <a:rPr lang="en-US" dirty="0"/>
-              <a:t>[</a:t>
-            </a:r>
-            <a:r>
-              <a:rPr lang="en-US" b="1" dirty="0"/>
-              <a:t>Install apps</a:t>
-            </a:r>
-            <a:r>
-              <a:rPr lang="en-US" dirty="0"/>
-              <a:t>] -&gt; </a:t>
-            </a:r>
-            <a:r>
-              <a:rPr lang="en-US" b="1" dirty="0"/>
-              <a:t>Microsoft 365 apps</a:t>
-            </a:r>
-            <a:endParaRPr lang="bg-BG" b="1" dirty="0"/>
-          </a:p>
-          <a:p>
-            <a:r>
-              <a:rPr lang="bg-BG" dirty="0"/>
-              <a:t>Следвайте </a:t>
-            </a:r>
-            <a:r>
-              <a:rPr lang="bg-BG" b="1" dirty="0">
-                <a:solidFill>
-                  <a:schemeClr val="bg1"/>
-                </a:solidFill>
-              </a:rPr>
-              <a:t>стъпките</a:t>
-            </a:r>
-            <a:r>
-              <a:rPr lang="bg-BG" dirty="0"/>
-              <a:t> за </a:t>
-            </a:r>
-            <a:r>
-              <a:rPr lang="bg-BG" b="1" dirty="0">
-                <a:solidFill>
-                  <a:schemeClr val="bg1"/>
-                </a:solidFill>
-              </a:rPr>
-              <a:t>инсталация</a:t>
-            </a:r>
-            <a:endParaRPr lang="en-US" b="1" dirty="0">
-              <a:solidFill>
-                <a:schemeClr val="bg1"/>
-              </a:solidFill>
-            </a:endParaRPr>
+              <a:t>Отворете </a:t>
+            </a:r>
+            <a:r>
+              <a:rPr lang="en-US" dirty="0">
+                <a:hlinkClick r:id="rId2"/>
+              </a:rPr>
+              <a:t>https://portal.office.com/account/#installs</a:t>
+            </a:r>
+            <a:endParaRPr lang="en-US" dirty="0"/>
           </a:p>
         </p:txBody>
       </p:sp>
@@ -8648,7 +8718,7 @@
           <p:cNvPr id="4" name="Title 3">
             <a:extLst>
               <a:ext uri="{FF2B5EF4-FFF2-40B4-BE49-F238E27FC236}">
-                <a16:creationId xmlns:a16="http://schemas.microsoft.com/office/drawing/2014/main" id="{1C1DF142-959E-5E61-B324-ACE4BFAFB646}"/>
+                <a16:creationId xmlns:a16="http://schemas.microsoft.com/office/drawing/2014/main" id="{A4A1CEA1-A1C8-38B3-C56A-4FAA18B0866E}"/>
               </a:ext>
             </a:extLst>
           </p:cNvPr>
@@ -8659,12 +8729,7 @@
             <p:ph type="title"/>
           </p:nvPr>
         </p:nvSpPr>
-        <p:spPr>
-          <a:xfrm>
-            <a:off x="190406" y="100750"/>
-            <a:ext cx="10270594" cy="882654"/>
-          </a:xfrm>
-        </p:spPr>
+        <p:spPr/>
         <p:txBody>
           <a:bodyPr/>
           <a:lstStyle/>
@@ -8679,7 +8744,7 @@
             </a:r>
             <a:r>
               <a:rPr lang="bg-BG" dirty="0"/>
-              <a:t> (2)</a:t>
+              <a:t> – Различен Подход</a:t>
             </a:r>
             <a:endParaRPr lang="en-US" dirty="0"/>
           </a:p>
@@ -8687,47 +8752,10 @@
       </p:sp>
       <p:pic>
         <p:nvPicPr>
-          <p:cNvPr id="5" name="Picture 4" descr="A screenshot of a computer&#10;&#10;Description automatically generated">
+          <p:cNvPr id="6" name="Picture 5">
             <a:extLst>
               <a:ext uri="{FF2B5EF4-FFF2-40B4-BE49-F238E27FC236}">
-                <a16:creationId xmlns:a16="http://schemas.microsoft.com/office/drawing/2014/main" id="{325AD31C-35A2-CDE2-BF6C-CBD0AE1100C8}"/>
-              </a:ext>
-            </a:extLst>
-          </p:cNvPr>
-          <p:cNvPicPr>
-            <a:picLocks noChangeAspect="1"/>
-          </p:cNvPicPr>
-          <p:nvPr/>
-        </p:nvPicPr>
-        <p:blipFill>
-          <a:blip r:embed="rId2"/>
-          <a:stretch>
-            <a:fillRect/>
-          </a:stretch>
-        </p:blipFill>
-        <p:spPr>
-          <a:xfrm>
-            <a:off x="267502" y="2799000"/>
-            <a:ext cx="5468498" cy="3368985"/>
-          </a:xfrm>
-          <a:prstGeom prst="rect">
-            <a:avLst/>
-          </a:prstGeom>
-          <a:ln>
-            <a:solidFill>
-              <a:schemeClr val="bg2">
-                <a:lumMod val="75000"/>
-              </a:schemeClr>
-            </a:solidFill>
-          </a:ln>
-        </p:spPr>
-      </p:pic>
-      <p:pic>
-        <p:nvPicPr>
-          <p:cNvPr id="6" name="Picture 5" descr="A screenshot of a computer&#10;&#10;Description automatically generated">
-            <a:extLst>
-              <a:ext uri="{FF2B5EF4-FFF2-40B4-BE49-F238E27FC236}">
-                <a16:creationId xmlns:a16="http://schemas.microsoft.com/office/drawing/2014/main" id="{31B6ADDD-F6B8-699B-D022-5C3897E6BD39}"/>
+                <a16:creationId xmlns:a16="http://schemas.microsoft.com/office/drawing/2014/main" id="{BE00EF3E-84D1-2BF2-0D86-9F90C8C66AFE}"/>
               </a:ext>
             </a:extLst>
           </p:cNvPr>
@@ -8744,8 +8772,8 @@
         </p:blipFill>
         <p:spPr>
           <a:xfrm>
-            <a:off x="6231000" y="2799001"/>
-            <a:ext cx="5592645" cy="3368985"/>
+            <a:off x="381000" y="1987188"/>
+            <a:ext cx="9000002" cy="4560100"/>
           </a:xfrm>
           <a:prstGeom prst="rect">
             <a:avLst/>
@@ -8759,10 +8787,96 @@
           </a:ln>
         </p:spPr>
       </p:pic>
+      <p:sp>
+        <p:nvSpPr>
+          <p:cNvPr id="7" name="AutoShape 7">
+            <a:extLst>
+              <a:ext uri="{FF2B5EF4-FFF2-40B4-BE49-F238E27FC236}">
+                <a16:creationId xmlns:a16="http://schemas.microsoft.com/office/drawing/2014/main" id="{F7470F73-3C08-8244-4ACC-63FEEC1A1C95}"/>
+              </a:ext>
+            </a:extLst>
+          </p:cNvPr>
+          <p:cNvSpPr>
+            <a:spLocks noChangeArrowheads="1"/>
+          </p:cNvSpPr>
+          <p:nvPr/>
+        </p:nvSpPr>
+        <p:spPr bwMode="auto">
+          <a:xfrm>
+            <a:off x="9653111" y="2067374"/>
+            <a:ext cx="1842889" cy="1350000"/>
+          </a:xfrm>
+          <a:prstGeom prst="wedgeRoundRectCallout">
+            <a:avLst>
+              <a:gd name="adj1" fmla="val -82175"/>
+              <a:gd name="adj2" fmla="val 44192"/>
+              <a:gd name="adj3" fmla="val 16667"/>
+            </a:avLst>
+          </a:prstGeom>
+          <a:solidFill>
+            <a:schemeClr val="dk2">
+              <a:alpha val="80000"/>
+            </a:schemeClr>
+          </a:solidFill>
+          <a:ln w="19050">
+            <a:solidFill>
+              <a:schemeClr val="tx1">
+                <a:lumMod val="75000"/>
+                <a:alpha val="80000"/>
+              </a:schemeClr>
+            </a:solidFill>
+          </a:ln>
+          <a:effectLst/>
+        </p:spPr>
+        <p:style>
+          <a:lnRef idx="2">
+            <a:schemeClr val="accent1">
+              <a:shade val="50000"/>
+            </a:schemeClr>
+          </a:lnRef>
+          <a:fillRef idx="1001">
+            <a:schemeClr val="dk2"/>
+          </a:fillRef>
+          <a:effectRef idx="0">
+            <a:schemeClr val="accent1"/>
+          </a:effectRef>
+          <a:fontRef idx="minor">
+            <a:schemeClr val="lt1"/>
+          </a:fontRef>
+        </p:style>
+        <p:txBody>
+          <a:bodyPr rot="0" spcFirstLastPara="0" vertOverflow="overflow" horzOverflow="overflow" vert="horz" wrap="square" lIns="91416" tIns="45708" rIns="91416" bIns="45708" numCol="1" spcCol="0" rtlCol="0" fromWordArt="0" anchor="ctr" anchorCtr="0" forceAA="0" compatLnSpc="1">
+            <a:prstTxWarp prst="textNoShape">
+              <a:avLst/>
+            </a:prstTxWarp>
+            <a:noAutofit/>
+          </a:bodyPr>
+          <a:lstStyle/>
+          <a:p>
+            <a:pPr algn="ctr"/>
+            <a:r>
+              <a:rPr lang="bg-BG" sz="2399" b="1" noProof="1">
+                <a:solidFill>
+                  <a:srgbClr val="FFFFFF"/>
+                </a:solidFill>
+              </a:rPr>
+              <a:t>Изисква се лиценз за </a:t>
+            </a:r>
+            <a:r>
+              <a:rPr lang="en-US" sz="2399" b="1" noProof="1">
+                <a:solidFill>
+                  <a:srgbClr val="FFFFFF"/>
+                </a:solidFill>
+              </a:rPr>
+              <a:t>Office 365</a:t>
+            </a:r>
+          </a:p>
+        </p:txBody>
+      </p:sp>
     </p:spTree>
     <p:extLst>
       <p:ext uri="{BB962C8B-B14F-4D97-AF65-F5344CB8AC3E}">
-        <p14:creationId xmlns:p14="http://schemas.microsoft.com/office/powerpoint/2010/main" val="750093445"/>
+        <p14:creationId xmlns:p14="http://schemas.microsoft.com/office/powerpoint/2010/main" val="1012029274"/>
       </p:ext>
     </p:extLst>
   </p:cSld>
@@ -8798,7 +8912,7 @@
                             </p:stCondLst>
                             <p:childTnLst>
                               <p:par>
-                                <p:cTn id="5" presetID="1" presetClass="entr" presetSubtype="0" fill="hold" nodeType="clickEffect">
+                                <p:cTn id="5" presetID="1" presetClass="entr" presetSubtype="0" fill="hold" grpId="0" nodeType="clickEffect">
                                   <p:stCondLst>
                                     <p:cond delay="0"/>
                                   </p:stCondLst>
@@ -8811,38 +8925,7 @@
                                           </p:stCondLst>
                                         </p:cTn>
                                         <p:tgtEl>
-                                          <p:spTgt spid="3">
-                                            <p:txEl>
-                                              <p:pRg st="1" end="1"/>
-                                            </p:txEl>
-                                          </p:spTgt>
-                                        </p:tgtEl>
-                                        <p:attrNameLst>
-                                          <p:attrName>style.visibility</p:attrName>
-                                        </p:attrNameLst>
-                                      </p:cBhvr>
-                                      <p:to>
-                                        <p:strVal val="visible"/>
-                                      </p:to>
-                                    </p:set>
-                                  </p:childTnLst>
-                                </p:cTn>
-                              </p:par>
-                              <p:par>
-                                <p:cTn id="7" presetID="1" presetClass="entr" presetSubtype="0" fill="hold" nodeType="withEffect">
-                                  <p:stCondLst>
-                                    <p:cond delay="0"/>
-                                  </p:stCondLst>
-                                  <p:childTnLst>
-                                    <p:set>
-                                      <p:cBhvr>
-                                        <p:cTn id="8" dur="1" fill="hold">
-                                          <p:stCondLst>
-                                            <p:cond delay="0"/>
-                                          </p:stCondLst>
-                                        </p:cTn>
-                                        <p:tgtEl>
-                                          <p:spTgt spid="6"/>
+                                          <p:spTgt spid="7"/>
                                         </p:tgtEl>
                                         <p:attrNameLst>
                                           <p:attrName>style.visibility</p:attrName>
@@ -8882,6 +8965,9 @@
         </p:cTn>
       </p:par>
     </p:tnLst>
+    <p:bldLst>
+      <p:bldP spid="7" grpId="0" animBg="1"/>
+    </p:bldLst>
   </p:timing>
 </p:sld>
 </file>
@@ -9119,7 +9205,39 @@
           <a:p>
             <a:r>
               <a:rPr lang="bg-BG" dirty="0"/>
-              <a:t>Изберете име на файл и местоположение</a:t>
+              <a:t>Задайте </a:t>
+            </a:r>
+            <a:r>
+              <a:rPr lang="bg-BG" b="1" dirty="0">
+                <a:solidFill>
+                  <a:schemeClr val="bg1"/>
+                </a:solidFill>
+              </a:rPr>
+              <a:t>име</a:t>
+            </a:r>
+            <a:r>
+              <a:rPr lang="bg-BG" dirty="0"/>
+              <a:t> на </a:t>
+            </a:r>
+            <a:r>
+              <a:rPr lang="bg-BG" b="1" dirty="0">
+                <a:solidFill>
+                  <a:schemeClr val="bg1"/>
+                </a:solidFill>
+              </a:rPr>
+              <a:t>файл</a:t>
+            </a:r>
+            <a:r>
+              <a:rPr lang="bg-BG" dirty="0"/>
+              <a:t> и </a:t>
+            </a:r>
+            <a:r>
+              <a:rPr lang="bg-BG" b="1" dirty="0">
+                <a:solidFill>
+                  <a:schemeClr val="bg1"/>
+                </a:solidFill>
+              </a:rPr>
+              <a:t>местоположение</a:t>
             </a:r>
             <a:endParaRPr lang="ru-RU" b="1" dirty="0">
               <a:solidFill>
@@ -9777,33 +9895,15 @@
                                   </p:childTnLst>
                                 </p:cTn>
                               </p:par>
-                            </p:childTnLst>
-                          </p:cTn>
-                        </p:par>
-                      </p:childTnLst>
-                    </p:cTn>
-                  </p:par>
-                  <p:par>
-                    <p:cTn id="7" fill="hold">
-                      <p:stCondLst>
-                        <p:cond delay="indefinite"/>
-                      </p:stCondLst>
-                      <p:childTnLst>
-                        <p:par>
-                          <p:cTn id="8" fill="hold">
-                            <p:stCondLst>
-                              <p:cond delay="0"/>
-                            </p:stCondLst>
-                            <p:childTnLst>
                               <p:par>
-                                <p:cTn id="9" presetID="1" presetClass="entr" presetSubtype="0" fill="hold" nodeType="clickEffect">
+                                <p:cTn id="7" presetID="1" presetClass="entr" presetSubtype="0" fill="hold" nodeType="withEffect">
                                   <p:stCondLst>
                                     <p:cond delay="0"/>
                                   </p:stCondLst>
                                   <p:childTnLst>
                                     <p:set>
                                       <p:cBhvr>
-                                        <p:cTn id="10" dur="1" fill="hold">
+                                        <p:cTn id="8" dur="1" fill="hold">
                                           <p:stCondLst>
                                             <p:cond delay="0"/>
                                           </p:stCondLst>
@@ -10934,33 +11034,15 @@
                                   </p:childTnLst>
                                 </p:cTn>
                               </p:par>
-                            </p:childTnLst>
-                          </p:cTn>
-                        </p:par>
-                      </p:childTnLst>
-                    </p:cTn>
-                  </p:par>
-                  <p:par>
-                    <p:cTn id="11" fill="hold">
-                      <p:stCondLst>
-                        <p:cond delay="indefinite"/>
-                      </p:stCondLst>
-                      <p:childTnLst>
-                        <p:par>
-                          <p:cTn id="12" fill="hold">
-                            <p:stCondLst>
-                              <p:cond delay="0"/>
-                            </p:stCondLst>
-                            <p:childTnLst>
                               <p:par>
-                                <p:cTn id="13" presetID="1" presetClass="entr" presetSubtype="0" fill="hold" nodeType="clickEffect">
+                                <p:cTn id="11" presetID="1" presetClass="entr" presetSubtype="0" fill="hold" nodeType="withEffect">
                                   <p:stCondLst>
                                     <p:cond delay="0"/>
                                   </p:stCondLst>
                                   <p:childTnLst>
                                     <p:set>
                                       <p:cBhvr>
-                                        <p:cTn id="14" dur="1" fill="hold">
+                                        <p:cTn id="12" dur="1" fill="hold">
                                           <p:stCondLst>
                                             <p:cond delay="0"/>
                                           </p:stCondLst>
@@ -13219,7 +13301,15 @@
             </a:pPr>
             <a:r>
               <a:rPr lang="bg-BG" dirty="0"/>
-              <a:t>Създаване на база данни</a:t>
+              <a:t>Създаване на </a:t>
+            </a:r>
+            <a:r>
+              <a:rPr lang="bg-BG" b="1" dirty="0">
+                <a:solidFill>
+                  <a:schemeClr val="bg1"/>
+                </a:solidFill>
+              </a:rPr>
+              <a:t>база данни</a:t>
             </a:r>
           </a:p>
           <a:p>
@@ -13230,7 +13320,15 @@
             </a:pPr>
             <a:r>
               <a:rPr lang="bg-BG" dirty="0"/>
-              <a:t>Създаване на таблици</a:t>
+              <a:t>Създаване на </a:t>
+            </a:r>
+            <a:r>
+              <a:rPr lang="bg-BG" b="1" dirty="0">
+                <a:solidFill>
+                  <a:schemeClr val="bg1"/>
+                </a:solidFill>
+              </a:rPr>
+              <a:t>таблици</a:t>
             </a:r>
           </a:p>
           <a:p>
@@ -13238,10 +13336,29 @@
               <a:spcBef>
                 <a:spcPts val="400"/>
               </a:spcBef>
+              <a:buClr>
+                <a:schemeClr val="tx1"/>
+              </a:buClr>
             </a:pPr>
             <a:r>
+              <a:rPr lang="bg-BG" b="1" dirty="0">
+                <a:solidFill>
+                  <a:schemeClr val="bg1"/>
+                </a:solidFill>
+              </a:rPr>
+              <a:t>Попълване</a:t>
+            </a:r>
+            <a:r>
               <a:rPr lang="bg-BG" dirty="0"/>
-              <a:t>Попълване на данни</a:t>
+              <a:t> на </a:t>
+            </a:r>
+            <a:r>
+              <a:rPr lang="bg-BG" b="1" dirty="0">
+                <a:solidFill>
+                  <a:schemeClr val="bg1"/>
+                </a:solidFill>
+              </a:rPr>
+              <a:t>данни</a:t>
             </a:r>
           </a:p>
           <a:p>
@@ -13588,39 +13705,26 @@
                                   </p:childTnLst>
                                 </p:cTn>
                               </p:par>
+                            </p:childTnLst>
+                          </p:cTn>
+                        </p:par>
+                      </p:childTnLst>
+                    </p:cTn>
+                  </p:par>
+                  <p:par>
+                    <p:cTn id="9" fill="hold">
+                      <p:stCondLst>
+                        <p:cond delay="indefinite"/>
+                      </p:stCondLst>
+                      <p:childTnLst>
+                        <p:par>
+                          <p:cTn id="10" fill="hold">
+                            <p:stCondLst>
+                              <p:cond delay="0"/>
+                            </p:stCondLst>
+                            <p:childTnLst>
                               <p:par>
-                                <p:cTn id="9" presetID="1" presetClass="entr" presetSubtype="0" fill="hold" nodeType="withEffect">
-                                  <p:stCondLst>
-                                    <p:cond delay="0"/>
-                                  </p:stCondLst>
-                                  <p:childTnLst>
-                                    <p:set>
-                                      <p:cBhvr>
-                                        <p:cTn id="10" dur="1" fill="hold">
-                                          <p:stCondLst>
-                                            <p:cond delay="0"/>
-                                          </p:stCondLst>
-                                        </p:cTn>
-                                        <p:tgtEl>
-                                          <p:spTgt spid="444419">
-                                            <p:txEl>
-                                              <p:pRg st="3" end="3"/>
-                                            </p:txEl>
-                                          </p:spTgt>
-                                        </p:tgtEl>
-                                        <p:attrNameLst>
-                                          <p:attrName>style.visibility</p:attrName>
-                                        </p:attrNameLst>
-                                      </p:cBhvr>
-                                      <p:to>
-                                        <p:strVal val="visible"/>
-                                      </p:to>
-                                    </p:set>
-                                  </p:childTnLst>
-                                </p:cTn>
-                              </p:par>
-                              <p:par>
-                                <p:cTn id="11" presetID="1" presetClass="entr" presetSubtype="0" fill="hold" nodeType="withEffect">
+                                <p:cTn id="11" presetID="1" presetClass="entr" presetSubtype="0" fill="hold" nodeType="clickEffect">
                                   <p:stCondLst>
                                     <p:cond delay="0"/>
                                   </p:stCondLst>
@@ -13635,7 +13739,7 @@
                                         <p:tgtEl>
                                           <p:spTgt spid="444419">
                                             <p:txEl>
-                                              <p:pRg st="4" end="4"/>
+                                              <p:pRg st="3" end="3"/>
                                             </p:txEl>
                                           </p:spTgt>
                                         </p:tgtEl>
@@ -13684,6 +13788,55 @@
                                         <p:tgtEl>
                                           <p:spTgt spid="444419">
                                             <p:txEl>
+                                              <p:pRg st="4" end="4"/>
+                                            </p:txEl>
+                                          </p:spTgt>
+                                        </p:tgtEl>
+                                        <p:attrNameLst>
+                                          <p:attrName>style.visibility</p:attrName>
+                                        </p:attrNameLst>
+                                      </p:cBhvr>
+                                      <p:to>
+                                        <p:strVal val="visible"/>
+                                      </p:to>
+                                    </p:set>
+                                  </p:childTnLst>
+                                </p:cTn>
+                              </p:par>
+                            </p:childTnLst>
+                          </p:cTn>
+                        </p:par>
+                      </p:childTnLst>
+                    </p:cTn>
+                  </p:par>
+                  <p:par>
+                    <p:cTn id="17" fill="hold">
+                      <p:stCondLst>
+                        <p:cond delay="indefinite"/>
+                      </p:stCondLst>
+                      <p:childTnLst>
+                        <p:par>
+                          <p:cTn id="18" fill="hold">
+                            <p:stCondLst>
+                              <p:cond delay="0"/>
+                            </p:stCondLst>
+                            <p:childTnLst>
+                              <p:par>
+                                <p:cTn id="19" presetID="1" presetClass="entr" presetSubtype="0" fill="hold" nodeType="clickEffect">
+                                  <p:stCondLst>
+                                    <p:cond delay="0"/>
+                                  </p:stCondLst>
+                                  <p:childTnLst>
+                                    <p:set>
+                                      <p:cBhvr>
+                                        <p:cTn id="20" dur="1" fill="hold">
+                                          <p:stCondLst>
+                                            <p:cond delay="0"/>
+                                          </p:stCondLst>
+                                        </p:cTn>
+                                        <p:tgtEl>
+                                          <p:spTgt spid="444419">
+                                            <p:txEl>
                                               <p:pRg st="5" end="5"/>
                                             </p:txEl>
                                           </p:spTgt>
@@ -13700,14 +13853,14 @@
                                 </p:cTn>
                               </p:par>
                               <p:par>
-                                <p:cTn id="17" presetID="1" presetClass="entr" presetSubtype="0" fill="hold" nodeType="withEffect">
+                                <p:cTn id="21" presetID="1" presetClass="entr" presetSubtype="0" fill="hold" nodeType="withEffect">
                                   <p:stCondLst>
                                     <p:cond delay="0"/>
                                   </p:stCondLst>
                                   <p:childTnLst>
                                     <p:set>
                                       <p:cBhvr>
-                                        <p:cTn id="18" dur="1" fill="hold">
+                                        <p:cTn id="22" dur="1" fill="hold">
                                           <p:stCondLst>
                                             <p:cond delay="0"/>
                                           </p:stCondLst>
@@ -15864,7 +16017,19 @@
             <a:pPr lvl="1"/>
             <a:r>
               <a:rPr lang="bg-BG" dirty="0"/>
-              <a:t>И други...</a:t>
+              <a:t>И </a:t>
+            </a:r>
+            <a:r>
+              <a:rPr lang="bg-BG" b="1" dirty="0">
+                <a:solidFill>
+                  <a:schemeClr val="bg1"/>
+                </a:solidFill>
+              </a:rPr>
+              <a:t>други</a:t>
+            </a:r>
+            <a:r>
+              <a:rPr lang="bg-BG" dirty="0"/>
+              <a:t>...</a:t>
             </a:r>
             <a:endParaRPr lang="en-US" dirty="0"/>
           </a:p>
@@ -23540,35 +23705,92 @@
         </p:nvSpPr>
         <p:spPr>
           <a:xfrm>
-            <a:off x="8121000" y="1196125"/>
-            <a:ext cx="3887498" cy="5528766"/>
+            <a:off x="7581000" y="1089000"/>
+            <a:ext cx="4629444" cy="5895000"/>
           </a:xfrm>
         </p:spPr>
         <p:txBody>
           <a:bodyPr>
-            <a:normAutofit/>
+            <a:normAutofit fontScale="92500" lnSpcReduction="10000"/>
           </a:bodyPr>
           <a:lstStyle/>
           <a:p>
-            <a:r>
-              <a:rPr lang="en-US" sz="3200" b="1" dirty="0"/>
-              <a:t>MS Access</a:t>
-            </a:r>
-          </a:p>
-          <a:p>
             <a:pPr lvl="1"/>
             <a:r>
-              <a:rPr lang="bg-BG" sz="2800" dirty="0"/>
-              <a:t>Настолна система за менажиране на бази данни</a:t>
+              <a:rPr lang="bg-BG" sz="3600" dirty="0"/>
+              <a:t>Настолна система за </a:t>
+            </a:r>
+            <a:r>
+              <a:rPr lang="bg-BG" sz="3600" b="1" dirty="0">
+                <a:solidFill>
+                  <a:schemeClr val="bg1"/>
+                </a:solidFill>
+              </a:rPr>
+              <a:t>менажиране</a:t>
+            </a:r>
+            <a:r>
+              <a:rPr lang="bg-BG" sz="3600" dirty="0"/>
+              <a:t> на </a:t>
+            </a:r>
+            <a:r>
+              <a:rPr lang="bg-BG" sz="3600" b="1" dirty="0">
+                <a:solidFill>
+                  <a:schemeClr val="bg1"/>
+                </a:solidFill>
+              </a:rPr>
+              <a:t>бази данни</a:t>
             </a:r>
           </a:p>
           <a:p>
             <a:pPr lvl="1"/>
             <a:r>
-              <a:rPr lang="bg-BG" sz="2800" dirty="0"/>
-              <a:t>Таблици, връзки, заявки, отчети, формуляри</a:t>
-            </a:r>
-            <a:endParaRPr lang="en-US" sz="2800" dirty="0"/>
+              <a:rPr lang="bg-BG" sz="3600" dirty="0"/>
+              <a:t>Предоставя:</a:t>
+            </a:r>
+            <a:endParaRPr lang="en-US" sz="3600" dirty="0"/>
+          </a:p>
+          <a:p>
+            <a:pPr lvl="2"/>
+            <a:r>
+              <a:rPr lang="bg-BG" sz="3400" dirty="0"/>
+              <a:t>Таблици </a:t>
+            </a:r>
+          </a:p>
+          <a:p>
+            <a:pPr lvl="2"/>
+            <a:r>
+              <a:rPr lang="bg-BG" sz="3400" dirty="0"/>
+              <a:t>Връзки</a:t>
+            </a:r>
+          </a:p>
+          <a:p>
+            <a:pPr lvl="2"/>
+            <a:r>
+              <a:rPr lang="bg-BG" sz="3400" dirty="0"/>
+              <a:t>Заявки</a:t>
+            </a:r>
+          </a:p>
+          <a:p>
+            <a:pPr lvl="2"/>
+            <a:r>
+              <a:rPr lang="bg-BG" sz="3400" dirty="0"/>
+              <a:t>Отчети </a:t>
+            </a:r>
+          </a:p>
+          <a:p>
+            <a:pPr lvl="2"/>
+            <a:r>
+              <a:rPr lang="bg-BG" sz="3400" dirty="0"/>
+              <a:t>Формуляри</a:t>
+            </a:r>
+          </a:p>
+          <a:p>
+            <a:pPr lvl="2"/>
+            <a:r>
+              <a:rPr lang="bg-BG" sz="3400" dirty="0"/>
+              <a:t>И др.</a:t>
+            </a:r>
+            <a:endParaRPr lang="en-US" sz="3400" dirty="0"/>
           </a:p>
         </p:txBody>
       </p:sp>
@@ -23624,7 +23846,7 @@
           <p:nvPr/>
         </p:nvPicPr>
         <p:blipFill>
-          <a:blip r:embed="rId2" cstate="print"/>
+          <a:blip r:embed="rId3" cstate="print"/>
           <a:srcRect/>
           <a:stretch>
             <a:fillRect/>
@@ -23659,6 +23881,361 @@
       <p:transition spd="slow" advClick="0" advTm="5000"/>
     </mc:Fallback>
   </mc:AlternateContent>
+  <p:timing>
+    <p:tnLst>
+      <p:par>
+        <p:cTn id="1" dur="indefinite" restart="never" nodeType="tmRoot">
+          <p:childTnLst>
+            <p:seq concurrent="1" nextAc="seek">
+              <p:cTn id="2" dur="indefinite" nodeType="mainSeq">
+                <p:childTnLst>
+                  <p:par>
+                    <p:cTn id="3" fill="hold">
+                      <p:stCondLst>
+                        <p:cond delay="indefinite"/>
+                      </p:stCondLst>
+                      <p:childTnLst>
+                        <p:par>
+                          <p:cTn id="4" fill="hold">
+                            <p:stCondLst>
+                              <p:cond delay="0"/>
+                            </p:stCondLst>
+                            <p:childTnLst>
+                              <p:par>
+                                <p:cTn id="5" presetID="1" presetClass="entr" presetSubtype="0" fill="hold" nodeType="clickEffect">
+                                  <p:stCondLst>
+                                    <p:cond delay="0"/>
+                                  </p:stCondLst>
+                                  <p:childTnLst>
+                                    <p:set>
+                                      <p:cBhvr>
+                                        <p:cTn id="6" dur="1" fill="hold">
+                                          <p:stCondLst>
+                                            <p:cond delay="0"/>
+                                          </p:stCondLst>
+                                        </p:cTn>
+                                        <p:tgtEl>
+                                          <p:spTgt spid="8">
+                                            <p:txEl>
+                                              <p:pRg st="1" end="1"/>
+                                            </p:txEl>
+                                          </p:spTgt>
+                                        </p:tgtEl>
+                                        <p:attrNameLst>
+                                          <p:attrName>style.visibility</p:attrName>
+                                        </p:attrNameLst>
+                                      </p:cBhvr>
+                                      <p:to>
+                                        <p:strVal val="visible"/>
+                                      </p:to>
+                                    </p:set>
+                                  </p:childTnLst>
+                                </p:cTn>
+                              </p:par>
+                              <p:par>
+                                <p:cTn id="7" presetID="1" presetClass="entr" presetSubtype="0" fill="hold" nodeType="withEffect">
+                                  <p:stCondLst>
+                                    <p:cond delay="0"/>
+                                  </p:stCondLst>
+                                  <p:childTnLst>
+                                    <p:set>
+                                      <p:cBhvr>
+                                        <p:cTn id="8" dur="1" fill="hold">
+                                          <p:stCondLst>
+                                            <p:cond delay="0"/>
+                                          </p:stCondLst>
+                                        </p:cTn>
+                                        <p:tgtEl>
+                                          <p:spTgt spid="8">
+                                            <p:txEl>
+                                              <p:pRg st="2" end="2"/>
+                                            </p:txEl>
+                                          </p:spTgt>
+                                        </p:tgtEl>
+                                        <p:attrNameLst>
+                                          <p:attrName>style.visibility</p:attrName>
+                                        </p:attrNameLst>
+                                      </p:cBhvr>
+                                      <p:to>
+                                        <p:strVal val="visible"/>
+                                      </p:to>
+                                    </p:set>
+                                  </p:childTnLst>
+                                </p:cTn>
+                              </p:par>
+                            </p:childTnLst>
+                          </p:cTn>
+                        </p:par>
+                      </p:childTnLst>
+                    </p:cTn>
+                  </p:par>
+                  <p:par>
+                    <p:cTn id="9" fill="hold">
+                      <p:stCondLst>
+                        <p:cond delay="indefinite"/>
+                      </p:stCondLst>
+                      <p:childTnLst>
+                        <p:par>
+                          <p:cTn id="10" fill="hold">
+                            <p:stCondLst>
+                              <p:cond delay="0"/>
+                            </p:stCondLst>
+                            <p:childTnLst>
+                              <p:par>
+                                <p:cTn id="11" presetID="1" presetClass="entr" presetSubtype="0" fill="hold" nodeType="clickEffect">
+                                  <p:stCondLst>
+                                    <p:cond delay="0"/>
+                                  </p:stCondLst>
+                                  <p:childTnLst>
+                                    <p:set>
+                                      <p:cBhvr>
+                                        <p:cTn id="12" dur="1" fill="hold">
+                                          <p:stCondLst>
+                                            <p:cond delay="0"/>
+                                          </p:stCondLst>
+                                        </p:cTn>
+                                        <p:tgtEl>
+                                          <p:spTgt spid="8">
+                                            <p:txEl>
+                                              <p:pRg st="3" end="3"/>
+                                            </p:txEl>
+                                          </p:spTgt>
+                                        </p:tgtEl>
+                                        <p:attrNameLst>
+                                          <p:attrName>style.visibility</p:attrName>
+                                        </p:attrNameLst>
+                                      </p:cBhvr>
+                                      <p:to>
+                                        <p:strVal val="visible"/>
+                                      </p:to>
+                                    </p:set>
+                                  </p:childTnLst>
+                                </p:cTn>
+                              </p:par>
+                            </p:childTnLst>
+                          </p:cTn>
+                        </p:par>
+                      </p:childTnLst>
+                    </p:cTn>
+                  </p:par>
+                  <p:par>
+                    <p:cTn id="13" fill="hold">
+                      <p:stCondLst>
+                        <p:cond delay="indefinite"/>
+                      </p:stCondLst>
+                      <p:childTnLst>
+                        <p:par>
+                          <p:cTn id="14" fill="hold">
+                            <p:stCondLst>
+                              <p:cond delay="0"/>
+                            </p:stCondLst>
+                            <p:childTnLst>
+                              <p:par>
+                                <p:cTn id="15" presetID="1" presetClass="entr" presetSubtype="0" fill="hold" nodeType="clickEffect">
+                                  <p:stCondLst>
+                                    <p:cond delay="0"/>
+                                  </p:stCondLst>
+                                  <p:childTnLst>
+                                    <p:set>
+                                      <p:cBhvr>
+                                        <p:cTn id="16" dur="1" fill="hold">
+                                          <p:stCondLst>
+                                            <p:cond delay="0"/>
+                                          </p:stCondLst>
+                                        </p:cTn>
+                                        <p:tgtEl>
+                                          <p:spTgt spid="8">
+                                            <p:txEl>
+                                              <p:pRg st="4" end="4"/>
+                                            </p:txEl>
+                                          </p:spTgt>
+                                        </p:tgtEl>
+                                        <p:attrNameLst>
+                                          <p:attrName>style.visibility</p:attrName>
+                                        </p:attrNameLst>
+                                      </p:cBhvr>
+                                      <p:to>
+                                        <p:strVal val="visible"/>
+                                      </p:to>
+                                    </p:set>
+                                  </p:childTnLst>
+                                </p:cTn>
+                              </p:par>
+                            </p:childTnLst>
+                          </p:cTn>
+                        </p:par>
+                      </p:childTnLst>
+                    </p:cTn>
+                  </p:par>
+                  <p:par>
+                    <p:cTn id="17" fill="hold">
+                      <p:stCondLst>
+                        <p:cond delay="indefinite"/>
+                      </p:stCondLst>
+                      <p:childTnLst>
+                        <p:par>
+                          <p:cTn id="18" fill="hold">
+                            <p:stCondLst>
+                              <p:cond delay="0"/>
+                            </p:stCondLst>
+                            <p:childTnLst>
+                              <p:par>
+                                <p:cTn id="19" presetID="1" presetClass="entr" presetSubtype="0" fill="hold" nodeType="clickEffect">
+                                  <p:stCondLst>
+                                    <p:cond delay="0"/>
+                                  </p:stCondLst>
+                                  <p:childTnLst>
+                                    <p:set>
+                                      <p:cBhvr>
+                                        <p:cTn id="20" dur="1" fill="hold">
+                                          <p:stCondLst>
+                                            <p:cond delay="0"/>
+                                          </p:stCondLst>
+                                        </p:cTn>
+                                        <p:tgtEl>
+                                          <p:spTgt spid="8">
+                                            <p:txEl>
+                                              <p:pRg st="5" end="5"/>
+                                            </p:txEl>
+                                          </p:spTgt>
+                                        </p:tgtEl>
+                                        <p:attrNameLst>
+                                          <p:attrName>style.visibility</p:attrName>
+                                        </p:attrNameLst>
+                                      </p:cBhvr>
+                                      <p:to>
+                                        <p:strVal val="visible"/>
+                                      </p:to>
+                                    </p:set>
+                                  </p:childTnLst>
+                                </p:cTn>
+                              </p:par>
+                            </p:childTnLst>
+                          </p:cTn>
+                        </p:par>
+                      </p:childTnLst>
+                    </p:cTn>
+                  </p:par>
+                  <p:par>
+                    <p:cTn id="21" fill="hold">
+                      <p:stCondLst>
+                        <p:cond delay="indefinite"/>
+                      </p:stCondLst>
+                      <p:childTnLst>
+                        <p:par>
+                          <p:cTn id="22" fill="hold">
+                            <p:stCondLst>
+                              <p:cond delay="0"/>
+                            </p:stCondLst>
+                            <p:childTnLst>
+                              <p:par>
+                                <p:cTn id="23" presetID="1" presetClass="entr" presetSubtype="0" fill="hold" nodeType="clickEffect">
+                                  <p:stCondLst>
+                                    <p:cond delay="0"/>
+                                  </p:stCondLst>
+                                  <p:childTnLst>
+                                    <p:set>
+                                      <p:cBhvr>
+                                        <p:cTn id="24" dur="1" fill="hold">
+                                          <p:stCondLst>
+                                            <p:cond delay="0"/>
+                                          </p:stCondLst>
+                                        </p:cTn>
+                                        <p:tgtEl>
+                                          <p:spTgt spid="8">
+                                            <p:txEl>
+                                              <p:pRg st="6" end="6"/>
+                                            </p:txEl>
+                                          </p:spTgt>
+                                        </p:tgtEl>
+                                        <p:attrNameLst>
+                                          <p:attrName>style.visibility</p:attrName>
+                                        </p:attrNameLst>
+                                      </p:cBhvr>
+                                      <p:to>
+                                        <p:strVal val="visible"/>
+                                      </p:to>
+                                    </p:set>
+                                  </p:childTnLst>
+                                </p:cTn>
+                              </p:par>
+                            </p:childTnLst>
+                          </p:cTn>
+                        </p:par>
+                      </p:childTnLst>
+                    </p:cTn>
+                  </p:par>
+                  <p:par>
+                    <p:cTn id="25" fill="hold">
+                      <p:stCondLst>
+                        <p:cond delay="indefinite"/>
+                      </p:stCondLst>
+                      <p:childTnLst>
+                        <p:par>
+                          <p:cTn id="26" fill="hold">
+                            <p:stCondLst>
+                              <p:cond delay="0"/>
+                            </p:stCondLst>
+                            <p:childTnLst>
+                              <p:par>
+                                <p:cTn id="27" presetID="1" presetClass="entr" presetSubtype="0" fill="hold" nodeType="clickEffect">
+                                  <p:stCondLst>
+                                    <p:cond delay="0"/>
+                                  </p:stCondLst>
+                                  <p:childTnLst>
+                                    <p:set>
+                                      <p:cBhvr>
+                                        <p:cTn id="28" dur="1" fill="hold">
+                                          <p:stCondLst>
+                                            <p:cond delay="0"/>
+                                          </p:stCondLst>
+                                        </p:cTn>
+                                        <p:tgtEl>
+                                          <p:spTgt spid="8">
+                                            <p:txEl>
+                                              <p:pRg st="7" end="7"/>
+                                            </p:txEl>
+                                          </p:spTgt>
+                                        </p:tgtEl>
+                                        <p:attrNameLst>
+                                          <p:attrName>style.visibility</p:attrName>
+                                        </p:attrNameLst>
+                                      </p:cBhvr>
+                                      <p:to>
+                                        <p:strVal val="visible"/>
+                                      </p:to>
+                                    </p:set>
+                                  </p:childTnLst>
+                                </p:cTn>
+                              </p:par>
+                            </p:childTnLst>
+                          </p:cTn>
+                        </p:par>
+                      </p:childTnLst>
+                    </p:cTn>
+                  </p:par>
+                </p:childTnLst>
+              </p:cTn>
+              <p:prevCondLst>
+                <p:cond evt="onPrev" delay="0">
+                  <p:tgtEl>
+                    <p:sldTgt/>
+                  </p:tgtEl>
+                </p:cond>
+              </p:prevCondLst>
+              <p:nextCondLst>
+                <p:cond evt="onNext" delay="0">
+                  <p:tgtEl>
+                    <p:sldTgt/>
+                  </p:tgtEl>
+                </p:cond>
+              </p:nextCondLst>
+            </p:seq>
+          </p:childTnLst>
+        </p:cTn>
+      </p:par>
+    </p:tnLst>
+  </p:timing>
 </p:sld>
 </file>
 
@@ -26258,342 +26835,6 @@
       </p:grpSpPr>
       <p:sp>
         <p:nvSpPr>
-          <p:cNvPr id="2" name="Slide Number Placeholder 1">
-            <a:extLst>
-              <a:ext uri="{FF2B5EF4-FFF2-40B4-BE49-F238E27FC236}">
-                <a16:creationId xmlns:a16="http://schemas.microsoft.com/office/drawing/2014/main" id="{55C31C9B-464B-265F-DF9C-24209503F6A3}"/>
-              </a:ext>
-            </a:extLst>
-          </p:cNvPr>
-          <p:cNvSpPr>
-            <a:spLocks noGrp="1"/>
-          </p:cNvSpPr>
-          <p:nvPr>
-            <p:ph type="sldNum" sz="quarter" idx="5"/>
-          </p:nvPr>
-        </p:nvSpPr>
-        <p:spPr/>
-        <p:txBody>
-          <a:bodyPr/>
-          <a:lstStyle/>
-          <a:p>
-            <a:fld id="{2BF067CD-8E6B-4360-9AA8-C5DF2A48A6D1}" type="slidenum">
-              <a:rPr lang="en-US" noProof="0" smtClean="0"/>
-              <a:pPr/>
-              <a:t>6</a:t>
-            </a:fld>
-            <a:endParaRPr lang="en-US" noProof="0" dirty="0"/>
-          </a:p>
-        </p:txBody>
-      </p:sp>
-      <p:sp>
-        <p:nvSpPr>
-          <p:cNvPr id="3" name="Text Placeholder 2">
-            <a:extLst>
-              <a:ext uri="{FF2B5EF4-FFF2-40B4-BE49-F238E27FC236}">
-                <a16:creationId xmlns:a16="http://schemas.microsoft.com/office/drawing/2014/main" id="{E2CC61BB-B002-69C8-E794-6FD5039D5408}"/>
-              </a:ext>
-            </a:extLst>
-          </p:cNvPr>
-          <p:cNvSpPr>
-            <a:spLocks noGrp="1"/>
-          </p:cNvSpPr>
-          <p:nvPr>
-            <p:ph type="body" sz="quarter" idx="10"/>
-          </p:nvPr>
-        </p:nvSpPr>
-        <p:spPr/>
-        <p:txBody>
-          <a:bodyPr/>
-          <a:lstStyle/>
-          <a:p>
-            <a:r>
-              <a:rPr lang="bg-BG" dirty="0"/>
-              <a:t>Отворете </a:t>
-            </a:r>
-            <a:r>
-              <a:rPr lang="en-US" dirty="0">
-                <a:hlinkClick r:id="rId2"/>
-              </a:rPr>
-              <a:t>https://portal.office.com/account/#installs</a:t>
-            </a:r>
-            <a:endParaRPr lang="en-US" dirty="0"/>
-          </a:p>
-        </p:txBody>
-      </p:sp>
-      <p:sp>
-        <p:nvSpPr>
-          <p:cNvPr id="4" name="Title 3">
-            <a:extLst>
-              <a:ext uri="{FF2B5EF4-FFF2-40B4-BE49-F238E27FC236}">
-                <a16:creationId xmlns:a16="http://schemas.microsoft.com/office/drawing/2014/main" id="{A4A1CEA1-A1C8-38B3-C56A-4FAA18B0866E}"/>
-              </a:ext>
-            </a:extLst>
-          </p:cNvPr>
-          <p:cNvSpPr>
-            <a:spLocks noGrp="1"/>
-          </p:cNvSpPr>
-          <p:nvPr>
-            <p:ph type="title"/>
-          </p:nvPr>
-        </p:nvSpPr>
-        <p:spPr/>
-        <p:txBody>
-          <a:bodyPr/>
-          <a:lstStyle/>
-          <a:p>
-            <a:r>
-              <a:rPr lang="bg-BG" dirty="0"/>
-              <a:t>Инсталация на </a:t>
-            </a:r>
-            <a:r>
-              <a:rPr lang="en-US" dirty="0"/>
-              <a:t>MS Access</a:t>
-            </a:r>
-          </a:p>
-        </p:txBody>
-      </p:sp>
-      <p:pic>
-        <p:nvPicPr>
-          <p:cNvPr id="6" name="Picture 5">
-            <a:extLst>
-              <a:ext uri="{FF2B5EF4-FFF2-40B4-BE49-F238E27FC236}">
-                <a16:creationId xmlns:a16="http://schemas.microsoft.com/office/drawing/2014/main" id="{BE00EF3E-84D1-2BF2-0D86-9F90C8C66AFE}"/>
-              </a:ext>
-            </a:extLst>
-          </p:cNvPr>
-          <p:cNvPicPr>
-            <a:picLocks noChangeAspect="1"/>
-          </p:cNvPicPr>
-          <p:nvPr/>
-        </p:nvPicPr>
-        <p:blipFill>
-          <a:blip r:embed="rId3"/>
-          <a:stretch>
-            <a:fillRect/>
-          </a:stretch>
-        </p:blipFill>
-        <p:spPr>
-          <a:xfrm>
-            <a:off x="381000" y="1987188"/>
-            <a:ext cx="9000002" cy="4560100"/>
-          </a:xfrm>
-          <a:prstGeom prst="rect">
-            <a:avLst/>
-          </a:prstGeom>
-          <a:ln>
-            <a:solidFill>
-              <a:schemeClr val="bg2">
-                <a:lumMod val="75000"/>
-              </a:schemeClr>
-            </a:solidFill>
-          </a:ln>
-        </p:spPr>
-      </p:pic>
-      <p:sp>
-        <p:nvSpPr>
-          <p:cNvPr id="7" name="AutoShape 7">
-            <a:extLst>
-              <a:ext uri="{FF2B5EF4-FFF2-40B4-BE49-F238E27FC236}">
-                <a16:creationId xmlns:a16="http://schemas.microsoft.com/office/drawing/2014/main" id="{F7470F73-3C08-8244-4ACC-63FEEC1A1C95}"/>
-              </a:ext>
-            </a:extLst>
-          </p:cNvPr>
-          <p:cNvSpPr>
-            <a:spLocks noChangeArrowheads="1"/>
-          </p:cNvSpPr>
-          <p:nvPr/>
-        </p:nvSpPr>
-        <p:spPr bwMode="auto">
-          <a:xfrm>
-            <a:off x="9653111" y="2067374"/>
-            <a:ext cx="1842889" cy="1350000"/>
-          </a:xfrm>
-          <a:prstGeom prst="wedgeRoundRectCallout">
-            <a:avLst>
-              <a:gd name="adj1" fmla="val -82175"/>
-              <a:gd name="adj2" fmla="val 44192"/>
-              <a:gd name="adj3" fmla="val 16667"/>
-            </a:avLst>
-          </a:prstGeom>
-          <a:solidFill>
-            <a:schemeClr val="dk2">
-              <a:alpha val="80000"/>
-            </a:schemeClr>
-          </a:solidFill>
-          <a:ln w="19050">
-            <a:solidFill>
-              <a:schemeClr val="tx1">
-                <a:lumMod val="75000"/>
-                <a:alpha val="80000"/>
-              </a:schemeClr>
-            </a:solidFill>
-          </a:ln>
-          <a:effectLst/>
-        </p:spPr>
-        <p:style>
-          <a:lnRef idx="2">
-            <a:schemeClr val="accent1">
-              <a:shade val="50000"/>
-            </a:schemeClr>
-          </a:lnRef>
-          <a:fillRef idx="1001">
-            <a:schemeClr val="dk2"/>
-          </a:fillRef>
-          <a:effectRef idx="0">
-            <a:schemeClr val="accent1"/>
-          </a:effectRef>
-          <a:fontRef idx="minor">
-            <a:schemeClr val="lt1"/>
-          </a:fontRef>
-        </p:style>
-        <p:txBody>
-          <a:bodyPr rot="0" spcFirstLastPara="0" vertOverflow="overflow" horzOverflow="overflow" vert="horz" wrap="square" lIns="91416" tIns="45708" rIns="91416" bIns="45708" numCol="1" spcCol="0" rtlCol="0" fromWordArt="0" anchor="ctr" anchorCtr="0" forceAA="0" compatLnSpc="1">
-            <a:prstTxWarp prst="textNoShape">
-              <a:avLst/>
-            </a:prstTxWarp>
-            <a:noAutofit/>
-          </a:bodyPr>
-          <a:lstStyle/>
-          <a:p>
-            <a:pPr algn="ctr"/>
-            <a:r>
-              <a:rPr lang="bg-BG" sz="2399" b="1" noProof="1">
-                <a:solidFill>
-                  <a:srgbClr val="FFFFFF"/>
-                </a:solidFill>
-              </a:rPr>
-              <a:t>Изисква се лиценз за </a:t>
-            </a:r>
-            <a:r>
-              <a:rPr lang="en-US" sz="2399" b="1" noProof="1">
-                <a:solidFill>
-                  <a:srgbClr val="FFFFFF"/>
-                </a:solidFill>
-              </a:rPr>
-              <a:t>Office 365</a:t>
-            </a:r>
-          </a:p>
-        </p:txBody>
-      </p:sp>
-    </p:spTree>
-    <p:extLst>
-      <p:ext uri="{BB962C8B-B14F-4D97-AF65-F5344CB8AC3E}">
-        <p14:creationId xmlns:p14="http://schemas.microsoft.com/office/powerpoint/2010/main" val="4244781930"/>
-      </p:ext>
-    </p:extLst>
-  </p:cSld>
-  <p:clrMapOvr>
-    <a:masterClrMapping/>
-  </p:clrMapOvr>
-  <mc:AlternateContent xmlns:mc="http://schemas.openxmlformats.org/markup-compatibility/2006" xmlns:p14="http://schemas.microsoft.com/office/powerpoint/2010/main">
-    <mc:Choice Requires="p14">
-      <p:transition spd="slow" p14:dur="2000" advClick="0" advTm="5000"/>
-    </mc:Choice>
-    <mc:Fallback xmlns="">
-      <p:transition spd="slow" advClick="0" advTm="5000"/>
-    </mc:Fallback>
-  </mc:AlternateContent>
-  <p:timing>
-    <p:tnLst>
-      <p:par>
-        <p:cTn id="1" dur="indefinite" restart="never" nodeType="tmRoot">
-          <p:childTnLst>
-            <p:seq concurrent="1" nextAc="seek">
-              <p:cTn id="2" dur="indefinite" nodeType="mainSeq">
-                <p:childTnLst>
-                  <p:par>
-                    <p:cTn id="3" fill="hold">
-                      <p:stCondLst>
-                        <p:cond delay="indefinite"/>
-                      </p:stCondLst>
-                      <p:childTnLst>
-                        <p:par>
-                          <p:cTn id="4" fill="hold">
-                            <p:stCondLst>
-                              <p:cond delay="0"/>
-                            </p:stCondLst>
-                            <p:childTnLst>
-                              <p:par>
-                                <p:cTn id="5" presetID="1" presetClass="entr" presetSubtype="0" fill="hold" grpId="0" nodeType="clickEffect">
-                                  <p:stCondLst>
-                                    <p:cond delay="0"/>
-                                  </p:stCondLst>
-                                  <p:childTnLst>
-                                    <p:set>
-                                      <p:cBhvr>
-                                        <p:cTn id="6" dur="1" fill="hold">
-                                          <p:stCondLst>
-                                            <p:cond delay="0"/>
-                                          </p:stCondLst>
-                                        </p:cTn>
-                                        <p:tgtEl>
-                                          <p:spTgt spid="7"/>
-                                        </p:tgtEl>
-                                        <p:attrNameLst>
-                                          <p:attrName>style.visibility</p:attrName>
-                                        </p:attrNameLst>
-                                      </p:cBhvr>
-                                      <p:to>
-                                        <p:strVal val="visible"/>
-                                      </p:to>
-                                    </p:set>
-                                  </p:childTnLst>
-                                </p:cTn>
-                              </p:par>
-                            </p:childTnLst>
-                          </p:cTn>
-                        </p:par>
-                      </p:childTnLst>
-                    </p:cTn>
-                  </p:par>
-                </p:childTnLst>
-              </p:cTn>
-              <p:prevCondLst>
-                <p:cond evt="onPrev" delay="0">
-                  <p:tgtEl>
-                    <p:sldTgt/>
-                  </p:tgtEl>
-                </p:cond>
-              </p:prevCondLst>
-              <p:nextCondLst>
-                <p:cond evt="onNext" delay="0">
-                  <p:tgtEl>
-                    <p:sldTgt/>
-                  </p:tgtEl>
-                </p:cond>
-              </p:nextCondLst>
-            </p:seq>
-          </p:childTnLst>
-        </p:cTn>
-      </p:par>
-    </p:tnLst>
-    <p:bldLst>
-      <p:bldP spid="7" grpId="0" animBg="1"/>
-    </p:bldLst>
-  </p:timing>
-</p:sld>
-</file>
-
-<file path=ppt/slides/slide7.xml><?xml version="1.0" encoding="utf-8"?>
-<p:sld xmlns:a="http://schemas.openxmlformats.org/drawingml/2006/main" xmlns:r="http://schemas.openxmlformats.org/officeDocument/2006/relationships" xmlns:p="http://schemas.openxmlformats.org/presentationml/2006/main">
-  <p:cSld>
-    <p:spTree>
-      <p:nvGrpSpPr>
-        <p:cNvPr id="1" name=""/>
-        <p:cNvGrpSpPr/>
-        <p:nvPr/>
-      </p:nvGrpSpPr>
-      <p:grpSpPr>
-        <a:xfrm>
-          <a:off x="0" y="0"/>
-          <a:ext cx="0" cy="0"/>
-          <a:chOff x="0" y="0"/>
-          <a:chExt cx="0" cy="0"/>
-        </a:xfrm>
-      </p:grpSpPr>
-      <p:sp>
-        <p:nvSpPr>
           <p:cNvPr id="3" name="Text Placeholder 2"/>
           <p:cNvSpPr>
             <a:spLocks noGrp="1"/>
@@ -26733,7 +26974,7 @@
             <a:fld id="{2BF067CD-8E6B-4360-9AA8-C5DF2A48A6D1}" type="slidenum">
               <a:rPr lang="en-US" noProof="0" smtClean="0"/>
               <a:pPr/>
-              <a:t>7</a:t>
+              <a:t>6</a:t>
             </a:fld>
             <a:endParaRPr lang="en-US" noProof="0" dirty="0"/>
           </a:p>
@@ -26760,7 +27001,7 @@
 </p:sld>
 </file>
 
-<file path=ppt/slides/slide8.xml><?xml version="1.0" encoding="utf-8"?>
+<file path=ppt/slides/slide7.xml><?xml version="1.0" encoding="utf-8"?>
 <p:sld xmlns:a="http://schemas.openxmlformats.org/drawingml/2006/main" xmlns:r="http://schemas.openxmlformats.org/officeDocument/2006/relationships" xmlns:p="http://schemas.openxmlformats.org/presentationml/2006/main">
   <p:cSld>
     <p:spTree>
@@ -26891,7 +27132,7 @@
 </p:sld>
 </file>
 
-<file path=ppt/slides/slide9.xml><?xml version="1.0" encoding="utf-8"?>
+<file path=ppt/slides/slide8.xml><?xml version="1.0" encoding="utf-8"?>
 <p:sld xmlns:a="http://schemas.openxmlformats.org/drawingml/2006/main" xmlns:r="http://schemas.openxmlformats.org/officeDocument/2006/relationships" xmlns:p="http://schemas.openxmlformats.org/presentationml/2006/main">
   <p:cSld>
     <p:spTree>
@@ -26932,7 +27173,7 @@
             <a:fld id="{2BF067CD-8E6B-4360-9AA8-C5DF2A48A6D1}" type="slidenum">
               <a:rPr lang="en-US" noProof="0" smtClean="0"/>
               <a:pPr/>
-              <a:t>9</a:t>
+              <a:t>8</a:t>
             </a:fld>
             <a:endParaRPr lang="en-US" noProof="0" dirty="0"/>
           </a:p>
@@ -27123,6 +27364,382 @@
       <p:transition spd="slow" advClick="0" advTm="5000"/>
     </mc:Fallback>
   </mc:AlternateContent>
+</p:sld>
+</file>
+
+<file path=ppt/slides/slide9.xml><?xml version="1.0" encoding="utf-8"?>
+<p:sld xmlns:a="http://schemas.openxmlformats.org/drawingml/2006/main" xmlns:r="http://schemas.openxmlformats.org/officeDocument/2006/relationships" xmlns:p="http://schemas.openxmlformats.org/presentationml/2006/main">
+  <p:cSld>
+    <p:spTree>
+      <p:nvGrpSpPr>
+        <p:cNvPr id="1" name=""/>
+        <p:cNvGrpSpPr/>
+        <p:nvPr/>
+      </p:nvGrpSpPr>
+      <p:grpSpPr>
+        <a:xfrm>
+          <a:off x="0" y="0"/>
+          <a:ext cx="0" cy="0"/>
+          <a:chOff x="0" y="0"/>
+          <a:chExt cx="0" cy="0"/>
+        </a:xfrm>
+      </p:grpSpPr>
+      <p:sp>
+        <p:nvSpPr>
+          <p:cNvPr id="2" name="Slide Number Placeholder 1">
+            <a:extLst>
+              <a:ext uri="{FF2B5EF4-FFF2-40B4-BE49-F238E27FC236}">
+                <a16:creationId xmlns:a16="http://schemas.microsoft.com/office/drawing/2014/main" id="{4A451BBE-07CA-CD8A-918C-AEC30C3F0AFF}"/>
+              </a:ext>
+            </a:extLst>
+          </p:cNvPr>
+          <p:cNvSpPr>
+            <a:spLocks noGrp="1"/>
+          </p:cNvSpPr>
+          <p:nvPr>
+            <p:ph type="sldNum" sz="quarter" idx="5"/>
+          </p:nvPr>
+        </p:nvSpPr>
+        <p:spPr>
+          <a:xfrm>
+            <a:off x="11753030" y="6507000"/>
+            <a:ext cx="367414" cy="297000"/>
+          </a:xfrm>
+        </p:spPr>
+        <p:txBody>
+          <a:bodyPr/>
+          <a:lstStyle/>
+          <a:p>
+            <a:fld id="{2BF067CD-8E6B-4360-9AA8-C5DF2A48A6D1}" type="slidenum">
+              <a:rPr lang="en-US" noProof="0" smtClean="0"/>
+              <a:pPr/>
+              <a:t>9</a:t>
+            </a:fld>
+            <a:endParaRPr lang="en-US" noProof="0" dirty="0"/>
+          </a:p>
+        </p:txBody>
+      </p:sp>
+      <p:sp>
+        <p:nvSpPr>
+          <p:cNvPr id="3" name="Text Placeholder 2">
+            <a:extLst>
+              <a:ext uri="{FF2B5EF4-FFF2-40B4-BE49-F238E27FC236}">
+                <a16:creationId xmlns:a16="http://schemas.microsoft.com/office/drawing/2014/main" id="{EAA45F43-20C9-2083-32CF-9F5094C8FFF4}"/>
+              </a:ext>
+            </a:extLst>
+          </p:cNvPr>
+          <p:cNvSpPr>
+            <a:spLocks noGrp="1"/>
+          </p:cNvSpPr>
+          <p:nvPr>
+            <p:ph type="body" sz="quarter" idx="10"/>
+          </p:nvPr>
+        </p:nvSpPr>
+        <p:spPr>
+          <a:xfrm>
+            <a:off x="190402" y="1196125"/>
+            <a:ext cx="11818096" cy="5528766"/>
+          </a:xfrm>
+        </p:spPr>
+        <p:txBody>
+          <a:bodyPr/>
+          <a:lstStyle/>
+          <a:p>
+            <a:r>
+              <a:rPr lang="bg-BG" dirty="0"/>
+              <a:t>Натиснете </a:t>
+            </a:r>
+            <a:r>
+              <a:rPr lang="en-US" dirty="0"/>
+              <a:t>[</a:t>
+            </a:r>
+            <a:r>
+              <a:rPr lang="en-US" b="1" dirty="0"/>
+              <a:t>Install apps</a:t>
+            </a:r>
+            <a:r>
+              <a:rPr lang="en-US" dirty="0"/>
+              <a:t>] -&gt; </a:t>
+            </a:r>
+            <a:r>
+              <a:rPr lang="en-US" b="1" dirty="0"/>
+              <a:t>Microsoft 365 apps</a:t>
+            </a:r>
+            <a:endParaRPr lang="bg-BG" b="1" dirty="0"/>
+          </a:p>
+          <a:p>
+            <a:r>
+              <a:rPr lang="bg-BG" dirty="0"/>
+              <a:t>Следвайте </a:t>
+            </a:r>
+            <a:r>
+              <a:rPr lang="bg-BG" b="1" dirty="0">
+                <a:solidFill>
+                  <a:schemeClr val="bg1"/>
+                </a:solidFill>
+              </a:rPr>
+              <a:t>стъпките</a:t>
+            </a:r>
+            <a:r>
+              <a:rPr lang="bg-BG" dirty="0"/>
+              <a:t> за </a:t>
+            </a:r>
+            <a:r>
+              <a:rPr lang="bg-BG" b="1" dirty="0">
+                <a:solidFill>
+                  <a:schemeClr val="bg1"/>
+                </a:solidFill>
+              </a:rPr>
+              <a:t>инсталация</a:t>
+            </a:r>
+            <a:endParaRPr lang="en-US" b="1" dirty="0">
+              <a:solidFill>
+                <a:schemeClr val="bg1"/>
+              </a:solidFill>
+            </a:endParaRPr>
+          </a:p>
+        </p:txBody>
+      </p:sp>
+      <p:sp>
+        <p:nvSpPr>
+          <p:cNvPr id="4" name="Title 3">
+            <a:extLst>
+              <a:ext uri="{FF2B5EF4-FFF2-40B4-BE49-F238E27FC236}">
+                <a16:creationId xmlns:a16="http://schemas.microsoft.com/office/drawing/2014/main" id="{1C1DF142-959E-5E61-B324-ACE4BFAFB646}"/>
+              </a:ext>
+            </a:extLst>
+          </p:cNvPr>
+          <p:cNvSpPr>
+            <a:spLocks noGrp="1"/>
+          </p:cNvSpPr>
+          <p:nvPr>
+            <p:ph type="title"/>
+          </p:nvPr>
+        </p:nvSpPr>
+        <p:spPr>
+          <a:xfrm>
+            <a:off x="190406" y="100750"/>
+            <a:ext cx="10270594" cy="882654"/>
+          </a:xfrm>
+        </p:spPr>
+        <p:txBody>
+          <a:bodyPr/>
+          <a:lstStyle/>
+          <a:p>
+            <a:r>
+              <a:rPr lang="bg-BG" dirty="0"/>
+              <a:t>Инсталация на </a:t>
+            </a:r>
+            <a:r>
+              <a:rPr lang="en-US" dirty="0"/>
+              <a:t>MS Access</a:t>
+            </a:r>
+            <a:r>
+              <a:rPr lang="bg-BG" dirty="0"/>
+              <a:t> (2)</a:t>
+            </a:r>
+            <a:endParaRPr lang="en-US" dirty="0"/>
+          </a:p>
+        </p:txBody>
+      </p:sp>
+      <p:pic>
+        <p:nvPicPr>
+          <p:cNvPr id="5" name="Picture 4" descr="A screenshot of a computer&#10;&#10;Description automatically generated">
+            <a:extLst>
+              <a:ext uri="{FF2B5EF4-FFF2-40B4-BE49-F238E27FC236}">
+                <a16:creationId xmlns:a16="http://schemas.microsoft.com/office/drawing/2014/main" id="{325AD31C-35A2-CDE2-BF6C-CBD0AE1100C8}"/>
+              </a:ext>
+            </a:extLst>
+          </p:cNvPr>
+          <p:cNvPicPr>
+            <a:picLocks noChangeAspect="1"/>
+          </p:cNvPicPr>
+          <p:nvPr/>
+        </p:nvPicPr>
+        <p:blipFill>
+          <a:blip r:embed="rId2"/>
+          <a:stretch>
+            <a:fillRect/>
+          </a:stretch>
+        </p:blipFill>
+        <p:spPr>
+          <a:xfrm>
+            <a:off x="267502" y="2799000"/>
+            <a:ext cx="5468498" cy="3368985"/>
+          </a:xfrm>
+          <a:prstGeom prst="rect">
+            <a:avLst/>
+          </a:prstGeom>
+          <a:ln>
+            <a:solidFill>
+              <a:schemeClr val="bg2">
+                <a:lumMod val="75000"/>
+              </a:schemeClr>
+            </a:solidFill>
+          </a:ln>
+        </p:spPr>
+      </p:pic>
+      <p:pic>
+        <p:nvPicPr>
+          <p:cNvPr id="6" name="Picture 5" descr="A screenshot of a computer&#10;&#10;Description automatically generated">
+            <a:extLst>
+              <a:ext uri="{FF2B5EF4-FFF2-40B4-BE49-F238E27FC236}">
+                <a16:creationId xmlns:a16="http://schemas.microsoft.com/office/drawing/2014/main" id="{31B6ADDD-F6B8-699B-D022-5C3897E6BD39}"/>
+              </a:ext>
+            </a:extLst>
+          </p:cNvPr>
+          <p:cNvPicPr>
+            <a:picLocks noChangeAspect="1"/>
+          </p:cNvPicPr>
+          <p:nvPr/>
+        </p:nvPicPr>
+        <p:blipFill>
+          <a:blip r:embed="rId3"/>
+          <a:stretch>
+            <a:fillRect/>
+          </a:stretch>
+        </p:blipFill>
+        <p:spPr>
+          <a:xfrm>
+            <a:off x="6231000" y="2799001"/>
+            <a:ext cx="5592645" cy="3368985"/>
+          </a:xfrm>
+          <a:prstGeom prst="rect">
+            <a:avLst/>
+          </a:prstGeom>
+          <a:ln>
+            <a:solidFill>
+              <a:schemeClr val="bg2">
+                <a:lumMod val="75000"/>
+              </a:schemeClr>
+            </a:solidFill>
+          </a:ln>
+        </p:spPr>
+      </p:pic>
+    </p:spTree>
+    <p:extLst>
+      <p:ext uri="{BB962C8B-B14F-4D97-AF65-F5344CB8AC3E}">
+        <p14:creationId xmlns:p14="http://schemas.microsoft.com/office/powerpoint/2010/main" val="750093445"/>
+      </p:ext>
+    </p:extLst>
+  </p:cSld>
+  <p:clrMapOvr>
+    <a:masterClrMapping/>
+  </p:clrMapOvr>
+  <mc:AlternateContent xmlns:mc="http://schemas.openxmlformats.org/markup-compatibility/2006" xmlns:p14="http://schemas.microsoft.com/office/powerpoint/2010/main">
+    <mc:Choice Requires="p14">
+      <p:transition spd="slow" p14:dur="2000" advClick="0" advTm="5000"/>
+    </mc:Choice>
+    <mc:Fallback xmlns="">
+      <p:transition spd="slow" advClick="0" advTm="5000"/>
+    </mc:Fallback>
+  </mc:AlternateContent>
+  <p:timing>
+    <p:tnLst>
+      <p:par>
+        <p:cTn id="1" dur="indefinite" restart="never" nodeType="tmRoot">
+          <p:childTnLst>
+            <p:seq concurrent="1" nextAc="seek">
+              <p:cTn id="2" dur="indefinite" nodeType="mainSeq">
+                <p:childTnLst>
+                  <p:par>
+                    <p:cTn id="3" fill="hold">
+                      <p:stCondLst>
+                        <p:cond delay="indefinite"/>
+                      </p:stCondLst>
+                      <p:childTnLst>
+                        <p:par>
+                          <p:cTn id="4" fill="hold">
+                            <p:stCondLst>
+                              <p:cond delay="0"/>
+                            </p:stCondLst>
+                            <p:childTnLst>
+                              <p:par>
+                                <p:cTn id="5" presetID="1" presetClass="entr" presetSubtype="0" fill="hold" nodeType="clickEffect">
+                                  <p:stCondLst>
+                                    <p:cond delay="0"/>
+                                  </p:stCondLst>
+                                  <p:childTnLst>
+                                    <p:set>
+                                      <p:cBhvr>
+                                        <p:cTn id="6" dur="1" fill="hold">
+                                          <p:stCondLst>
+                                            <p:cond delay="0"/>
+                                          </p:stCondLst>
+                                        </p:cTn>
+                                        <p:tgtEl>
+                                          <p:spTgt spid="3">
+                                            <p:txEl>
+                                              <p:pRg st="1" end="1"/>
+                                            </p:txEl>
+                                          </p:spTgt>
+                                        </p:tgtEl>
+                                        <p:attrNameLst>
+                                          <p:attrName>style.visibility</p:attrName>
+                                        </p:attrNameLst>
+                                      </p:cBhvr>
+                                      <p:to>
+                                        <p:strVal val="visible"/>
+                                      </p:to>
+                                    </p:set>
+                                  </p:childTnLst>
+                                </p:cTn>
+                              </p:par>
+                              <p:par>
+                                <p:cTn id="7" presetID="1" presetClass="entr" presetSubtype="0" fill="hold" nodeType="withEffect">
+                                  <p:stCondLst>
+                                    <p:cond delay="0"/>
+                                  </p:stCondLst>
+                                  <p:childTnLst>
+                                    <p:set>
+                                      <p:cBhvr>
+                                        <p:cTn id="8" dur="1" fill="hold">
+                                          <p:stCondLst>
+                                            <p:cond delay="0"/>
+                                          </p:stCondLst>
+                                        </p:cTn>
+                                        <p:tgtEl>
+                                          <p:spTgt spid="6"/>
+                                        </p:tgtEl>
+                                        <p:attrNameLst>
+                                          <p:attrName>style.visibility</p:attrName>
+                                        </p:attrNameLst>
+                                      </p:cBhvr>
+                                      <p:to>
+                                        <p:strVal val="visible"/>
+                                      </p:to>
+                                    </p:set>
+                                  </p:childTnLst>
+                                </p:cTn>
+                              </p:par>
+                            </p:childTnLst>
+                          </p:cTn>
+                        </p:par>
+                      </p:childTnLst>
+                    </p:cTn>
+                  </p:par>
+                </p:childTnLst>
+              </p:cTn>
+              <p:prevCondLst>
+                <p:cond evt="onPrev" delay="0">
+                  <p:tgtEl>
+                    <p:sldTgt/>
+                  </p:tgtEl>
+                </p:cond>
+              </p:prevCondLst>
+              <p:nextCondLst>
+                <p:cond evt="onNext" delay="0">
+                  <p:tgtEl>
+                    <p:sldTgt/>
+                  </p:tgtEl>
+                </p:cond>
+              </p:nextCondLst>
+            </p:seq>
+          </p:childTnLst>
+        </p:cTn>
+      </p:par>
+    </p:tnLst>
+  </p:timing>
 </p:sld>
 </file>
 

</xml_diff>